<commit_message>
minor changes on slides + scripts files
</commit_message>
<xml_diff>
--- a/presentation/SQL Z2H 2016.pptx
+++ b/presentation/SQL Z2H 2016.pptx
@@ -32,10 +32,10 @@
     <p:sldId id="388" r:id="rId23"/>
     <p:sldId id="385" r:id="rId24"/>
     <p:sldId id="389" r:id="rId25"/>
-    <p:sldId id="359" r:id="rId26"/>
-    <p:sldId id="318" r:id="rId27"/>
-    <p:sldId id="340" r:id="rId28"/>
-    <p:sldId id="365" r:id="rId29"/>
+    <p:sldId id="340" r:id="rId26"/>
+    <p:sldId id="365" r:id="rId27"/>
+    <p:sldId id="359" r:id="rId28"/>
+    <p:sldId id="318" r:id="rId29"/>
     <p:sldId id="347" r:id="rId30"/>
     <p:sldId id="337" r:id="rId31"/>
     <p:sldId id="339" r:id="rId32"/>
@@ -49,10 +49,10 @@
     <p:sldId id="357" r:id="rId40"/>
     <p:sldId id="356" r:id="rId41"/>
     <p:sldId id="353" r:id="rId42"/>
-    <p:sldId id="361" r:id="rId43"/>
-    <p:sldId id="358" r:id="rId44"/>
-    <p:sldId id="360" r:id="rId45"/>
-    <p:sldId id="355" r:id="rId46"/>
+    <p:sldId id="360" r:id="rId43"/>
+    <p:sldId id="355" r:id="rId44"/>
+    <p:sldId id="361" r:id="rId45"/>
+    <p:sldId id="358" r:id="rId46"/>
     <p:sldId id="362" r:id="rId47"/>
     <p:sldId id="363" r:id="rId48"/>
     <p:sldId id="364" r:id="rId49"/>
@@ -6544,6 +6544,43 @@
           </a:bodyPr>
           <a:lstStyle/>
           <a:p>
+            <a:r>
+              <a:rPr lang="en-US" dirty="0" err="1" smtClean="0"/>
+              <a:t>https://msdn.microsoft.com/en-us/library/bb510741.aspx</a:t>
+            </a:r>
+            <a:endParaRPr lang="en-US" dirty="0" smtClean="0"/>
+          </a:p>
+          <a:p>
+            <a:endParaRPr lang="en-US" dirty="0" smtClean="0"/>
+          </a:p>
+          <a:p>
+            <a:r>
+              <a:rPr lang="en-US" dirty="0" smtClean="0"/>
+              <a:t>https://technet.microsoft.com/en-us/library/ms166026(v=sql.90).aspx</a:t>
+            </a:r>
+          </a:p>
+          <a:p>
+            <a:endParaRPr lang="en-US" dirty="0" smtClean="0"/>
+          </a:p>
+          <a:p>
+            <a:r>
+              <a:rPr lang="en-US" dirty="0" err="1" smtClean="0"/>
+              <a:t>DDL</a:t>
+            </a:r>
+            <a:r>
+              <a:rPr lang="en-US" dirty="0" smtClean="0"/>
+              <a:t>: https://technet.microsoft.com/en-US/library/ms190281(v=sql.90).aspx</a:t>
+            </a:r>
+          </a:p>
+          <a:p>
+            <a:r>
+              <a:rPr lang="en-US" dirty="0" err="1" smtClean="0"/>
+              <a:t>DML</a:t>
+            </a:r>
+            <a:r>
+              <a:rPr lang="en-US" dirty="0" smtClean="0"/>
+              <a:t>: https://technet.microsoft.com/en-US/library/ms177591(v=sql.90).aspx</a:t>
+            </a:r>
             <a:endParaRPr lang="en-US" dirty="0"/>
           </a:p>
         </p:txBody>
@@ -6575,7 +6612,7 @@
     </p:spTree>
     <p:extLst>
       <p:ext uri="{BB962C8B-B14F-4D97-AF65-F5344CB8AC3E}">
-        <p14:creationId xmlns:p14="http://schemas.microsoft.com/office/powerpoint/2010/main" val="38883166"/>
+        <p14:creationId xmlns:p14="http://schemas.microsoft.com/office/powerpoint/2010/main" val="3452054573"/>
       </p:ext>
     </p:extLst>
   </p:cSld>
@@ -6627,13 +6664,13 @@
         <p:spPr/>
         <p:txBody>
           <a:bodyPr>
-            <a:normAutofit/>
+            <a:normAutofit fontScale="92500" lnSpcReduction="20000"/>
           </a:bodyPr>
           <a:lstStyle/>
           <a:p>
             <a:r>
               <a:rPr lang="en-US" dirty="0" err="1" smtClean="0"/>
-              <a:t>DML</a:t>
+              <a:t>Strucura</a:t>
             </a:r>
             <a:r>
               <a:rPr lang="en-US" dirty="0" smtClean="0"/>
@@ -6641,40 +6678,412 @@
             </a:r>
             <a:r>
               <a:rPr lang="en-US" dirty="0" err="1" smtClean="0"/>
-              <a:t>si</a:t>
-            </a:r>
+              <a:t>unui</a:t>
+            </a:r>
+            <a:r>
+              <a:rPr lang="en-US" baseline="0" dirty="0" smtClean="0"/>
+              <a:t> program</a:t>
+            </a:r>
+            <a:endParaRPr lang="en-US" dirty="0" smtClean="0"/>
+          </a:p>
+          <a:p>
+            <a:endParaRPr lang="en-US" dirty="0" smtClean="0"/>
+          </a:p>
+          <a:p>
             <a:r>
               <a:rPr lang="en-US" dirty="0" smtClean="0"/>
-              <a:t> </a:t>
-            </a:r>
-            <a:r>
-              <a:rPr lang="en-US" dirty="0" err="1" smtClean="0"/>
-              <a:t>DDL</a:t>
-            </a:r>
-            <a:endParaRPr lang="en-US" dirty="0" smtClean="0"/>
+              <a:t>Scripts</a:t>
+            </a:r>
           </a:p>
           <a:p>
             <a:r>
               <a:rPr lang="en-US" dirty="0" smtClean="0"/>
-              <a:t>Declare </a:t>
-            </a:r>
-          </a:p>
-          <a:p>
-            <a:endParaRPr lang="en-US" dirty="0" smtClean="0"/>
-          </a:p>
-          <a:p>
-            <a:r>
-              <a:rPr lang="en-US" dirty="0" err="1" smtClean="0"/>
-              <a:t>Varibile</a:t>
-            </a:r>
-            <a:r>
-              <a:rPr lang="en-US" baseline="0" dirty="0" smtClean="0"/>
-              <a:t> de tip </a:t>
-            </a:r>
-            <a:r>
-              <a:rPr lang="en-US" baseline="0" dirty="0" err="1" smtClean="0"/>
-              <a:t>tabel</a:t>
-            </a:r>
+              <a:t>---</a:t>
+            </a:r>
+          </a:p>
+          <a:p>
+            <a:r>
+              <a:rPr lang="en-US" dirty="0" smtClean="0"/>
+              <a:t>Variables</a:t>
+            </a:r>
+          </a:p>
+          <a:p>
+            <a:pPr fontAlgn="base"/>
+            <a:r>
+              <a:rPr lang="en-US" sz="1200" b="1" i="0" kern="1200" dirty="0" smtClean="0">
+                <a:solidFill>
+                  <a:schemeClr val="tx1"/>
+                </a:solidFill>
+                <a:effectLst/>
+                <a:latin typeface="+mn-lt"/>
+                <a:ea typeface="+mn-ea"/>
+                <a:cs typeface="+mn-cs"/>
+              </a:rPr>
+              <a:t>Variables</a:t>
+            </a:r>
+            <a:r>
+              <a:rPr lang="en-US" sz="1200" b="0" i="0" kern="1200" dirty="0" smtClean="0">
+                <a:solidFill>
+                  <a:schemeClr val="tx1"/>
+                </a:solidFill>
+                <a:effectLst/>
+                <a:latin typeface="+mn-lt"/>
+                <a:ea typeface="+mn-ea"/>
+                <a:cs typeface="+mn-cs"/>
+              </a:rPr>
+              <a:t> are place holders for data a program might use or manipulate. Variables are given names so that we can assign values to them and refer to them later to read the values. Variables typically store values of a given </a:t>
+            </a:r>
+            <a:r>
+              <a:rPr lang="en-US" sz="1200" b="0" i="1" kern="1200" dirty="0" smtClean="0">
+                <a:solidFill>
+                  <a:schemeClr val="tx1"/>
+                </a:solidFill>
+                <a:effectLst/>
+                <a:latin typeface="+mn-lt"/>
+                <a:ea typeface="+mn-ea"/>
+                <a:cs typeface="+mn-cs"/>
+              </a:rPr>
+              <a:t>type</a:t>
+            </a:r>
+            <a:r>
+              <a:rPr lang="en-US" sz="1200" b="0" i="0" kern="1200" dirty="0" smtClean="0">
+                <a:solidFill>
+                  <a:schemeClr val="tx1"/>
+                </a:solidFill>
+                <a:effectLst/>
+                <a:latin typeface="+mn-lt"/>
+                <a:ea typeface="+mn-ea"/>
+                <a:cs typeface="+mn-cs"/>
+              </a:rPr>
+              <a:t>. Types generally include:</a:t>
+            </a:r>
+          </a:p>
+          <a:p>
+            <a:pPr fontAlgn="base"/>
+            <a:r>
+              <a:rPr lang="en-US" sz="1200" b="0" i="0" kern="1200" dirty="0" smtClean="0">
+                <a:solidFill>
+                  <a:schemeClr val="tx1"/>
+                </a:solidFill>
+                <a:effectLst/>
+                <a:latin typeface="+mn-lt"/>
+                <a:ea typeface="+mn-ea"/>
+                <a:cs typeface="+mn-cs"/>
+              </a:rPr>
+              <a:t>Integer – to store integer or “whole” numbers</a:t>
+            </a:r>
+          </a:p>
+          <a:p>
+            <a:pPr fontAlgn="base"/>
+            <a:r>
+              <a:rPr lang="en-US" sz="1200" b="0" i="0" kern="1200" dirty="0" smtClean="0">
+                <a:solidFill>
+                  <a:schemeClr val="tx1"/>
+                </a:solidFill>
+                <a:effectLst/>
+                <a:latin typeface="+mn-lt"/>
+                <a:ea typeface="+mn-ea"/>
+                <a:cs typeface="+mn-cs"/>
+              </a:rPr>
+              <a:t>Real – to store real or fractional numbers (also called float to indicate a floating point number)</a:t>
+            </a:r>
+          </a:p>
+          <a:p>
+            <a:pPr fontAlgn="base"/>
+            <a:r>
+              <a:rPr lang="en-US" sz="1200" b="0" i="0" kern="1200" dirty="0" smtClean="0">
+                <a:solidFill>
+                  <a:schemeClr val="tx1"/>
+                </a:solidFill>
+                <a:effectLst/>
+                <a:latin typeface="+mn-lt"/>
+                <a:ea typeface="+mn-ea"/>
+                <a:cs typeface="+mn-cs"/>
+              </a:rPr>
+              <a:t>Character – A single character such as a letter of the alphabet or punctuation.</a:t>
+            </a:r>
+          </a:p>
+          <a:p>
+            <a:pPr fontAlgn="base"/>
+            <a:r>
+              <a:rPr lang="en-US" sz="1200" b="0" i="0" kern="1200" dirty="0" smtClean="0">
+                <a:solidFill>
+                  <a:schemeClr val="tx1"/>
+                </a:solidFill>
+                <a:effectLst/>
+                <a:latin typeface="+mn-lt"/>
+                <a:ea typeface="+mn-ea"/>
+                <a:cs typeface="+mn-cs"/>
+              </a:rPr>
+              <a:t>String – A collection of characters</a:t>
+            </a:r>
+          </a:p>
+          <a:p>
+            <a:pPr fontAlgn="base"/>
+            <a:endParaRPr lang="en-US" sz="1200" b="0" i="0" kern="1200" dirty="0" smtClean="0">
+              <a:solidFill>
+                <a:schemeClr val="tx1"/>
+              </a:solidFill>
+              <a:effectLst/>
+              <a:latin typeface="+mn-lt"/>
+              <a:ea typeface="+mn-ea"/>
+              <a:cs typeface="+mn-cs"/>
+            </a:endParaRPr>
+          </a:p>
+          <a:p>
+            <a:pPr fontAlgn="base"/>
+            <a:r>
+              <a:rPr lang="en-US" sz="1200" b="0" i="0" kern="1200" dirty="0" smtClean="0">
+                <a:solidFill>
+                  <a:schemeClr val="tx1"/>
+                </a:solidFill>
+                <a:effectLst/>
+                <a:latin typeface="+mn-lt"/>
+                <a:ea typeface="+mn-ea"/>
+                <a:cs typeface="+mn-cs"/>
+              </a:rPr>
+              <a:t>In </a:t>
+            </a:r>
+            <a:r>
+              <a:rPr lang="en-US" sz="1200" b="0" i="0" u="none" strike="noStrike" kern="1200" dirty="0" smtClean="0">
+                <a:solidFill>
+                  <a:schemeClr val="tx1"/>
+                </a:solidFill>
+                <a:effectLst/>
+                <a:latin typeface="+mn-lt"/>
+                <a:ea typeface="+mn-ea"/>
+                <a:cs typeface="+mn-cs"/>
+                <a:hlinkClick r:id="rId3" tooltip="Computer programming"/>
+              </a:rPr>
+              <a:t>computer programming</a:t>
+            </a:r>
+            <a:r>
+              <a:rPr lang="en-US" sz="1200" b="0" i="0" kern="1200" dirty="0" smtClean="0">
+                <a:solidFill>
+                  <a:schemeClr val="tx1"/>
+                </a:solidFill>
+                <a:effectLst/>
+                <a:latin typeface="+mn-lt"/>
+                <a:ea typeface="+mn-ea"/>
+                <a:cs typeface="+mn-cs"/>
+              </a:rPr>
+              <a:t>, a </a:t>
+            </a:r>
+            <a:r>
+              <a:rPr lang="en-US" sz="1200" b="1" i="0" kern="1200" dirty="0" smtClean="0">
+                <a:solidFill>
+                  <a:schemeClr val="tx1"/>
+                </a:solidFill>
+                <a:effectLst/>
+                <a:latin typeface="+mn-lt"/>
+                <a:ea typeface="+mn-ea"/>
+                <a:cs typeface="+mn-cs"/>
+              </a:rPr>
+              <a:t>variable</a:t>
+            </a:r>
+            <a:r>
+              <a:rPr lang="en-US" sz="1200" b="0" i="0" kern="1200" dirty="0" smtClean="0">
+                <a:solidFill>
+                  <a:schemeClr val="tx1"/>
+                </a:solidFill>
+                <a:effectLst/>
+                <a:latin typeface="+mn-lt"/>
+                <a:ea typeface="+mn-ea"/>
+                <a:cs typeface="+mn-cs"/>
+              </a:rPr>
+              <a:t> is a </a:t>
+            </a:r>
+            <a:r>
+              <a:rPr lang="en-US" sz="1200" b="0" i="0" u="none" strike="noStrike" kern="1200" dirty="0" smtClean="0">
+                <a:solidFill>
+                  <a:schemeClr val="tx1"/>
+                </a:solidFill>
+                <a:effectLst/>
+                <a:latin typeface="+mn-lt"/>
+                <a:ea typeface="+mn-ea"/>
+                <a:cs typeface="+mn-cs"/>
+                <a:hlinkClick r:id="rId4" tooltip="Memory location"/>
+              </a:rPr>
+              <a:t>storage location</a:t>
+            </a:r>
+            <a:r>
+              <a:rPr lang="en-US" sz="1200" b="0" i="0" kern="1200" dirty="0" smtClean="0">
+                <a:solidFill>
+                  <a:schemeClr val="tx1"/>
+                </a:solidFill>
+                <a:effectLst/>
+                <a:latin typeface="+mn-lt"/>
+                <a:ea typeface="+mn-ea"/>
+                <a:cs typeface="+mn-cs"/>
+              </a:rPr>
+              <a:t> and an associated </a:t>
+            </a:r>
+            <a:r>
+              <a:rPr lang="en-US" sz="1200" b="0" i="0" u="none" strike="noStrike" kern="1200" dirty="0" smtClean="0">
+                <a:solidFill>
+                  <a:schemeClr val="tx1"/>
+                </a:solidFill>
+                <a:effectLst/>
+                <a:latin typeface="+mn-lt"/>
+                <a:ea typeface="+mn-ea"/>
+                <a:cs typeface="+mn-cs"/>
+                <a:hlinkClick r:id="rId5" tooltip="Symbol"/>
+              </a:rPr>
+              <a:t>symbolic name</a:t>
+            </a:r>
+            <a:r>
+              <a:rPr lang="en-US" sz="1200" b="0" i="0" kern="1200" dirty="0" smtClean="0">
+                <a:solidFill>
+                  <a:schemeClr val="tx1"/>
+                </a:solidFill>
+                <a:effectLst/>
+                <a:latin typeface="+mn-lt"/>
+                <a:ea typeface="+mn-ea"/>
+                <a:cs typeface="+mn-cs"/>
+              </a:rPr>
+              <a:t> which contains some known or unknown quantity or information, a </a:t>
+            </a:r>
+            <a:r>
+              <a:rPr lang="en-US" sz="1200" b="0" i="0" u="none" strike="noStrike" kern="1200" dirty="0" smtClean="0">
+                <a:solidFill>
+                  <a:schemeClr val="tx1"/>
+                </a:solidFill>
+                <a:effectLst/>
+                <a:latin typeface="+mn-lt"/>
+                <a:ea typeface="+mn-ea"/>
+                <a:cs typeface="+mn-cs"/>
+                <a:hlinkClick r:id="rId6" tooltip="Value (computer science)"/>
+              </a:rPr>
+              <a:t>value</a:t>
+            </a:r>
+            <a:r>
+              <a:rPr lang="en-US" sz="1200" b="0" i="0" kern="1200" dirty="0" smtClean="0">
+                <a:solidFill>
+                  <a:schemeClr val="tx1"/>
+                </a:solidFill>
+                <a:effectLst/>
+                <a:latin typeface="+mn-lt"/>
+                <a:ea typeface="+mn-ea"/>
+                <a:cs typeface="+mn-cs"/>
+              </a:rPr>
+              <a:t>.</a:t>
+            </a:r>
+          </a:p>
+          <a:p>
+            <a:pPr fontAlgn="base"/>
+            <a:endParaRPr lang="en-US" sz="1200" b="0" i="0" kern="1200" dirty="0" smtClean="0">
+              <a:solidFill>
+                <a:schemeClr val="tx1"/>
+              </a:solidFill>
+              <a:effectLst/>
+              <a:latin typeface="+mn-lt"/>
+              <a:ea typeface="+mn-ea"/>
+              <a:cs typeface="+mn-cs"/>
+            </a:endParaRPr>
+          </a:p>
+          <a:p>
+            <a:pPr fontAlgn="base"/>
+            <a:r>
+              <a:rPr lang="en-US" sz="1200" b="1" i="0" kern="1200" dirty="0" smtClean="0">
+                <a:solidFill>
+                  <a:schemeClr val="tx1"/>
+                </a:solidFill>
+                <a:effectLst/>
+                <a:latin typeface="+mn-lt"/>
+                <a:ea typeface="+mn-ea"/>
+                <a:cs typeface="+mn-cs"/>
+              </a:rPr>
+              <a:t>Operators</a:t>
+            </a:r>
+          </a:p>
+          <a:p>
+            <a:pPr fontAlgn="base"/>
+            <a:r>
+              <a:rPr lang="en-US" sz="1200" b="0" i="0" kern="1200" dirty="0" smtClean="0">
+                <a:solidFill>
+                  <a:schemeClr val="tx1"/>
+                </a:solidFill>
+                <a:effectLst/>
+                <a:latin typeface="+mn-lt"/>
+                <a:ea typeface="+mn-ea"/>
+                <a:cs typeface="+mn-cs"/>
+              </a:rPr>
+              <a:t>Boolean are three Boolean operators: AND, OR and NOT. These operators are written differently depending on the language being used.</a:t>
+            </a:r>
+          </a:p>
+          <a:p>
+            <a:pPr fontAlgn="base"/>
+            <a:endParaRPr lang="en-US" sz="1200" b="1" i="0" kern="1200" dirty="0" smtClean="0">
+              <a:solidFill>
+                <a:schemeClr val="tx1"/>
+              </a:solidFill>
+              <a:effectLst/>
+              <a:latin typeface="+mn-lt"/>
+              <a:ea typeface="+mn-ea"/>
+              <a:cs typeface="+mn-cs"/>
+            </a:endParaRPr>
+          </a:p>
+          <a:p>
+            <a:pPr fontAlgn="base"/>
+            <a:r>
+              <a:rPr lang="en-US" sz="1200" b="1" i="0" kern="1200" dirty="0" smtClean="0">
+                <a:solidFill>
+                  <a:schemeClr val="tx1"/>
+                </a:solidFill>
+                <a:effectLst/>
+                <a:latin typeface="+mn-lt"/>
+                <a:ea typeface="+mn-ea"/>
+                <a:cs typeface="+mn-cs"/>
+              </a:rPr>
+              <a:t>Comparison</a:t>
+            </a:r>
+            <a:r>
+              <a:rPr lang="en-US" sz="1200" b="1" i="0" kern="1200" baseline="0" dirty="0" smtClean="0">
+                <a:solidFill>
+                  <a:schemeClr val="tx1"/>
+                </a:solidFill>
+                <a:effectLst/>
+                <a:latin typeface="+mn-lt"/>
+                <a:ea typeface="+mn-ea"/>
+                <a:cs typeface="+mn-cs"/>
+              </a:rPr>
+              <a:t> operators</a:t>
+            </a:r>
+          </a:p>
+          <a:p>
+            <a:pPr fontAlgn="base"/>
+            <a:r>
+              <a:rPr lang="en-US" sz="1200" b="0" i="0" kern="1200" dirty="0" smtClean="0">
+                <a:solidFill>
+                  <a:schemeClr val="tx1"/>
+                </a:solidFill>
+                <a:effectLst/>
+                <a:latin typeface="+mn-lt"/>
+                <a:ea typeface="+mn-ea"/>
+                <a:cs typeface="+mn-cs"/>
+              </a:rPr>
+              <a:t>Boolean expressions often involve comparison operators that can be evaluated to determine if they are True or False.</a:t>
+            </a:r>
+          </a:p>
+          <a:p>
+            <a:r>
+              <a:rPr lang="en-US" dirty="0" smtClean="0"/>
+              <a:t>Constants</a:t>
+            </a:r>
+          </a:p>
+          <a:p>
+            <a:r>
+              <a:rPr lang="en-US" dirty="0" smtClean="0"/>
+              <a:t>--</a:t>
+            </a:r>
+          </a:p>
+          <a:p>
+            <a:r>
+              <a:rPr lang="en-US" dirty="0" smtClean="0"/>
+              <a:t>Statements</a:t>
+            </a:r>
+          </a:p>
+          <a:p>
             <a:endParaRPr lang="en-US" dirty="0" smtClean="0"/>
           </a:p>
         </p:txBody>
@@ -6706,7 +7115,7 @@
     </p:spTree>
     <p:extLst>
       <p:ext uri="{BB962C8B-B14F-4D97-AF65-F5344CB8AC3E}">
-        <p14:creationId xmlns:p14="http://schemas.microsoft.com/office/powerpoint/2010/main" val="1401794392"/>
+        <p14:creationId xmlns:p14="http://schemas.microsoft.com/office/powerpoint/2010/main" val="3193769175"/>
       </p:ext>
     </p:extLst>
   </p:cSld>
@@ -6762,43 +7171,6 @@
           </a:bodyPr>
           <a:lstStyle/>
           <a:p>
-            <a:r>
-              <a:rPr lang="en-US" dirty="0" err="1" smtClean="0"/>
-              <a:t>https://msdn.microsoft.com/en-us/library/bb510741.aspx</a:t>
-            </a:r>
-            <a:endParaRPr lang="en-US" dirty="0" smtClean="0"/>
-          </a:p>
-          <a:p>
-            <a:endParaRPr lang="en-US" dirty="0" smtClean="0"/>
-          </a:p>
-          <a:p>
-            <a:r>
-              <a:rPr lang="en-US" dirty="0" smtClean="0"/>
-              <a:t>https://technet.microsoft.com/en-us/library/ms166026(v=sql.90).aspx</a:t>
-            </a:r>
-          </a:p>
-          <a:p>
-            <a:endParaRPr lang="en-US" dirty="0" smtClean="0"/>
-          </a:p>
-          <a:p>
-            <a:r>
-              <a:rPr lang="en-US" dirty="0" err="1" smtClean="0"/>
-              <a:t>DDL</a:t>
-            </a:r>
-            <a:r>
-              <a:rPr lang="en-US" dirty="0" smtClean="0"/>
-              <a:t>: https://technet.microsoft.com/en-US/library/ms190281(v=sql.90).aspx</a:t>
-            </a:r>
-          </a:p>
-          <a:p>
-            <a:r>
-              <a:rPr lang="en-US" dirty="0" err="1" smtClean="0"/>
-              <a:t>DML</a:t>
-            </a:r>
-            <a:r>
-              <a:rPr lang="en-US" dirty="0" smtClean="0"/>
-              <a:t>: https://technet.microsoft.com/en-US/library/ms177591(v=sql.90).aspx</a:t>
-            </a:r>
             <a:endParaRPr lang="en-US" dirty="0"/>
           </a:p>
         </p:txBody>
@@ -6830,7 +7202,7 @@
     </p:spTree>
     <p:extLst>
       <p:ext uri="{BB962C8B-B14F-4D97-AF65-F5344CB8AC3E}">
-        <p14:creationId xmlns:p14="http://schemas.microsoft.com/office/powerpoint/2010/main" val="3452054573"/>
+        <p14:creationId xmlns:p14="http://schemas.microsoft.com/office/powerpoint/2010/main" val="38883166"/>
       </p:ext>
     </p:extLst>
   </p:cSld>
@@ -6882,13 +7254,13 @@
         <p:spPr/>
         <p:txBody>
           <a:bodyPr>
-            <a:normAutofit fontScale="92500" lnSpcReduction="20000"/>
+            <a:normAutofit/>
           </a:bodyPr>
           <a:lstStyle/>
           <a:p>
             <a:r>
               <a:rPr lang="en-US" dirty="0" err="1" smtClean="0"/>
-              <a:t>Strucura</a:t>
+              <a:t>DML</a:t>
             </a:r>
             <a:r>
               <a:rPr lang="en-US" dirty="0" smtClean="0"/>
@@ -6896,412 +7268,40 @@
             </a:r>
             <a:r>
               <a:rPr lang="en-US" dirty="0" err="1" smtClean="0"/>
-              <a:t>unui</a:t>
-            </a:r>
-            <a:r>
-              <a:rPr lang="en-US" baseline="0" dirty="0" smtClean="0"/>
-              <a:t> program</a:t>
+              <a:t>si</a:t>
+            </a:r>
+            <a:r>
+              <a:rPr lang="en-US" dirty="0" smtClean="0"/>
+              <a:t> </a:t>
+            </a:r>
+            <a:r>
+              <a:rPr lang="en-US" dirty="0" err="1" smtClean="0"/>
+              <a:t>DDL</a:t>
             </a:r>
             <a:endParaRPr lang="en-US" dirty="0" smtClean="0"/>
           </a:p>
           <a:p>
+            <a:r>
+              <a:rPr lang="en-US" dirty="0" smtClean="0"/>
+              <a:t>Declare </a:t>
+            </a:r>
+          </a:p>
+          <a:p>
             <a:endParaRPr lang="en-US" dirty="0" smtClean="0"/>
           </a:p>
           <a:p>
             <a:r>
-              <a:rPr lang="en-US" dirty="0" smtClean="0"/>
-              <a:t>Scripts</a:t>
-            </a:r>
-          </a:p>
-          <a:p>
-            <a:r>
-              <a:rPr lang="en-US" dirty="0" smtClean="0"/>
-              <a:t>---</a:t>
-            </a:r>
-          </a:p>
-          <a:p>
-            <a:r>
-              <a:rPr lang="en-US" dirty="0" smtClean="0"/>
-              <a:t>Variables</a:t>
-            </a:r>
-          </a:p>
-          <a:p>
-            <a:pPr fontAlgn="base"/>
-            <a:r>
-              <a:rPr lang="en-US" sz="1200" b="1" i="0" kern="1200" dirty="0" smtClean="0">
-                <a:solidFill>
-                  <a:schemeClr val="tx1"/>
-                </a:solidFill>
-                <a:effectLst/>
-                <a:latin typeface="+mn-lt"/>
-                <a:ea typeface="+mn-ea"/>
-                <a:cs typeface="+mn-cs"/>
-              </a:rPr>
-              <a:t>Variables</a:t>
-            </a:r>
-            <a:r>
-              <a:rPr lang="en-US" sz="1200" b="0" i="0" kern="1200" dirty="0" smtClean="0">
-                <a:solidFill>
-                  <a:schemeClr val="tx1"/>
-                </a:solidFill>
-                <a:effectLst/>
-                <a:latin typeface="+mn-lt"/>
-                <a:ea typeface="+mn-ea"/>
-                <a:cs typeface="+mn-cs"/>
-              </a:rPr>
-              <a:t> are place holders for data a program might use or manipulate. Variables are given names so that we can assign values to them and refer to them later to read the values. Variables typically store values of a given </a:t>
-            </a:r>
-            <a:r>
-              <a:rPr lang="en-US" sz="1200" b="0" i="1" kern="1200" dirty="0" smtClean="0">
-                <a:solidFill>
-                  <a:schemeClr val="tx1"/>
-                </a:solidFill>
-                <a:effectLst/>
-                <a:latin typeface="+mn-lt"/>
-                <a:ea typeface="+mn-ea"/>
-                <a:cs typeface="+mn-cs"/>
-              </a:rPr>
-              <a:t>type</a:t>
-            </a:r>
-            <a:r>
-              <a:rPr lang="en-US" sz="1200" b="0" i="0" kern="1200" dirty="0" smtClean="0">
-                <a:solidFill>
-                  <a:schemeClr val="tx1"/>
-                </a:solidFill>
-                <a:effectLst/>
-                <a:latin typeface="+mn-lt"/>
-                <a:ea typeface="+mn-ea"/>
-                <a:cs typeface="+mn-cs"/>
-              </a:rPr>
-              <a:t>. Types generally include:</a:t>
-            </a:r>
-          </a:p>
-          <a:p>
-            <a:pPr fontAlgn="base"/>
-            <a:r>
-              <a:rPr lang="en-US" sz="1200" b="0" i="0" kern="1200" dirty="0" smtClean="0">
-                <a:solidFill>
-                  <a:schemeClr val="tx1"/>
-                </a:solidFill>
-                <a:effectLst/>
-                <a:latin typeface="+mn-lt"/>
-                <a:ea typeface="+mn-ea"/>
-                <a:cs typeface="+mn-cs"/>
-              </a:rPr>
-              <a:t>Integer – to store integer or “whole” numbers</a:t>
-            </a:r>
-          </a:p>
-          <a:p>
-            <a:pPr fontAlgn="base"/>
-            <a:r>
-              <a:rPr lang="en-US" sz="1200" b="0" i="0" kern="1200" dirty="0" smtClean="0">
-                <a:solidFill>
-                  <a:schemeClr val="tx1"/>
-                </a:solidFill>
-                <a:effectLst/>
-                <a:latin typeface="+mn-lt"/>
-                <a:ea typeface="+mn-ea"/>
-                <a:cs typeface="+mn-cs"/>
-              </a:rPr>
-              <a:t>Real – to store real or fractional numbers (also called float to indicate a floating point number)</a:t>
-            </a:r>
-          </a:p>
-          <a:p>
-            <a:pPr fontAlgn="base"/>
-            <a:r>
-              <a:rPr lang="en-US" sz="1200" b="0" i="0" kern="1200" dirty="0" smtClean="0">
-                <a:solidFill>
-                  <a:schemeClr val="tx1"/>
-                </a:solidFill>
-                <a:effectLst/>
-                <a:latin typeface="+mn-lt"/>
-                <a:ea typeface="+mn-ea"/>
-                <a:cs typeface="+mn-cs"/>
-              </a:rPr>
-              <a:t>Character – A single character such as a letter of the alphabet or punctuation.</a:t>
-            </a:r>
-          </a:p>
-          <a:p>
-            <a:pPr fontAlgn="base"/>
-            <a:r>
-              <a:rPr lang="en-US" sz="1200" b="0" i="0" kern="1200" dirty="0" smtClean="0">
-                <a:solidFill>
-                  <a:schemeClr val="tx1"/>
-                </a:solidFill>
-                <a:effectLst/>
-                <a:latin typeface="+mn-lt"/>
-                <a:ea typeface="+mn-ea"/>
-                <a:cs typeface="+mn-cs"/>
-              </a:rPr>
-              <a:t>String – A collection of characters</a:t>
-            </a:r>
-          </a:p>
-          <a:p>
-            <a:pPr fontAlgn="base"/>
-            <a:endParaRPr lang="en-US" sz="1200" b="0" i="0" kern="1200" dirty="0" smtClean="0">
-              <a:solidFill>
-                <a:schemeClr val="tx1"/>
-              </a:solidFill>
-              <a:effectLst/>
-              <a:latin typeface="+mn-lt"/>
-              <a:ea typeface="+mn-ea"/>
-              <a:cs typeface="+mn-cs"/>
-            </a:endParaRPr>
-          </a:p>
-          <a:p>
-            <a:pPr fontAlgn="base"/>
-            <a:r>
-              <a:rPr lang="en-US" sz="1200" b="0" i="0" kern="1200" dirty="0" smtClean="0">
-                <a:solidFill>
-                  <a:schemeClr val="tx1"/>
-                </a:solidFill>
-                <a:effectLst/>
-                <a:latin typeface="+mn-lt"/>
-                <a:ea typeface="+mn-ea"/>
-                <a:cs typeface="+mn-cs"/>
-              </a:rPr>
-              <a:t>In </a:t>
-            </a:r>
-            <a:r>
-              <a:rPr lang="en-US" sz="1200" b="0" i="0" u="none" strike="noStrike" kern="1200" dirty="0" smtClean="0">
-                <a:solidFill>
-                  <a:schemeClr val="tx1"/>
-                </a:solidFill>
-                <a:effectLst/>
-                <a:latin typeface="+mn-lt"/>
-                <a:ea typeface="+mn-ea"/>
-                <a:cs typeface="+mn-cs"/>
-                <a:hlinkClick r:id="rId3" tooltip="Computer programming"/>
-              </a:rPr>
-              <a:t>computer programming</a:t>
-            </a:r>
-            <a:r>
-              <a:rPr lang="en-US" sz="1200" b="0" i="0" kern="1200" dirty="0" smtClean="0">
-                <a:solidFill>
-                  <a:schemeClr val="tx1"/>
-                </a:solidFill>
-                <a:effectLst/>
-                <a:latin typeface="+mn-lt"/>
-                <a:ea typeface="+mn-ea"/>
-                <a:cs typeface="+mn-cs"/>
-              </a:rPr>
-              <a:t>, a </a:t>
-            </a:r>
-            <a:r>
-              <a:rPr lang="en-US" sz="1200" b="1" i="0" kern="1200" dirty="0" smtClean="0">
-                <a:solidFill>
-                  <a:schemeClr val="tx1"/>
-                </a:solidFill>
-                <a:effectLst/>
-                <a:latin typeface="+mn-lt"/>
-                <a:ea typeface="+mn-ea"/>
-                <a:cs typeface="+mn-cs"/>
-              </a:rPr>
-              <a:t>variable</a:t>
-            </a:r>
-            <a:r>
-              <a:rPr lang="en-US" sz="1200" b="0" i="0" kern="1200" dirty="0" smtClean="0">
-                <a:solidFill>
-                  <a:schemeClr val="tx1"/>
-                </a:solidFill>
-                <a:effectLst/>
-                <a:latin typeface="+mn-lt"/>
-                <a:ea typeface="+mn-ea"/>
-                <a:cs typeface="+mn-cs"/>
-              </a:rPr>
-              <a:t> is a </a:t>
-            </a:r>
-            <a:r>
-              <a:rPr lang="en-US" sz="1200" b="0" i="0" u="none" strike="noStrike" kern="1200" dirty="0" smtClean="0">
-                <a:solidFill>
-                  <a:schemeClr val="tx1"/>
-                </a:solidFill>
-                <a:effectLst/>
-                <a:latin typeface="+mn-lt"/>
-                <a:ea typeface="+mn-ea"/>
-                <a:cs typeface="+mn-cs"/>
-                <a:hlinkClick r:id="rId4" tooltip="Memory location"/>
-              </a:rPr>
-              <a:t>storage location</a:t>
-            </a:r>
-            <a:r>
-              <a:rPr lang="en-US" sz="1200" b="0" i="0" kern="1200" dirty="0" smtClean="0">
-                <a:solidFill>
-                  <a:schemeClr val="tx1"/>
-                </a:solidFill>
-                <a:effectLst/>
-                <a:latin typeface="+mn-lt"/>
-                <a:ea typeface="+mn-ea"/>
-                <a:cs typeface="+mn-cs"/>
-              </a:rPr>
-              <a:t> and an associated </a:t>
-            </a:r>
-            <a:r>
-              <a:rPr lang="en-US" sz="1200" b="0" i="0" u="none" strike="noStrike" kern="1200" dirty="0" smtClean="0">
-                <a:solidFill>
-                  <a:schemeClr val="tx1"/>
-                </a:solidFill>
-                <a:effectLst/>
-                <a:latin typeface="+mn-lt"/>
-                <a:ea typeface="+mn-ea"/>
-                <a:cs typeface="+mn-cs"/>
-                <a:hlinkClick r:id="rId5" tooltip="Symbol"/>
-              </a:rPr>
-              <a:t>symbolic name</a:t>
-            </a:r>
-            <a:r>
-              <a:rPr lang="en-US" sz="1200" b="0" i="0" kern="1200" dirty="0" smtClean="0">
-                <a:solidFill>
-                  <a:schemeClr val="tx1"/>
-                </a:solidFill>
-                <a:effectLst/>
-                <a:latin typeface="+mn-lt"/>
-                <a:ea typeface="+mn-ea"/>
-                <a:cs typeface="+mn-cs"/>
-              </a:rPr>
-              <a:t> which contains some known or unknown quantity or information, a </a:t>
-            </a:r>
-            <a:r>
-              <a:rPr lang="en-US" sz="1200" b="0" i="0" u="none" strike="noStrike" kern="1200" dirty="0" smtClean="0">
-                <a:solidFill>
-                  <a:schemeClr val="tx1"/>
-                </a:solidFill>
-                <a:effectLst/>
-                <a:latin typeface="+mn-lt"/>
-                <a:ea typeface="+mn-ea"/>
-                <a:cs typeface="+mn-cs"/>
-                <a:hlinkClick r:id="rId6" tooltip="Value (computer science)"/>
-              </a:rPr>
-              <a:t>value</a:t>
-            </a:r>
-            <a:r>
-              <a:rPr lang="en-US" sz="1200" b="0" i="0" kern="1200" dirty="0" smtClean="0">
-                <a:solidFill>
-                  <a:schemeClr val="tx1"/>
-                </a:solidFill>
-                <a:effectLst/>
-                <a:latin typeface="+mn-lt"/>
-                <a:ea typeface="+mn-ea"/>
-                <a:cs typeface="+mn-cs"/>
-              </a:rPr>
-              <a:t>.</a:t>
-            </a:r>
-          </a:p>
-          <a:p>
-            <a:pPr fontAlgn="base"/>
-            <a:endParaRPr lang="en-US" sz="1200" b="0" i="0" kern="1200" dirty="0" smtClean="0">
-              <a:solidFill>
-                <a:schemeClr val="tx1"/>
-              </a:solidFill>
-              <a:effectLst/>
-              <a:latin typeface="+mn-lt"/>
-              <a:ea typeface="+mn-ea"/>
-              <a:cs typeface="+mn-cs"/>
-            </a:endParaRPr>
-          </a:p>
-          <a:p>
-            <a:pPr fontAlgn="base"/>
-            <a:r>
-              <a:rPr lang="en-US" sz="1200" b="1" i="0" kern="1200" dirty="0" smtClean="0">
-                <a:solidFill>
-                  <a:schemeClr val="tx1"/>
-                </a:solidFill>
-                <a:effectLst/>
-                <a:latin typeface="+mn-lt"/>
-                <a:ea typeface="+mn-ea"/>
-                <a:cs typeface="+mn-cs"/>
-              </a:rPr>
-              <a:t>Operators</a:t>
-            </a:r>
-          </a:p>
-          <a:p>
-            <a:pPr fontAlgn="base"/>
-            <a:r>
-              <a:rPr lang="en-US" sz="1200" b="0" i="0" kern="1200" dirty="0" smtClean="0">
-                <a:solidFill>
-                  <a:schemeClr val="tx1"/>
-                </a:solidFill>
-                <a:effectLst/>
-                <a:latin typeface="+mn-lt"/>
-                <a:ea typeface="+mn-ea"/>
-                <a:cs typeface="+mn-cs"/>
-              </a:rPr>
-              <a:t>Boolean are three Boolean operators: AND, OR and NOT. These operators are written differently depending on the language being used.</a:t>
-            </a:r>
-          </a:p>
-          <a:p>
-            <a:pPr fontAlgn="base"/>
-            <a:endParaRPr lang="en-US" sz="1200" b="1" i="0" kern="1200" dirty="0" smtClean="0">
-              <a:solidFill>
-                <a:schemeClr val="tx1"/>
-              </a:solidFill>
-              <a:effectLst/>
-              <a:latin typeface="+mn-lt"/>
-              <a:ea typeface="+mn-ea"/>
-              <a:cs typeface="+mn-cs"/>
-            </a:endParaRPr>
-          </a:p>
-          <a:p>
-            <a:pPr fontAlgn="base"/>
-            <a:r>
-              <a:rPr lang="en-US" sz="1200" b="1" i="0" kern="1200" dirty="0" smtClean="0">
-                <a:solidFill>
-                  <a:schemeClr val="tx1"/>
-                </a:solidFill>
-                <a:effectLst/>
-                <a:latin typeface="+mn-lt"/>
-                <a:ea typeface="+mn-ea"/>
-                <a:cs typeface="+mn-cs"/>
-              </a:rPr>
-              <a:t>Comparison</a:t>
-            </a:r>
-            <a:r>
-              <a:rPr lang="en-US" sz="1200" b="1" i="0" kern="1200" baseline="0" dirty="0" smtClean="0">
-                <a:solidFill>
-                  <a:schemeClr val="tx1"/>
-                </a:solidFill>
-                <a:effectLst/>
-                <a:latin typeface="+mn-lt"/>
-                <a:ea typeface="+mn-ea"/>
-                <a:cs typeface="+mn-cs"/>
-              </a:rPr>
-              <a:t> operators</a:t>
-            </a:r>
-          </a:p>
-          <a:p>
-            <a:pPr fontAlgn="base"/>
-            <a:r>
-              <a:rPr lang="en-US" sz="1200" b="0" i="0" kern="1200" dirty="0" smtClean="0">
-                <a:solidFill>
-                  <a:schemeClr val="tx1"/>
-                </a:solidFill>
-                <a:effectLst/>
-                <a:latin typeface="+mn-lt"/>
-                <a:ea typeface="+mn-ea"/>
-                <a:cs typeface="+mn-cs"/>
-              </a:rPr>
-              <a:t>Boolean expressions often involve comparison operators that can be evaluated to determine if they are True or False.</a:t>
-            </a:r>
-          </a:p>
-          <a:p>
-            <a:r>
-              <a:rPr lang="en-US" dirty="0" smtClean="0"/>
-              <a:t>Constants</a:t>
-            </a:r>
-          </a:p>
-          <a:p>
-            <a:r>
-              <a:rPr lang="en-US" dirty="0" smtClean="0"/>
-              <a:t>--</a:t>
-            </a:r>
-          </a:p>
-          <a:p>
-            <a:r>
-              <a:rPr lang="en-US" dirty="0" smtClean="0"/>
-              <a:t>Statements</a:t>
-            </a:r>
-          </a:p>
-          <a:p>
+              <a:rPr lang="en-US" dirty="0" err="1" smtClean="0"/>
+              <a:t>Varibile</a:t>
+            </a:r>
+            <a:r>
+              <a:rPr lang="en-US" baseline="0" dirty="0" smtClean="0"/>
+              <a:t> de tip </a:t>
+            </a:r>
+            <a:r>
+              <a:rPr lang="en-US" baseline="0" dirty="0" err="1" smtClean="0"/>
+              <a:t>tabel</a:t>
+            </a:r>
             <a:endParaRPr lang="en-US" dirty="0" smtClean="0"/>
           </a:p>
         </p:txBody>
@@ -7333,7 +7333,7 @@
     </p:spTree>
     <p:extLst>
       <p:ext uri="{BB962C8B-B14F-4D97-AF65-F5344CB8AC3E}">
-        <p14:creationId xmlns:p14="http://schemas.microsoft.com/office/powerpoint/2010/main" val="3193769175"/>
+        <p14:creationId xmlns:p14="http://schemas.microsoft.com/office/powerpoint/2010/main" val="1401794392"/>
       </p:ext>
     </p:extLst>
   </p:cSld>
@@ -8197,8 +8197,22 @@
           <a:p>
             <a:r>
               <a:rPr lang="en-US" baseline="0" dirty="0" smtClean="0"/>
-              <a:t>Topics: allow functions on select clause</a:t>
-            </a:r>
+              <a:t>Topics: allow functions on select </a:t>
+            </a:r>
+            <a:r>
+              <a:rPr lang="en-US" baseline="0" dirty="0" smtClean="0"/>
+              <a:t>clause</a:t>
+            </a:r>
+          </a:p>
+          <a:p>
+            <a:endParaRPr lang="en-US" baseline="0" dirty="0" smtClean="0"/>
+          </a:p>
+          <a:p>
+            <a:r>
+              <a:rPr lang="en-US" baseline="0" dirty="0" smtClean="0"/>
+              <a:t>https://msdn.microsoft.com/en-us/library/ms189499.aspx</a:t>
+            </a:r>
+            <a:endParaRPr lang="en-US" baseline="0" dirty="0" smtClean="0"/>
           </a:p>
           <a:p>
             <a:endParaRPr lang="en-US" baseline="0" dirty="0" smtClean="0"/>
@@ -10043,6 +10057,95 @@
           </a:bodyPr>
           <a:lstStyle/>
           <a:p>
+            <a:r>
+              <a:rPr lang="en-US" dirty="0" smtClean="0"/>
+              <a:t>Topics:</a:t>
+            </a:r>
+          </a:p>
+          <a:p>
+            <a:r>
+              <a:rPr lang="en-US" dirty="0" smtClean="0"/>
+              <a:t>	what</a:t>
+            </a:r>
+            <a:r>
+              <a:rPr lang="en-US" baseline="0" dirty="0" smtClean="0"/>
+              <a:t> is a group</a:t>
+            </a:r>
+          </a:p>
+          <a:p>
+            <a:r>
+              <a:rPr lang="en-US" baseline="0" dirty="0" smtClean="0"/>
+              <a:t>	aggregate functions in </a:t>
+            </a:r>
+            <a:r>
+              <a:rPr lang="en-US" baseline="0" dirty="0" err="1" smtClean="0"/>
+              <a:t>conjuction</a:t>
+            </a:r>
+            <a:r>
+              <a:rPr lang="en-US" baseline="0" dirty="0" smtClean="0"/>
+              <a:t> with groups</a:t>
+            </a:r>
+          </a:p>
+          <a:p>
+            <a:r>
+              <a:rPr lang="en-US" baseline="0" dirty="0" smtClean="0"/>
+              <a:t>	</a:t>
+            </a:r>
+            <a:r>
+              <a:rPr lang="en-US" dirty="0" smtClean="0"/>
+              <a:t>Aggregate functions in the SELECT clause &lt;select&gt; list provide information about each group instead of individual rows</a:t>
+            </a:r>
+            <a:endParaRPr lang="en-US" baseline="0" dirty="0" smtClean="0"/>
+          </a:p>
+          <a:p>
+            <a:r>
+              <a:rPr lang="en-US" baseline="0" dirty="0" smtClean="0"/>
+              <a:t>	only one group by, multiple groups (trailing group by)</a:t>
+            </a:r>
+          </a:p>
+          <a:p>
+            <a:r>
+              <a:rPr lang="en-US" baseline="0" dirty="0" smtClean="0"/>
+              <a:t>	syntax</a:t>
+            </a:r>
+          </a:p>
+          <a:p>
+            <a:endParaRPr lang="en-US" baseline="0" dirty="0" smtClean="0"/>
+          </a:p>
+          <a:p>
+            <a:r>
+              <a:rPr lang="en-US" baseline="0" dirty="0" smtClean="0"/>
+              <a:t>Sample from scripts</a:t>
+            </a:r>
+            <a:endParaRPr lang="en-US" dirty="0" smtClean="0"/>
+          </a:p>
+          <a:p>
+            <a:r>
+              <a:rPr lang="en-US" dirty="0" smtClean="0"/>
+              <a:t>	</a:t>
+            </a:r>
+          </a:p>
+          <a:p>
+            <a:r>
+              <a:rPr lang="en-US" dirty="0" err="1" smtClean="0"/>
+              <a:t>Bol</a:t>
+            </a:r>
+            <a:r>
+              <a:rPr lang="en-US" baseline="0" dirty="0" smtClean="0"/>
+              <a:t> link: </a:t>
+            </a:r>
+          </a:p>
+          <a:p>
+            <a:r>
+              <a:rPr lang="en-US" baseline="0" dirty="0" smtClean="0"/>
+              <a:t>	https://msdn.microsoft.com/en-us/library/ms177673.aspx</a:t>
+            </a:r>
+          </a:p>
+          <a:p>
+            <a:r>
+              <a:rPr lang="en-US" baseline="0" dirty="0" smtClean="0"/>
+              <a:t>	https://msdn.microsoft.com/en-us/library/ms173454.aspx (aggregate functions0</a:t>
+            </a:r>
             <a:endParaRPr lang="en-US" dirty="0"/>
           </a:p>
         </p:txBody>
@@ -10074,7 +10177,7 @@
     </p:spTree>
     <p:extLst>
       <p:ext uri="{BB962C8B-B14F-4D97-AF65-F5344CB8AC3E}">
-        <p14:creationId xmlns:p14="http://schemas.microsoft.com/office/powerpoint/2010/main" val="228680557"/>
+        <p14:creationId xmlns:p14="http://schemas.microsoft.com/office/powerpoint/2010/main" val="1051086592"/>
       </p:ext>
     </p:extLst>
   </p:cSld>
@@ -10132,95 +10235,43 @@
           <a:p>
             <a:r>
               <a:rPr lang="en-US" dirty="0" smtClean="0"/>
-              <a:t>Topics:</a:t>
-            </a:r>
-          </a:p>
-          <a:p>
-            <a:r>
-              <a:rPr lang="en-US" dirty="0" smtClean="0"/>
-              <a:t>	purpose: showing date from</a:t>
-            </a:r>
-            <a:r>
-              <a:rPr lang="en-US" baseline="0" dirty="0" smtClean="0"/>
-              <a:t> multiple tables</a:t>
+              <a:t>Topics</a:t>
+            </a:r>
+            <a:r>
+              <a:rPr lang="en-US" baseline="0" dirty="0" smtClean="0"/>
+              <a:t> : </a:t>
+            </a:r>
+          </a:p>
+          <a:p>
+            <a:r>
+              <a:rPr lang="en-US" baseline="0" dirty="0" smtClean="0"/>
+              <a:t>	filter for groups</a:t>
+            </a:r>
+          </a:p>
+          <a:p>
+            <a:r>
+              <a:rPr lang="en-US" baseline="0" dirty="0" smtClean="0"/>
+              <a:t>	syntax</a:t>
             </a:r>
             <a:endParaRPr lang="en-US" dirty="0" smtClean="0"/>
           </a:p>
           <a:p>
-            <a:r>
-              <a:rPr lang="en-US" baseline="0" dirty="0" smtClean="0"/>
-              <a:t>         	mainly used types of join</a:t>
-            </a:r>
-          </a:p>
-          <a:p>
-            <a:r>
-              <a:rPr lang="en-US" dirty="0" smtClean="0"/>
-              <a:t>	Join conditions can be specified in either the FROM or WHERE clauses</a:t>
-            </a:r>
-          </a:p>
-          <a:p>
-            <a:r>
-              <a:rPr lang="en-US" baseline="0" dirty="0" smtClean="0"/>
-              <a:t>	limit on join???</a:t>
-            </a:r>
-          </a:p>
-          <a:p>
-            <a:r>
-              <a:rPr lang="en-US" baseline="0" dirty="0" smtClean="0"/>
-              <a:t>	</a:t>
-            </a:r>
-            <a:r>
-              <a:rPr lang="en-US" baseline="0" dirty="0" err="1" smtClean="0"/>
-              <a:t>subquery</a:t>
+            <a:endParaRPr lang="en-US" dirty="0" smtClean="0"/>
+          </a:p>
+          <a:p>
+            <a:r>
+              <a:rPr lang="en-US" dirty="0" err="1" smtClean="0"/>
+              <a:t>Bol</a:t>
+            </a:r>
+            <a:r>
+              <a:rPr lang="en-US" baseline="0" dirty="0" smtClean="0"/>
+              <a:t> link: </a:t>
+            </a:r>
+            <a:r>
+              <a:rPr lang="en-US" baseline="0" dirty="0" err="1" smtClean="0"/>
+              <a:t>https://msdn.microsoft.com/en-us/library/ms180199.aspx</a:t>
             </a:r>
             <a:endParaRPr lang="en-US" baseline="0" dirty="0" smtClean="0"/>
-          </a:p>
-          <a:p>
-            <a:r>
-              <a:rPr lang="en-US" baseline="0" dirty="0" smtClean="0"/>
-              <a:t>	combining join (left + inner join)</a:t>
-            </a:r>
-          </a:p>
-          <a:p>
-            <a:endParaRPr lang="en-US" baseline="0" dirty="0" smtClean="0"/>
-          </a:p>
-          <a:p>
-            <a:r>
-              <a:rPr lang="en-US" baseline="0" dirty="0" err="1" smtClean="0"/>
-              <a:t>Bol</a:t>
-            </a:r>
-            <a:r>
-              <a:rPr lang="en-US" baseline="0" dirty="0" smtClean="0"/>
-              <a:t> link: </a:t>
-            </a:r>
-          </a:p>
-          <a:p>
-            <a:r>
-              <a:rPr lang="en-US" baseline="0" dirty="0" smtClean="0"/>
-              <a:t>	https://msdn.microsoft.com/en-us/library/ms191472.aspx</a:t>
-            </a:r>
-          </a:p>
-          <a:p>
-            <a:r>
-              <a:rPr lang="en-US" baseline="0" dirty="0" smtClean="0"/>
-              <a:t>	https://msdn.microsoft.com/en-us/library/ms187518.aspx</a:t>
-            </a:r>
-          </a:p>
-          <a:p>
-            <a:r>
-              <a:rPr lang="en-US" baseline="0" dirty="0" smtClean="0"/>
-              <a:t>	https://msdn.microsoft.com/en-us/library/ms191430%28v=sql.105%29.aspx</a:t>
-            </a:r>
-          </a:p>
-          <a:p>
-            <a:endParaRPr lang="en-US" baseline="0" dirty="0" smtClean="0"/>
-          </a:p>
-          <a:p>
-            <a:r>
-              <a:rPr lang="en-US" baseline="0" dirty="0" smtClean="0"/>
-              <a:t>Sample from scripts</a:t>
-            </a:r>
-            <a:endParaRPr lang="en-US" dirty="0" smtClean="0"/>
           </a:p>
           <a:p>
             <a:endParaRPr lang="en-US" dirty="0"/>
@@ -10254,7 +10305,7 @@
     </p:spTree>
     <p:extLst>
       <p:ext uri="{BB962C8B-B14F-4D97-AF65-F5344CB8AC3E}">
-        <p14:creationId xmlns:p14="http://schemas.microsoft.com/office/powerpoint/2010/main" val="3424523609"/>
+        <p14:creationId xmlns:p14="http://schemas.microsoft.com/office/powerpoint/2010/main" val="651811846"/>
       </p:ext>
     </p:extLst>
   </p:cSld>
@@ -10310,95 +10361,6 @@
           </a:bodyPr>
           <a:lstStyle/>
           <a:p>
-            <a:r>
-              <a:rPr lang="en-US" dirty="0" smtClean="0"/>
-              <a:t>Topics:</a:t>
-            </a:r>
-          </a:p>
-          <a:p>
-            <a:r>
-              <a:rPr lang="en-US" dirty="0" smtClean="0"/>
-              <a:t>	what</a:t>
-            </a:r>
-            <a:r>
-              <a:rPr lang="en-US" baseline="0" dirty="0" smtClean="0"/>
-              <a:t> is a group</a:t>
-            </a:r>
-          </a:p>
-          <a:p>
-            <a:r>
-              <a:rPr lang="en-US" baseline="0" dirty="0" smtClean="0"/>
-              <a:t>	aggregate functions in </a:t>
-            </a:r>
-            <a:r>
-              <a:rPr lang="en-US" baseline="0" dirty="0" err="1" smtClean="0"/>
-              <a:t>conjuction</a:t>
-            </a:r>
-            <a:r>
-              <a:rPr lang="en-US" baseline="0" dirty="0" smtClean="0"/>
-              <a:t> with groups</a:t>
-            </a:r>
-          </a:p>
-          <a:p>
-            <a:r>
-              <a:rPr lang="en-US" baseline="0" dirty="0" smtClean="0"/>
-              <a:t>	</a:t>
-            </a:r>
-            <a:r>
-              <a:rPr lang="en-US" dirty="0" smtClean="0"/>
-              <a:t>Aggregate functions in the SELECT clause &lt;select&gt; list provide information about each group instead of individual rows</a:t>
-            </a:r>
-            <a:endParaRPr lang="en-US" baseline="0" dirty="0" smtClean="0"/>
-          </a:p>
-          <a:p>
-            <a:r>
-              <a:rPr lang="en-US" baseline="0" dirty="0" smtClean="0"/>
-              <a:t>	only one group by, multiple groups (trailing group by)</a:t>
-            </a:r>
-          </a:p>
-          <a:p>
-            <a:r>
-              <a:rPr lang="en-US" baseline="0" dirty="0" smtClean="0"/>
-              <a:t>	syntax</a:t>
-            </a:r>
-          </a:p>
-          <a:p>
-            <a:endParaRPr lang="en-US" baseline="0" dirty="0" smtClean="0"/>
-          </a:p>
-          <a:p>
-            <a:r>
-              <a:rPr lang="en-US" baseline="0" dirty="0" smtClean="0"/>
-              <a:t>Sample from scripts</a:t>
-            </a:r>
-            <a:endParaRPr lang="en-US" dirty="0" smtClean="0"/>
-          </a:p>
-          <a:p>
-            <a:r>
-              <a:rPr lang="en-US" dirty="0" smtClean="0"/>
-              <a:t>	</a:t>
-            </a:r>
-          </a:p>
-          <a:p>
-            <a:r>
-              <a:rPr lang="en-US" dirty="0" err="1" smtClean="0"/>
-              <a:t>Bol</a:t>
-            </a:r>
-            <a:r>
-              <a:rPr lang="en-US" baseline="0" dirty="0" smtClean="0"/>
-              <a:t> link: </a:t>
-            </a:r>
-          </a:p>
-          <a:p>
-            <a:r>
-              <a:rPr lang="en-US" baseline="0" dirty="0" smtClean="0"/>
-              <a:t>	https://msdn.microsoft.com/en-us/library/ms177673.aspx</a:t>
-            </a:r>
-          </a:p>
-          <a:p>
-            <a:r>
-              <a:rPr lang="en-US" baseline="0" dirty="0" smtClean="0"/>
-              <a:t>	https://msdn.microsoft.com/en-us/library/ms173454.aspx (aggregate functions0</a:t>
-            </a:r>
             <a:endParaRPr lang="en-US" dirty="0"/>
           </a:p>
         </p:txBody>
@@ -10430,7 +10392,7 @@
     </p:spTree>
     <p:extLst>
       <p:ext uri="{BB962C8B-B14F-4D97-AF65-F5344CB8AC3E}">
-        <p14:creationId xmlns:p14="http://schemas.microsoft.com/office/powerpoint/2010/main" val="1051086592"/>
+        <p14:creationId xmlns:p14="http://schemas.microsoft.com/office/powerpoint/2010/main" val="228680557"/>
       </p:ext>
     </p:extLst>
   </p:cSld>
@@ -10488,43 +10450,95 @@
           <a:p>
             <a:r>
               <a:rPr lang="en-US" dirty="0" smtClean="0"/>
-              <a:t>Topics</a:t>
-            </a:r>
-            <a:r>
-              <a:rPr lang="en-US" baseline="0" dirty="0" smtClean="0"/>
-              <a:t> : </a:t>
-            </a:r>
-          </a:p>
-          <a:p>
-            <a:r>
-              <a:rPr lang="en-US" baseline="0" dirty="0" smtClean="0"/>
-              <a:t>	filter for groups</a:t>
-            </a:r>
-          </a:p>
-          <a:p>
-            <a:r>
-              <a:rPr lang="en-US" baseline="0" dirty="0" smtClean="0"/>
-              <a:t>	syntax</a:t>
+              <a:t>Topics:</a:t>
+            </a:r>
+          </a:p>
+          <a:p>
+            <a:r>
+              <a:rPr lang="en-US" dirty="0" smtClean="0"/>
+              <a:t>	purpose: showing date from</a:t>
+            </a:r>
+            <a:r>
+              <a:rPr lang="en-US" baseline="0" dirty="0" smtClean="0"/>
+              <a:t> multiple tables</a:t>
             </a:r>
             <a:endParaRPr lang="en-US" dirty="0" smtClean="0"/>
           </a:p>
           <a:p>
+            <a:r>
+              <a:rPr lang="en-US" baseline="0" dirty="0" smtClean="0"/>
+              <a:t>         	mainly used types of join</a:t>
+            </a:r>
+          </a:p>
+          <a:p>
+            <a:r>
+              <a:rPr lang="en-US" dirty="0" smtClean="0"/>
+              <a:t>	Join conditions can be specified in either the FROM or WHERE clauses</a:t>
+            </a:r>
+          </a:p>
+          <a:p>
+            <a:r>
+              <a:rPr lang="en-US" baseline="0" dirty="0" smtClean="0"/>
+              <a:t>	limit on join???</a:t>
+            </a:r>
+          </a:p>
+          <a:p>
+            <a:r>
+              <a:rPr lang="en-US" baseline="0" dirty="0" smtClean="0"/>
+              <a:t>	</a:t>
+            </a:r>
+            <a:r>
+              <a:rPr lang="en-US" baseline="0" dirty="0" err="1" smtClean="0"/>
+              <a:t>subquery</a:t>
+            </a:r>
+            <a:endParaRPr lang="en-US" baseline="0" dirty="0" smtClean="0"/>
+          </a:p>
+          <a:p>
+            <a:r>
+              <a:rPr lang="en-US" baseline="0" dirty="0" smtClean="0"/>
+              <a:t>	combining join (left + inner join)</a:t>
+            </a:r>
+          </a:p>
+          <a:p>
+            <a:endParaRPr lang="en-US" baseline="0" dirty="0" smtClean="0"/>
+          </a:p>
+          <a:p>
+            <a:r>
+              <a:rPr lang="en-US" baseline="0" dirty="0" err="1" smtClean="0"/>
+              <a:t>Bol</a:t>
+            </a:r>
+            <a:r>
+              <a:rPr lang="en-US" baseline="0" dirty="0" smtClean="0"/>
+              <a:t> link: </a:t>
+            </a:r>
+          </a:p>
+          <a:p>
+            <a:r>
+              <a:rPr lang="en-US" baseline="0" dirty="0" smtClean="0"/>
+              <a:t>	https://msdn.microsoft.com/en-us/library/ms191472.aspx</a:t>
+            </a:r>
+          </a:p>
+          <a:p>
+            <a:r>
+              <a:rPr lang="en-US" baseline="0" dirty="0" smtClean="0"/>
+              <a:t>	https://msdn.microsoft.com/en-us/library/ms187518.aspx</a:t>
+            </a:r>
+          </a:p>
+          <a:p>
+            <a:r>
+              <a:rPr lang="en-US" baseline="0" dirty="0" smtClean="0"/>
+              <a:t>	https://msdn.microsoft.com/en-us/library/ms191430%28v=sql.105%29.aspx</a:t>
+            </a:r>
+          </a:p>
+          <a:p>
+            <a:endParaRPr lang="en-US" baseline="0" dirty="0" smtClean="0"/>
+          </a:p>
+          <a:p>
+            <a:r>
+              <a:rPr lang="en-US" baseline="0" dirty="0" smtClean="0"/>
+              <a:t>Sample from scripts</a:t>
+            </a:r>
             <a:endParaRPr lang="en-US" dirty="0" smtClean="0"/>
-          </a:p>
-          <a:p>
-            <a:r>
-              <a:rPr lang="en-US" dirty="0" err="1" smtClean="0"/>
-              <a:t>Bol</a:t>
-            </a:r>
-            <a:r>
-              <a:rPr lang="en-US" baseline="0" dirty="0" smtClean="0"/>
-              <a:t> link: </a:t>
-            </a:r>
-            <a:r>
-              <a:rPr lang="en-US" baseline="0" dirty="0" err="1" smtClean="0"/>
-              <a:t>https://msdn.microsoft.com/en-us/library/ms180199.aspx</a:t>
-            </a:r>
-            <a:endParaRPr lang="en-US" baseline="0" dirty="0" smtClean="0"/>
           </a:p>
           <a:p>
             <a:endParaRPr lang="en-US" dirty="0"/>
@@ -10558,7 +10572,7 @@
     </p:spTree>
     <p:extLst>
       <p:ext uri="{BB962C8B-B14F-4D97-AF65-F5344CB8AC3E}">
-        <p14:creationId xmlns:p14="http://schemas.microsoft.com/office/powerpoint/2010/main" val="651811846"/>
+        <p14:creationId xmlns:p14="http://schemas.microsoft.com/office/powerpoint/2010/main" val="3424523609"/>
       </p:ext>
     </p:extLst>
   </p:cSld>
@@ -18185,6 +18199,11 @@
 <file path=ppt/slides/slide25.xml><?xml version="1.0" encoding="utf-8"?>
 <p:sld xmlns:a="http://schemas.openxmlformats.org/drawingml/2006/main" xmlns:r="http://schemas.openxmlformats.org/officeDocument/2006/relationships" xmlns:p="http://schemas.openxmlformats.org/presentationml/2006/main">
   <p:cSld>
+    <p:bg>
+      <p:bgRef idx="1001">
+        <a:schemeClr val="bg1"/>
+      </p:bgRef>
+    </p:bg>
     <p:spTree>
       <p:nvGrpSpPr>
         <p:cNvPr id="1" name=""/>
@@ -18206,210 +18225,118 @@
             <a:spLocks noGrp="1"/>
           </p:cNvSpPr>
           <p:nvPr>
-            <p:ph type="ctrTitle"/>
-          </p:nvPr>
-        </p:nvSpPr>
-        <p:spPr/>
-        <p:txBody>
-          <a:bodyPr/>
-          <a:lstStyle/>
-          <a:p>
-            <a:pPr algn="ctr"/>
-            <a:r>
-              <a:rPr lang="en-US" dirty="0" smtClean="0"/>
-              <a:t>SQL Server </a:t>
-            </a:r>
-            <a:endParaRPr lang="en-US" dirty="0"/>
-          </a:p>
-        </p:txBody>
-      </p:sp>
-      <p:sp>
-        <p:nvSpPr>
-          <p:cNvPr id="7" name="TextBox 6"/>
-          <p:cNvSpPr txBox="1"/>
-          <p:nvPr/>
+            <p:ph type="title"/>
+          </p:nvPr>
         </p:nvSpPr>
         <p:spPr>
           <a:xfrm>
-            <a:off x="720725" y="6280150"/>
-            <a:ext cx="7704138" cy="123111"/>
+            <a:off x="323528" y="764704"/>
+            <a:ext cx="8424936" cy="593092"/>
           </a:xfrm>
-          <a:prstGeom prst="rect">
-            <a:avLst/>
-          </a:prstGeom>
-          <a:noFill/>
         </p:spPr>
         <p:txBody>
-          <a:bodyPr wrap="square" lIns="0" tIns="0" rIns="0" bIns="0" rtlCol="0" anchor="ctr" anchorCtr="0">
-            <a:spAutoFit/>
+          <a:bodyPr>
+            <a:noAutofit/>
           </a:bodyPr>
           <a:lstStyle/>
           <a:p>
-            <a:r>
-              <a:rPr lang="de-DE" sz="800" dirty="0">
-                <a:solidFill>
-                  <a:srgbClr val="FFFFFF"/>
-                </a:solidFill>
-                <a:latin typeface="Arial"/>
-                <a:cs typeface="Arial"/>
-              </a:rPr>
-              <a:t>Pregatit </a:t>
-            </a:r>
-            <a:r>
-              <a:rPr lang="de-DE" sz="800" dirty="0" smtClean="0">
-                <a:solidFill>
-                  <a:srgbClr val="FFFFFF"/>
-                </a:solidFill>
-                <a:latin typeface="Arial"/>
-                <a:cs typeface="Arial"/>
-              </a:rPr>
-              <a:t>de</a:t>
-            </a:r>
-            <a:r>
-              <a:rPr lang="ro-RO" sz="800" dirty="0" smtClean="0">
-                <a:solidFill>
-                  <a:srgbClr val="FFFFFF"/>
-                </a:solidFill>
-                <a:latin typeface="Arial"/>
-                <a:cs typeface="Arial"/>
-              </a:rPr>
-              <a:t> Marcel Soare </a:t>
-            </a:r>
-            <a:r>
-              <a:rPr lang="de-DE" sz="800" dirty="0" smtClean="0">
-                <a:solidFill>
-                  <a:srgbClr val="FFFFFF"/>
-                </a:solidFill>
-                <a:latin typeface="Arial"/>
-                <a:cs typeface="Arial"/>
-              </a:rPr>
-              <a:t>Data</a:t>
-            </a:r>
-            <a:r>
-              <a:rPr lang="de-DE" sz="800" dirty="0">
-                <a:solidFill>
-                  <a:srgbClr val="FFFFFF"/>
-                </a:solidFill>
-                <a:latin typeface="Arial"/>
-                <a:cs typeface="Arial"/>
-              </a:rPr>
-              <a:t>: </a:t>
-            </a:r>
-            <a:r>
-              <a:rPr lang="en-US" sz="800" dirty="0" smtClean="0">
-                <a:solidFill>
-                  <a:srgbClr val="FFFFFF"/>
-                </a:solidFill>
-                <a:latin typeface="Arial"/>
-                <a:cs typeface="Arial"/>
-              </a:rPr>
-              <a:t>27.</a:t>
-            </a:r>
-            <a:r>
-              <a:rPr lang="de-DE" sz="800" dirty="0" smtClean="0">
-                <a:solidFill>
-                  <a:srgbClr val="FFFFFF"/>
-                </a:solidFill>
-                <a:latin typeface="Arial"/>
-                <a:cs typeface="Arial"/>
-              </a:rPr>
-              <a:t>04</a:t>
-            </a:r>
-            <a:r>
-              <a:rPr lang="en-US" sz="800" dirty="0" smtClean="0">
-                <a:solidFill>
-                  <a:srgbClr val="FFFFFF"/>
-                </a:solidFill>
-                <a:latin typeface="Arial"/>
-                <a:cs typeface="Arial"/>
-              </a:rPr>
-              <a:t>.</a:t>
-            </a:r>
-            <a:r>
-              <a:rPr lang="de-DE" sz="800" dirty="0" smtClean="0">
-                <a:solidFill>
-                  <a:srgbClr val="FFFFFF"/>
-                </a:solidFill>
-                <a:latin typeface="Arial"/>
-                <a:cs typeface="Arial"/>
-              </a:rPr>
-              <a:t>2015</a:t>
-            </a:r>
-            <a:endParaRPr lang="en-US" sz="800" dirty="0">
-              <a:solidFill>
-                <a:srgbClr val="FFFFFF"/>
-              </a:solidFill>
-              <a:latin typeface="Arial"/>
-              <a:cs typeface="Arial"/>
-            </a:endParaRPr>
-          </a:p>
-        </p:txBody>
-      </p:sp>
-      <p:sp>
-        <p:nvSpPr>
-          <p:cNvPr id="5" name="Title 1"/>
-          <p:cNvSpPr txBox="1">
-            <a:spLocks/>
-          </p:cNvSpPr>
-          <p:nvPr/>
+            <a:pPr algn="ctr"/>
+            <a:r>
+              <a:rPr lang="en-US" sz="4400" dirty="0" smtClean="0"/>
+              <a:t>T-SQL</a:t>
+            </a:r>
+            <a:endParaRPr lang="en-US" sz="4400" dirty="0"/>
+          </a:p>
+        </p:txBody>
+      </p:sp>
+      <p:sp>
+        <p:nvSpPr>
+          <p:cNvPr id="4" name="Content Placeholder 3"/>
+          <p:cNvSpPr>
+            <a:spLocks noGrp="1"/>
+          </p:cNvSpPr>
+          <p:nvPr>
+            <p:ph sz="half" idx="2"/>
+          </p:nvPr>
         </p:nvSpPr>
         <p:spPr>
           <a:xfrm>
-            <a:off x="827584" y="4509120"/>
-            <a:ext cx="7704856" cy="1008112"/>
+            <a:off x="683568" y="1844824"/>
+            <a:ext cx="7920880" cy="4032448"/>
           </a:xfrm>
-          <a:prstGeom prst="rect">
-            <a:avLst/>
-          </a:prstGeom>
         </p:spPr>
         <p:txBody>
-          <a:bodyPr vert="horz" lIns="0" tIns="0" rIns="0" bIns="0" rtlCol="0" anchor="t" anchorCtr="0">
+          <a:bodyPr>
             <a:normAutofit/>
           </a:bodyPr>
           <a:lstStyle/>
           <a:p>
-            <a:pPr algn="ctr"/>
-            <a:r>
-              <a:rPr lang="en-US" sz="3600" i="1" dirty="0" smtClean="0">
-                <a:solidFill>
-                  <a:schemeClr val="bg1"/>
-                </a:solidFill>
-              </a:rPr>
-              <a:t>“</a:t>
-            </a:r>
-            <a:r>
-              <a:rPr lang="en-US" sz="3600" i="1" dirty="0" err="1" smtClean="0">
-                <a:solidFill>
-                  <a:schemeClr val="bg1"/>
-                </a:solidFill>
-              </a:rPr>
-              <a:t>DML</a:t>
-            </a:r>
-            <a:r>
-              <a:rPr lang="en-US" sz="3600" i="1" dirty="0" smtClean="0">
-                <a:solidFill>
-                  <a:schemeClr val="bg1"/>
-                </a:solidFill>
-              </a:rPr>
-              <a:t> Statements”</a:t>
-            </a:r>
-            <a:endParaRPr lang="en-US" sz="3600" dirty="0">
-              <a:solidFill>
-                <a:schemeClr val="bg1"/>
-              </a:solidFill>
-            </a:endParaRPr>
+            <a:endParaRPr lang="en-US" sz="2400" dirty="0" smtClean="0"/>
+          </a:p>
+          <a:p>
+            <a:endParaRPr lang="en-GB" baseline="30000" dirty="0"/>
+          </a:p>
+        </p:txBody>
+      </p:sp>
+      <p:sp>
+        <p:nvSpPr>
+          <p:cNvPr id="5" name="Content Placeholder 3"/>
+          <p:cNvSpPr>
+            <a:spLocks noGrp="1"/>
+          </p:cNvSpPr>
+          <p:nvPr>
+            <p:ph sz="quarter" idx="4"/>
+          </p:nvPr>
+        </p:nvSpPr>
+        <p:spPr>
+          <a:xfrm>
+            <a:off x="683568" y="1772816"/>
+            <a:ext cx="7920880" cy="4320480"/>
+          </a:xfrm>
+        </p:spPr>
+        <p:txBody>
+          <a:bodyPr>
+            <a:normAutofit/>
+          </a:bodyPr>
+          <a:lstStyle/>
+          <a:p>
+            <a:r>
+              <a:rPr lang="en-US" sz="2200" dirty="0" smtClean="0"/>
+              <a:t>is the language used to administer instances of the SQL Server Database Engine, to create and manage database objects, and to insert, retrieve, modify, and delete data</a:t>
+            </a:r>
+          </a:p>
+          <a:p>
+            <a:r>
+              <a:rPr lang="en-US" sz="2200" dirty="0" smtClean="0"/>
+              <a:t>is an extension of the language defined in the SQL standards published by the International Standards Organization (ISO) and the American National Standards Institute (ANSI)</a:t>
+            </a:r>
+          </a:p>
+          <a:p>
+            <a:r>
+              <a:rPr lang="en-US" sz="2200" dirty="0" smtClean="0"/>
+              <a:t>Data Definition Language</a:t>
+            </a:r>
+          </a:p>
+          <a:p>
+            <a:r>
+              <a:rPr lang="en-US" sz="2200" dirty="0" smtClean="0"/>
+              <a:t>Data Manipulation Language</a:t>
+            </a:r>
+          </a:p>
+          <a:p>
+            <a:endParaRPr lang="en-US" sz="2200" dirty="0" smtClean="0"/>
           </a:p>
         </p:txBody>
       </p:sp>
     </p:spTree>
     <p:extLst>
       <p:ext uri="{BB962C8B-B14F-4D97-AF65-F5344CB8AC3E}">
-        <p14:creationId xmlns:p14="http://schemas.microsoft.com/office/powerpoint/2010/main" val="1908241380"/>
+        <p14:creationId xmlns:p14="http://schemas.microsoft.com/office/powerpoint/2010/main" val="826275463"/>
       </p:ext>
     </p:extLst>
   </p:cSld>
   <p:clrMapOvr>
-    <a:masterClrMapping/>
+    <a:overrideClrMapping bg1="lt1" tx1="dk1" bg2="lt2" tx2="dk2" accent1="accent1" accent2="accent2" accent3="accent3" accent4="accent4" accent5="accent5" accent6="accent6" hlink="hlink" folHlink="folHlink"/>
   </p:clrMapOvr>
   <p:timing>
     <p:tnLst>
@@ -18448,41 +18375,33 @@
             <p:ph type="title"/>
           </p:nvPr>
         </p:nvSpPr>
+        <p:spPr/>
+        <p:txBody>
+          <a:bodyPr/>
+          <a:lstStyle/>
+          <a:p>
+            <a:r>
+              <a:rPr lang="en-US" dirty="0" smtClean="0"/>
+              <a:t>P</a:t>
+            </a:r>
+            <a:endParaRPr lang="en-US" dirty="0"/>
+          </a:p>
+        </p:txBody>
+      </p:sp>
+      <p:sp>
+        <p:nvSpPr>
+          <p:cNvPr id="3" name="Content Placeholder 2"/>
+          <p:cNvSpPr>
+            <a:spLocks noGrp="1"/>
+          </p:cNvSpPr>
+          <p:nvPr>
+            <p:ph sz="half" idx="2"/>
+          </p:nvPr>
+        </p:nvSpPr>
         <p:spPr>
           <a:xfrm>
-            <a:off x="323528" y="764704"/>
-            <a:ext cx="8424936" cy="593092"/>
-          </a:xfrm>
-        </p:spPr>
-        <p:txBody>
-          <a:bodyPr>
-            <a:noAutofit/>
-          </a:bodyPr>
-          <a:lstStyle/>
-          <a:p>
-            <a:pPr algn="ctr"/>
-            <a:r>
-              <a:rPr lang="en-US" sz="4400" dirty="0" smtClean="0"/>
-              <a:t>Agenda day 2</a:t>
-            </a:r>
-            <a:endParaRPr lang="en-US" sz="4400" dirty="0"/>
-          </a:p>
-        </p:txBody>
-      </p:sp>
-      <p:sp>
-        <p:nvSpPr>
-          <p:cNvPr id="4" name="Content Placeholder 3"/>
-          <p:cNvSpPr>
-            <a:spLocks noGrp="1"/>
-          </p:cNvSpPr>
-          <p:nvPr>
-            <p:ph sz="quarter" idx="4"/>
-          </p:nvPr>
-        </p:nvSpPr>
-        <p:spPr>
-          <a:xfrm>
-            <a:off x="683568" y="1844824"/>
-            <a:ext cx="7920880" cy="4032448"/>
+            <a:off x="720724" y="1773371"/>
+            <a:ext cx="7667700" cy="4499026"/>
           </a:xfrm>
         </p:spPr>
         <p:txBody>
@@ -18491,87 +18410,151 @@
           </a:bodyPr>
           <a:lstStyle/>
           <a:p>
-            <a:endParaRPr lang="en-US" sz="2400" dirty="0" smtClean="0"/>
-          </a:p>
-          <a:p>
-            <a:endParaRPr lang="en-GB" baseline="30000" dirty="0"/>
-          </a:p>
-        </p:txBody>
-      </p:sp>
-      <p:sp>
-        <p:nvSpPr>
-          <p:cNvPr id="5" name="Content Placeholder 3"/>
-          <p:cNvSpPr>
-            <a:spLocks noGrp="1"/>
-          </p:cNvSpPr>
-          <p:nvPr>
-            <p:ph sz="quarter" idx="4"/>
-          </p:nvPr>
+            <a:endParaRPr lang="en-US" sz="2200" dirty="0" smtClean="0"/>
+          </a:p>
+          <a:p>
+            <a:r>
+              <a:rPr lang="en-US" sz="2400" dirty="0" smtClean="0"/>
+              <a:t>Programs </a:t>
+            </a:r>
+            <a:r>
+              <a:rPr lang="en-US" sz="2400" dirty="0"/>
+              <a:t>are collections of instructions that tell a computer how to interact with the </a:t>
+            </a:r>
+            <a:r>
+              <a:rPr lang="en-US" sz="2400" dirty="0" smtClean="0"/>
+              <a:t>user</a:t>
+            </a:r>
+          </a:p>
+          <a:p>
+            <a:r>
+              <a:rPr lang="en-US" sz="2200" dirty="0"/>
+              <a:t>S</a:t>
+            </a:r>
+            <a:r>
+              <a:rPr lang="en-US" sz="2200" dirty="0" smtClean="0"/>
+              <a:t>equence </a:t>
+            </a:r>
+            <a:r>
+              <a:rPr lang="en-US" sz="2200" dirty="0"/>
+              <a:t>of commands (The right </a:t>
+            </a:r>
+            <a:r>
+              <a:rPr lang="en-US" sz="2200" dirty="0" smtClean="0"/>
+              <a:t>commands </a:t>
+            </a:r>
+            <a:r>
+              <a:rPr lang="en-US" sz="2200" dirty="0"/>
+              <a:t>in the right </a:t>
+            </a:r>
+            <a:r>
+              <a:rPr lang="en-US" sz="2200" dirty="0" smtClean="0"/>
+              <a:t>order)</a:t>
+            </a:r>
+          </a:p>
+          <a:p>
+            <a:r>
+              <a:rPr lang="en-US" sz="2200" dirty="0" smtClean="0"/>
+              <a:t>Variables</a:t>
+            </a:r>
+          </a:p>
+          <a:p>
+            <a:r>
+              <a:rPr lang="en-US" sz="2200" dirty="0" smtClean="0"/>
+              <a:t>Operators</a:t>
+            </a:r>
+          </a:p>
+          <a:p>
+            <a:r>
+              <a:rPr lang="en-US" sz="2200" dirty="0" smtClean="0"/>
+              <a:t>Constants</a:t>
+            </a:r>
+          </a:p>
+          <a:p>
+            <a:r>
+              <a:rPr lang="en-US" sz="2200" dirty="0" smtClean="0"/>
+              <a:t>Conditional </a:t>
+            </a:r>
+            <a:r>
+              <a:rPr lang="en-US" sz="2200" dirty="0"/>
+              <a:t>structures</a:t>
+            </a:r>
+          </a:p>
+          <a:p>
+            <a:r>
+              <a:rPr lang="en-US" sz="2200" dirty="0"/>
+              <a:t>Looping structures</a:t>
+            </a:r>
+          </a:p>
+          <a:p>
+            <a:endParaRPr lang="en-US" sz="2200" dirty="0"/>
+          </a:p>
+        </p:txBody>
+      </p:sp>
+      <p:sp>
+        <p:nvSpPr>
+          <p:cNvPr id="5" name="Title 1"/>
+          <p:cNvSpPr txBox="1">
+            <a:spLocks/>
+          </p:cNvSpPr>
+          <p:nvPr/>
         </p:nvSpPr>
         <p:spPr>
           <a:xfrm>
-            <a:off x="683568" y="1772816"/>
-            <a:ext cx="7920880" cy="4320480"/>
+            <a:off x="755576" y="764704"/>
+            <a:ext cx="7272808" cy="593092"/>
           </a:xfrm>
+          <a:prstGeom prst="rect">
+            <a:avLst/>
+          </a:prstGeom>
+          <a:solidFill>
+            <a:schemeClr val="bg1"/>
+          </a:solidFill>
         </p:spPr>
         <p:txBody>
-          <a:bodyPr>
-            <a:normAutofit/>
+          <a:bodyPr vert="horz" lIns="36000" tIns="0" rIns="0" bIns="0" rtlCol="0" anchor="ctr">
+            <a:noAutofit/>
           </a:bodyPr>
           <a:lstStyle/>
           <a:p>
-            <a:r>
-              <a:rPr lang="en-GB" sz="4000" baseline="30000" dirty="0" smtClean="0"/>
-              <a:t>Simple Statements</a:t>
-            </a:r>
-          </a:p>
-          <a:p>
-            <a:r>
-              <a:rPr lang="en-GB" sz="4000" baseline="30000" dirty="0" smtClean="0"/>
-              <a:t>Retrieve data</a:t>
-            </a:r>
-          </a:p>
-          <a:p>
-            <a:r>
-              <a:rPr lang="en-GB" sz="4000" baseline="30000" dirty="0" smtClean="0"/>
-              <a:t>Filter</a:t>
-            </a:r>
-          </a:p>
-          <a:p>
-            <a:r>
-              <a:rPr lang="en-GB" sz="4000" baseline="30000" dirty="0" smtClean="0"/>
-              <a:t>Joins /union</a:t>
-            </a:r>
-          </a:p>
-          <a:p>
-            <a:r>
-              <a:rPr lang="en-GB" sz="4000" baseline="30000" dirty="0" smtClean="0"/>
-              <a:t>Ordering</a:t>
-            </a:r>
-          </a:p>
-          <a:p>
-            <a:r>
-              <a:rPr lang="en-GB" sz="4000" baseline="30000" dirty="0" smtClean="0"/>
-              <a:t>Aggregate </a:t>
-            </a:r>
-          </a:p>
-          <a:p>
-            <a:pPr>
+            <a:pPr marL="0" marR="0" lvl="0" indent="0" algn="ctr" defTabSz="914400" rtl="0" eaLnBrk="1" fontAlgn="auto" latinLnBrk="0" hangingPunct="1">
+              <a:lnSpc>
+                <a:spcPct val="100000"/>
+              </a:lnSpc>
+              <a:spcBef>
+                <a:spcPct val="0"/>
+              </a:spcBef>
+              <a:spcAft>
+                <a:spcPts val="0"/>
+              </a:spcAft>
+              <a:buClrTx/>
+              <a:buSzTx/>
+              <a:buFontTx/>
               <a:buNone/>
+              <a:tabLst/>
+              <a:defRPr/>
             </a:pPr>
-            <a:endParaRPr lang="en-GB" sz="2800" baseline="30000" dirty="0" smtClean="0"/>
-          </a:p>
-          <a:p>
-            <a:endParaRPr lang="en-GB" sz="2800" baseline="30000" dirty="0" smtClean="0"/>
+            <a:r>
+              <a:rPr kumimoji="0" lang="en-US" sz="4400" b="0" i="0" u="none" strike="noStrike" kern="1200" cap="none" spc="0" normalizeH="0" baseline="0" noProof="0" dirty="0" smtClean="0">
+                <a:ln>
+                  <a:noFill/>
+                </a:ln>
+                <a:solidFill>
+                  <a:schemeClr val="tx1"/>
+                </a:solidFill>
+                <a:effectLst/>
+                <a:uLnTx/>
+                <a:uFillTx/>
+                <a:latin typeface="+mj-lt"/>
+                <a:ea typeface="+mj-ea"/>
+                <a:cs typeface="+mj-cs"/>
+              </a:rPr>
+              <a:t>Programming Concepts</a:t>
+            </a:r>
           </a:p>
         </p:txBody>
       </p:sp>
     </p:spTree>
-    <p:extLst>
-      <p:ext uri="{BB962C8B-B14F-4D97-AF65-F5344CB8AC3E}">
-        <p14:creationId xmlns:p14="http://schemas.microsoft.com/office/powerpoint/2010/main" val="826275463"/>
-      </p:ext>
-    </p:extLst>
   </p:cSld>
   <p:clrMapOvr>
     <a:masterClrMapping/>
@@ -18589,11 +18572,6 @@
 <file path=ppt/slides/slide27.xml><?xml version="1.0" encoding="utf-8"?>
 <p:sld xmlns:a="http://schemas.openxmlformats.org/drawingml/2006/main" xmlns:r="http://schemas.openxmlformats.org/officeDocument/2006/relationships" xmlns:p="http://schemas.openxmlformats.org/presentationml/2006/main">
   <p:cSld>
-    <p:bg>
-      <p:bgRef idx="1001">
-        <a:schemeClr val="bg1"/>
-      </p:bgRef>
-    </p:bg>
     <p:spTree>
       <p:nvGrpSpPr>
         <p:cNvPr id="1" name=""/>
@@ -18615,118 +18593,210 @@
             <a:spLocks noGrp="1"/>
           </p:cNvSpPr>
           <p:nvPr>
-            <p:ph type="title"/>
-          </p:nvPr>
+            <p:ph type="ctrTitle"/>
+          </p:nvPr>
+        </p:nvSpPr>
+        <p:spPr/>
+        <p:txBody>
+          <a:bodyPr/>
+          <a:lstStyle/>
+          <a:p>
+            <a:pPr algn="ctr"/>
+            <a:r>
+              <a:rPr lang="en-US" dirty="0" smtClean="0"/>
+              <a:t>SQL Server </a:t>
+            </a:r>
+            <a:endParaRPr lang="en-US" dirty="0"/>
+          </a:p>
+        </p:txBody>
+      </p:sp>
+      <p:sp>
+        <p:nvSpPr>
+          <p:cNvPr id="7" name="TextBox 6"/>
+          <p:cNvSpPr txBox="1"/>
+          <p:nvPr/>
         </p:nvSpPr>
         <p:spPr>
           <a:xfrm>
-            <a:off x="323528" y="764704"/>
-            <a:ext cx="8424936" cy="593092"/>
+            <a:off x="720725" y="6280150"/>
+            <a:ext cx="7704138" cy="123111"/>
           </a:xfrm>
+          <a:prstGeom prst="rect">
+            <a:avLst/>
+          </a:prstGeom>
+          <a:noFill/>
         </p:spPr>
         <p:txBody>
-          <a:bodyPr>
-            <a:noAutofit/>
+          <a:bodyPr wrap="square" lIns="0" tIns="0" rIns="0" bIns="0" rtlCol="0" anchor="ctr" anchorCtr="0">
+            <a:spAutoFit/>
           </a:bodyPr>
           <a:lstStyle/>
           <a:p>
-            <a:pPr algn="ctr"/>
-            <a:r>
-              <a:rPr lang="en-US" sz="4400" dirty="0" smtClean="0"/>
-              <a:t>T-SQL</a:t>
-            </a:r>
-            <a:endParaRPr lang="en-US" sz="4400" dirty="0"/>
-          </a:p>
-        </p:txBody>
-      </p:sp>
-      <p:sp>
-        <p:nvSpPr>
-          <p:cNvPr id="4" name="Content Placeholder 3"/>
-          <p:cNvSpPr>
-            <a:spLocks noGrp="1"/>
-          </p:cNvSpPr>
-          <p:nvPr>
-            <p:ph sz="half" idx="2"/>
-          </p:nvPr>
+            <a:r>
+              <a:rPr lang="de-DE" sz="800" dirty="0">
+                <a:solidFill>
+                  <a:srgbClr val="FFFFFF"/>
+                </a:solidFill>
+                <a:latin typeface="Arial"/>
+                <a:cs typeface="Arial"/>
+              </a:rPr>
+              <a:t>Pregatit </a:t>
+            </a:r>
+            <a:r>
+              <a:rPr lang="de-DE" sz="800" dirty="0" smtClean="0">
+                <a:solidFill>
+                  <a:srgbClr val="FFFFFF"/>
+                </a:solidFill>
+                <a:latin typeface="Arial"/>
+                <a:cs typeface="Arial"/>
+              </a:rPr>
+              <a:t>de</a:t>
+            </a:r>
+            <a:r>
+              <a:rPr lang="ro-RO" sz="800" dirty="0" smtClean="0">
+                <a:solidFill>
+                  <a:srgbClr val="FFFFFF"/>
+                </a:solidFill>
+                <a:latin typeface="Arial"/>
+                <a:cs typeface="Arial"/>
+              </a:rPr>
+              <a:t> Marcel Soare </a:t>
+            </a:r>
+            <a:r>
+              <a:rPr lang="de-DE" sz="800" dirty="0" smtClean="0">
+                <a:solidFill>
+                  <a:srgbClr val="FFFFFF"/>
+                </a:solidFill>
+                <a:latin typeface="Arial"/>
+                <a:cs typeface="Arial"/>
+              </a:rPr>
+              <a:t>Data</a:t>
+            </a:r>
+            <a:r>
+              <a:rPr lang="de-DE" sz="800" dirty="0">
+                <a:solidFill>
+                  <a:srgbClr val="FFFFFF"/>
+                </a:solidFill>
+                <a:latin typeface="Arial"/>
+                <a:cs typeface="Arial"/>
+              </a:rPr>
+              <a:t>: </a:t>
+            </a:r>
+            <a:r>
+              <a:rPr lang="en-US" sz="800" dirty="0" smtClean="0">
+                <a:solidFill>
+                  <a:srgbClr val="FFFFFF"/>
+                </a:solidFill>
+                <a:latin typeface="Arial"/>
+                <a:cs typeface="Arial"/>
+              </a:rPr>
+              <a:t>27.</a:t>
+            </a:r>
+            <a:r>
+              <a:rPr lang="de-DE" sz="800" dirty="0" smtClean="0">
+                <a:solidFill>
+                  <a:srgbClr val="FFFFFF"/>
+                </a:solidFill>
+                <a:latin typeface="Arial"/>
+                <a:cs typeface="Arial"/>
+              </a:rPr>
+              <a:t>04</a:t>
+            </a:r>
+            <a:r>
+              <a:rPr lang="en-US" sz="800" dirty="0" smtClean="0">
+                <a:solidFill>
+                  <a:srgbClr val="FFFFFF"/>
+                </a:solidFill>
+                <a:latin typeface="Arial"/>
+                <a:cs typeface="Arial"/>
+              </a:rPr>
+              <a:t>.</a:t>
+            </a:r>
+            <a:r>
+              <a:rPr lang="de-DE" sz="800" dirty="0" smtClean="0">
+                <a:solidFill>
+                  <a:srgbClr val="FFFFFF"/>
+                </a:solidFill>
+                <a:latin typeface="Arial"/>
+                <a:cs typeface="Arial"/>
+              </a:rPr>
+              <a:t>2015</a:t>
+            </a:r>
+            <a:endParaRPr lang="en-US" sz="800" dirty="0">
+              <a:solidFill>
+                <a:srgbClr val="FFFFFF"/>
+              </a:solidFill>
+              <a:latin typeface="Arial"/>
+              <a:cs typeface="Arial"/>
+            </a:endParaRPr>
+          </a:p>
+        </p:txBody>
+      </p:sp>
+      <p:sp>
+        <p:nvSpPr>
+          <p:cNvPr id="5" name="Title 1"/>
+          <p:cNvSpPr txBox="1">
+            <a:spLocks/>
+          </p:cNvSpPr>
+          <p:nvPr/>
         </p:nvSpPr>
         <p:spPr>
           <a:xfrm>
-            <a:off x="683568" y="1844824"/>
-            <a:ext cx="7920880" cy="4032448"/>
+            <a:off x="827584" y="4509120"/>
+            <a:ext cx="7704856" cy="1008112"/>
           </a:xfrm>
+          <a:prstGeom prst="rect">
+            <a:avLst/>
+          </a:prstGeom>
         </p:spPr>
         <p:txBody>
-          <a:bodyPr>
+          <a:bodyPr vert="horz" lIns="0" tIns="0" rIns="0" bIns="0" rtlCol="0" anchor="t" anchorCtr="0">
             <a:normAutofit/>
           </a:bodyPr>
           <a:lstStyle/>
           <a:p>
-            <a:endParaRPr lang="en-US" sz="2400" dirty="0" smtClean="0"/>
-          </a:p>
-          <a:p>
-            <a:endParaRPr lang="en-GB" baseline="30000" dirty="0"/>
-          </a:p>
-        </p:txBody>
-      </p:sp>
-      <p:sp>
-        <p:nvSpPr>
-          <p:cNvPr id="5" name="Content Placeholder 3"/>
-          <p:cNvSpPr>
-            <a:spLocks noGrp="1"/>
-          </p:cNvSpPr>
-          <p:nvPr>
-            <p:ph sz="quarter" idx="4"/>
-          </p:nvPr>
-        </p:nvSpPr>
-        <p:spPr>
-          <a:xfrm>
-            <a:off x="683568" y="1772816"/>
-            <a:ext cx="7920880" cy="4320480"/>
-          </a:xfrm>
-        </p:spPr>
-        <p:txBody>
-          <a:bodyPr>
-            <a:normAutofit/>
-          </a:bodyPr>
-          <a:lstStyle/>
-          <a:p>
-            <a:r>
-              <a:rPr lang="en-US" sz="2200" dirty="0" smtClean="0"/>
-              <a:t>is the language used to administer instances of the SQL Server Database Engine, to create and manage database objects, and to insert, retrieve, modify, and delete data</a:t>
-            </a:r>
-          </a:p>
-          <a:p>
-            <a:r>
-              <a:rPr lang="en-US" sz="2200" dirty="0" smtClean="0"/>
-              <a:t>is an extension of the language defined in the SQL standards published by the International Standards Organization (ISO) and the American National Standards Institute (ANSI)</a:t>
-            </a:r>
-          </a:p>
-          <a:p>
-            <a:r>
-              <a:rPr lang="en-US" sz="2200" dirty="0" smtClean="0"/>
-              <a:t>Data Definition Language</a:t>
-            </a:r>
-          </a:p>
-          <a:p>
-            <a:r>
-              <a:rPr lang="en-US" sz="2200" dirty="0" smtClean="0"/>
-              <a:t>Data Manipulation Language</a:t>
-            </a:r>
-          </a:p>
-          <a:p>
-            <a:endParaRPr lang="en-US" sz="2200" dirty="0" smtClean="0"/>
+            <a:pPr algn="ctr"/>
+            <a:r>
+              <a:rPr lang="en-US" sz="3600" i="1" dirty="0" smtClean="0">
+                <a:solidFill>
+                  <a:schemeClr val="bg1"/>
+                </a:solidFill>
+              </a:rPr>
+              <a:t>“</a:t>
+            </a:r>
+            <a:r>
+              <a:rPr lang="en-US" sz="3600" i="1" dirty="0" err="1" smtClean="0">
+                <a:solidFill>
+                  <a:schemeClr val="bg1"/>
+                </a:solidFill>
+              </a:rPr>
+              <a:t>DML</a:t>
+            </a:r>
+            <a:r>
+              <a:rPr lang="en-US" sz="3600" i="1" dirty="0" smtClean="0">
+                <a:solidFill>
+                  <a:schemeClr val="bg1"/>
+                </a:solidFill>
+              </a:rPr>
+              <a:t> Statements”</a:t>
+            </a:r>
+            <a:endParaRPr lang="en-US" sz="3600" dirty="0">
+              <a:solidFill>
+                <a:schemeClr val="bg1"/>
+              </a:solidFill>
+            </a:endParaRPr>
           </a:p>
         </p:txBody>
       </p:sp>
     </p:spTree>
     <p:extLst>
       <p:ext uri="{BB962C8B-B14F-4D97-AF65-F5344CB8AC3E}">
-        <p14:creationId xmlns:p14="http://schemas.microsoft.com/office/powerpoint/2010/main" val="826275463"/>
+        <p14:creationId xmlns:p14="http://schemas.microsoft.com/office/powerpoint/2010/main" val="1908241380"/>
       </p:ext>
     </p:extLst>
   </p:cSld>
   <p:clrMapOvr>
-    <a:overrideClrMapping bg1="lt1" tx1="dk1" bg2="lt2" tx2="dk2" accent1="accent1" accent2="accent2" accent3="accent3" accent4="accent4" accent5="accent5" accent6="accent6" hlink="hlink" folHlink="folHlink"/>
+    <a:masterClrMapping/>
   </p:clrMapOvr>
   <p:timing>
     <p:tnLst>
@@ -18765,33 +18835,41 @@
             <p:ph type="title"/>
           </p:nvPr>
         </p:nvSpPr>
-        <p:spPr/>
-        <p:txBody>
-          <a:bodyPr/>
-          <a:lstStyle/>
-          <a:p>
-            <a:r>
-              <a:rPr lang="en-US" dirty="0" smtClean="0"/>
-              <a:t>P</a:t>
-            </a:r>
-            <a:endParaRPr lang="en-US" dirty="0"/>
-          </a:p>
-        </p:txBody>
-      </p:sp>
-      <p:sp>
-        <p:nvSpPr>
-          <p:cNvPr id="3" name="Content Placeholder 2"/>
-          <p:cNvSpPr>
-            <a:spLocks noGrp="1"/>
-          </p:cNvSpPr>
-          <p:nvPr>
-            <p:ph sz="half" idx="2"/>
-          </p:nvPr>
-        </p:nvSpPr>
         <p:spPr>
           <a:xfrm>
-            <a:off x="720724" y="1773371"/>
-            <a:ext cx="7667700" cy="4499026"/>
+            <a:off x="323528" y="764704"/>
+            <a:ext cx="8424936" cy="593092"/>
+          </a:xfrm>
+        </p:spPr>
+        <p:txBody>
+          <a:bodyPr>
+            <a:noAutofit/>
+          </a:bodyPr>
+          <a:lstStyle/>
+          <a:p>
+            <a:pPr algn="ctr"/>
+            <a:r>
+              <a:rPr lang="en-US" sz="4400" dirty="0" smtClean="0"/>
+              <a:t>Agenda day 2</a:t>
+            </a:r>
+            <a:endParaRPr lang="en-US" sz="4400" dirty="0"/>
+          </a:p>
+        </p:txBody>
+      </p:sp>
+      <p:sp>
+        <p:nvSpPr>
+          <p:cNvPr id="4" name="Content Placeholder 3"/>
+          <p:cNvSpPr>
+            <a:spLocks noGrp="1"/>
+          </p:cNvSpPr>
+          <p:nvPr>
+            <p:ph sz="quarter" idx="4"/>
+          </p:nvPr>
+        </p:nvSpPr>
+        <p:spPr>
+          <a:xfrm>
+            <a:off x="683568" y="1844824"/>
+            <a:ext cx="7920880" cy="4032448"/>
           </a:xfrm>
         </p:spPr>
         <p:txBody>
@@ -18800,151 +18878,87 @@
           </a:bodyPr>
           <a:lstStyle/>
           <a:p>
-            <a:endParaRPr lang="en-US" sz="2200" dirty="0" smtClean="0"/>
-          </a:p>
-          <a:p>
-            <a:r>
-              <a:rPr lang="en-US" sz="2400" dirty="0" smtClean="0"/>
-              <a:t>Programs </a:t>
-            </a:r>
-            <a:r>
-              <a:rPr lang="en-US" sz="2400" dirty="0"/>
-              <a:t>are collections of instructions that tell a computer how to interact with the </a:t>
-            </a:r>
-            <a:r>
-              <a:rPr lang="en-US" sz="2400" dirty="0" smtClean="0"/>
-              <a:t>user</a:t>
-            </a:r>
-          </a:p>
-          <a:p>
-            <a:r>
-              <a:rPr lang="en-US" sz="2200" dirty="0"/>
-              <a:t>S</a:t>
-            </a:r>
-            <a:r>
-              <a:rPr lang="en-US" sz="2200" dirty="0" smtClean="0"/>
-              <a:t>equence </a:t>
-            </a:r>
-            <a:r>
-              <a:rPr lang="en-US" sz="2200" dirty="0"/>
-              <a:t>of commands (The right </a:t>
-            </a:r>
-            <a:r>
-              <a:rPr lang="en-US" sz="2200" dirty="0" smtClean="0"/>
-              <a:t>commands </a:t>
-            </a:r>
-            <a:r>
-              <a:rPr lang="en-US" sz="2200" dirty="0"/>
-              <a:t>in the right </a:t>
-            </a:r>
-            <a:r>
-              <a:rPr lang="en-US" sz="2200" dirty="0" smtClean="0"/>
-              <a:t>order)</a:t>
-            </a:r>
-          </a:p>
-          <a:p>
-            <a:r>
-              <a:rPr lang="en-US" sz="2200" dirty="0" smtClean="0"/>
-              <a:t>Variables</a:t>
-            </a:r>
-          </a:p>
-          <a:p>
-            <a:r>
-              <a:rPr lang="en-US" sz="2200" dirty="0" smtClean="0"/>
-              <a:t>Operators</a:t>
-            </a:r>
-          </a:p>
-          <a:p>
-            <a:r>
-              <a:rPr lang="en-US" sz="2200" dirty="0" smtClean="0"/>
-              <a:t>Constants</a:t>
-            </a:r>
-          </a:p>
-          <a:p>
-            <a:r>
-              <a:rPr lang="en-US" sz="2200" dirty="0" smtClean="0"/>
-              <a:t>Conditional </a:t>
-            </a:r>
-            <a:r>
-              <a:rPr lang="en-US" sz="2200" dirty="0"/>
-              <a:t>structures</a:t>
-            </a:r>
-          </a:p>
-          <a:p>
-            <a:r>
-              <a:rPr lang="en-US" sz="2200" dirty="0"/>
-              <a:t>Looping structures</a:t>
-            </a:r>
-          </a:p>
-          <a:p>
-            <a:endParaRPr lang="en-US" sz="2200" dirty="0"/>
-          </a:p>
-        </p:txBody>
-      </p:sp>
-      <p:sp>
-        <p:nvSpPr>
-          <p:cNvPr id="5" name="Title 1"/>
-          <p:cNvSpPr txBox="1">
-            <a:spLocks/>
-          </p:cNvSpPr>
-          <p:nvPr/>
+            <a:endParaRPr lang="en-US" sz="2400" dirty="0" smtClean="0"/>
+          </a:p>
+          <a:p>
+            <a:endParaRPr lang="en-GB" baseline="30000" dirty="0"/>
+          </a:p>
+        </p:txBody>
+      </p:sp>
+      <p:sp>
+        <p:nvSpPr>
+          <p:cNvPr id="5" name="Content Placeholder 3"/>
+          <p:cNvSpPr>
+            <a:spLocks noGrp="1"/>
+          </p:cNvSpPr>
+          <p:nvPr>
+            <p:ph sz="quarter" idx="4"/>
+          </p:nvPr>
         </p:nvSpPr>
         <p:spPr>
           <a:xfrm>
-            <a:off x="755576" y="764704"/>
-            <a:ext cx="7272808" cy="593092"/>
+            <a:off x="683568" y="1772816"/>
+            <a:ext cx="7920880" cy="4320480"/>
           </a:xfrm>
-          <a:prstGeom prst="rect">
-            <a:avLst/>
-          </a:prstGeom>
-          <a:solidFill>
-            <a:schemeClr val="bg1"/>
-          </a:solidFill>
         </p:spPr>
         <p:txBody>
-          <a:bodyPr vert="horz" lIns="36000" tIns="0" rIns="0" bIns="0" rtlCol="0" anchor="ctr">
-            <a:noAutofit/>
+          <a:bodyPr>
+            <a:normAutofit/>
           </a:bodyPr>
           <a:lstStyle/>
           <a:p>
-            <a:pPr marL="0" marR="0" lvl="0" indent="0" algn="ctr" defTabSz="914400" rtl="0" eaLnBrk="1" fontAlgn="auto" latinLnBrk="0" hangingPunct="1">
-              <a:lnSpc>
-                <a:spcPct val="100000"/>
-              </a:lnSpc>
-              <a:spcBef>
-                <a:spcPct val="0"/>
-              </a:spcBef>
-              <a:spcAft>
-                <a:spcPts val="0"/>
-              </a:spcAft>
-              <a:buClrTx/>
-              <a:buSzTx/>
-              <a:buFontTx/>
+            <a:r>
+              <a:rPr lang="en-GB" sz="4000" baseline="30000" dirty="0" smtClean="0"/>
+              <a:t>Simple Statements</a:t>
+            </a:r>
+          </a:p>
+          <a:p>
+            <a:r>
+              <a:rPr lang="en-GB" sz="4000" baseline="30000" dirty="0" smtClean="0"/>
+              <a:t>Retrieve data</a:t>
+            </a:r>
+          </a:p>
+          <a:p>
+            <a:r>
+              <a:rPr lang="en-GB" sz="4000" baseline="30000" dirty="0" smtClean="0"/>
+              <a:t>Filter</a:t>
+            </a:r>
+          </a:p>
+          <a:p>
+            <a:r>
+              <a:rPr lang="en-GB" sz="4000" baseline="30000" dirty="0" smtClean="0"/>
+              <a:t>Joins /union</a:t>
+            </a:r>
+          </a:p>
+          <a:p>
+            <a:r>
+              <a:rPr lang="en-GB" sz="4000" baseline="30000" dirty="0" smtClean="0"/>
+              <a:t>Ordering</a:t>
+            </a:r>
+          </a:p>
+          <a:p>
+            <a:r>
+              <a:rPr lang="en-GB" sz="4000" baseline="30000" dirty="0" smtClean="0"/>
+              <a:t>Aggregate </a:t>
+            </a:r>
+          </a:p>
+          <a:p>
+            <a:pPr>
               <a:buNone/>
-              <a:tabLst/>
-              <a:defRPr/>
             </a:pPr>
-            <a:r>
-              <a:rPr kumimoji="0" lang="en-US" sz="4400" b="0" i="0" u="none" strike="noStrike" kern="1200" cap="none" spc="0" normalizeH="0" baseline="0" noProof="0" dirty="0" smtClean="0">
-                <a:ln>
-                  <a:noFill/>
-                </a:ln>
-                <a:solidFill>
-                  <a:schemeClr val="tx1"/>
-                </a:solidFill>
-                <a:effectLst/>
-                <a:uLnTx/>
-                <a:uFillTx/>
-                <a:latin typeface="+mj-lt"/>
-                <a:ea typeface="+mj-ea"/>
-                <a:cs typeface="+mj-cs"/>
-              </a:rPr>
-              <a:t>Programming Concepts</a:t>
-            </a:r>
+            <a:endParaRPr lang="en-GB" sz="2800" baseline="30000" dirty="0" smtClean="0"/>
+          </a:p>
+          <a:p>
+            <a:endParaRPr lang="en-GB" sz="2800" baseline="30000" dirty="0" smtClean="0"/>
           </a:p>
         </p:txBody>
       </p:sp>
     </p:spTree>
+    <p:extLst>
+      <p:ext uri="{BB962C8B-B14F-4D97-AF65-F5344CB8AC3E}">
+        <p14:creationId xmlns:p14="http://schemas.microsoft.com/office/powerpoint/2010/main" val="826275463"/>
+      </p:ext>
+    </p:extLst>
   </p:cSld>
   <p:clrMapOvr>
     <a:masterClrMapping/>
@@ -19304,8 +19318,8 @@
         </p:nvSpPr>
         <p:spPr>
           <a:xfrm>
-            <a:off x="251520" y="692696"/>
-            <a:ext cx="8424936" cy="593092"/>
+            <a:off x="1907704" y="764704"/>
+            <a:ext cx="5472608" cy="521084"/>
           </a:xfrm>
         </p:spPr>
         <p:txBody>
@@ -21265,7 +21279,7 @@
               <a:buAutoNum type="arabicPeriod"/>
             </a:pPr>
             <a:r>
-              <a:rPr lang="en-US" sz="1600" b="1" dirty="0" smtClean="0">
+              <a:rPr lang="en-US" sz="2000" b="1" dirty="0" smtClean="0">
                 <a:solidFill>
                   <a:schemeClr val="tx2">
                     <a:lumMod val="60000"/>
@@ -21275,7 +21289,7 @@
               </a:rPr>
               <a:t>It is blank.</a:t>
             </a:r>
-            <a:endParaRPr lang="en-US" sz="1600" dirty="0" smtClean="0">
+            <a:endParaRPr lang="en-US" sz="2000" dirty="0" smtClean="0">
               <a:solidFill>
                 <a:schemeClr val="tx2">
                   <a:lumMod val="60000"/>
@@ -21290,14 +21304,14 @@
               <a:buAutoNum type="arabicPeriod"/>
             </a:pPr>
             <a:r>
-              <a:rPr lang="en-US" sz="1600" b="1" dirty="0" smtClean="0">
+              <a:rPr lang="en-US" sz="2000" b="1" dirty="0" smtClean="0">
                 <a:solidFill>
                   <a:srgbClr val="FF0000"/>
                 </a:solidFill>
               </a:rPr>
               <a:t>It is empty.</a:t>
             </a:r>
-            <a:endParaRPr lang="en-US" sz="1600" dirty="0" smtClean="0">
+            <a:endParaRPr lang="en-US" sz="2000" dirty="0" smtClean="0">
               <a:solidFill>
                 <a:srgbClr val="FF0000"/>
               </a:solidFill>
@@ -21309,10 +21323,10 @@
               <a:buAutoNum type="arabicPeriod"/>
             </a:pPr>
             <a:r>
-              <a:rPr lang="en-US" sz="1600" b="1" dirty="0" smtClean="0"/>
+              <a:rPr lang="en-US" sz="2000" b="1" dirty="0" smtClean="0"/>
               <a:t>It is zero.</a:t>
             </a:r>
-            <a:endParaRPr lang="en-US" sz="1600" dirty="0" smtClean="0"/>
+            <a:endParaRPr lang="en-US" sz="2000" dirty="0" smtClean="0"/>
           </a:p>
           <a:p>
             <a:pPr>
@@ -21320,14 +21334,14 @@
               <a:buAutoNum type="arabicPeriod"/>
             </a:pPr>
             <a:r>
-              <a:rPr lang="en-US" sz="1600" b="1" dirty="0" smtClean="0">
+              <a:rPr lang="en-US" sz="2000" b="1" dirty="0" smtClean="0">
                 <a:solidFill>
                   <a:srgbClr val="FFC000"/>
                 </a:solidFill>
               </a:rPr>
               <a:t>It is nothing.</a:t>
             </a:r>
-            <a:endParaRPr lang="en-US" sz="1600" dirty="0" smtClean="0">
+            <a:endParaRPr lang="en-US" sz="2000" dirty="0" smtClean="0">
               <a:solidFill>
                 <a:srgbClr val="FFC000"/>
               </a:solidFill>
@@ -21339,14 +21353,14 @@
               <a:buAutoNum type="arabicPeriod"/>
             </a:pPr>
             <a:r>
-              <a:rPr lang="en-US" sz="1600" b="1" dirty="0" smtClean="0">
+              <a:rPr lang="en-US" sz="2000" b="1" dirty="0" smtClean="0">
                 <a:solidFill>
                   <a:srgbClr val="FFFF00"/>
                 </a:solidFill>
               </a:rPr>
               <a:t>It is missing value.</a:t>
             </a:r>
-            <a:endParaRPr lang="en-US" sz="1600" dirty="0" smtClean="0">
+            <a:endParaRPr lang="en-US" sz="2000" dirty="0" smtClean="0">
               <a:solidFill>
                 <a:srgbClr val="FFFF00"/>
               </a:solidFill>
@@ -21358,7 +21372,7 @@
               <a:buAutoNum type="arabicPeriod"/>
             </a:pPr>
             <a:r>
-              <a:rPr lang="en-US" sz="1600" b="1" dirty="0" smtClean="0">
+              <a:rPr lang="en-US" sz="2000" b="1" dirty="0" smtClean="0">
                 <a:solidFill>
                   <a:schemeClr val="accent2">
                     <a:lumMod val="60000"/>
@@ -21368,7 +21382,7 @@
               </a:rPr>
               <a:t>It is the lowest value.</a:t>
             </a:r>
-            <a:endParaRPr lang="en-US" sz="1600" dirty="0" smtClean="0">
+            <a:endParaRPr lang="en-US" sz="2000" dirty="0" smtClean="0">
               <a:solidFill>
                 <a:schemeClr val="accent2">
                   <a:lumMod val="60000"/>
@@ -21383,14 +21397,14 @@
               <a:buAutoNum type="arabicPeriod"/>
             </a:pPr>
             <a:r>
-              <a:rPr lang="en-US" sz="1600" b="1" dirty="0" smtClean="0">
+              <a:rPr lang="en-US" sz="2000" b="1" dirty="0" smtClean="0">
                 <a:solidFill>
                   <a:srgbClr val="7030A0"/>
                 </a:solidFill>
               </a:rPr>
               <a:t>It is ignorable value.</a:t>
             </a:r>
-            <a:endParaRPr lang="en-US" sz="1600" dirty="0" smtClean="0">
+            <a:endParaRPr lang="en-US" sz="2000" dirty="0" smtClean="0">
               <a:solidFill>
                 <a:srgbClr val="7030A0"/>
               </a:solidFill>
@@ -21402,10 +21416,10 @@
               <a:buAutoNum type="arabicPeriod"/>
             </a:pPr>
             <a:r>
-              <a:rPr lang="en-US" sz="1600" b="1" dirty="0" smtClean="0"/>
+              <a:rPr lang="en-US" sz="2000" b="1" dirty="0" smtClean="0"/>
               <a:t>It is optional value.</a:t>
             </a:r>
-            <a:endParaRPr lang="en-US" sz="1600" dirty="0" smtClean="0"/>
+            <a:endParaRPr lang="en-US" sz="2000" dirty="0" smtClean="0"/>
           </a:p>
           <a:p>
             <a:pPr>
@@ -21413,14 +21427,14 @@
               <a:buAutoNum type="arabicPeriod"/>
             </a:pPr>
             <a:r>
-              <a:rPr lang="en-US" sz="1600" b="1" dirty="0" smtClean="0">
+              <a:rPr lang="en-US" sz="2000" b="1" dirty="0" smtClean="0">
                 <a:solidFill>
                   <a:srgbClr val="99CCFF"/>
                 </a:solidFill>
               </a:rPr>
               <a:t>It is invalid.</a:t>
             </a:r>
-            <a:endParaRPr lang="en-US" sz="1600" dirty="0" smtClean="0">
+            <a:endParaRPr lang="en-US" sz="2000" dirty="0" smtClean="0">
               <a:solidFill>
                 <a:srgbClr val="99CCFF"/>
               </a:solidFill>
@@ -21432,7 +21446,7 @@
               <a:buAutoNum type="arabicPeriod"/>
             </a:pPr>
             <a:r>
-              <a:rPr lang="en-US" sz="1600" b="1" dirty="0" smtClean="0">
+              <a:rPr lang="en-US" sz="2000" b="1" dirty="0" smtClean="0">
                 <a:solidFill>
                   <a:schemeClr val="accent6">
                     <a:lumMod val="75000"/>
@@ -21441,7 +21455,7 @@
               </a:rPr>
               <a:t>It is void.</a:t>
             </a:r>
-            <a:endParaRPr lang="en-US" sz="1600" dirty="0" smtClean="0">
+            <a:endParaRPr lang="en-US" sz="2000" dirty="0" smtClean="0">
               <a:solidFill>
                 <a:schemeClr val="accent6">
                   <a:lumMod val="75000"/>
@@ -21577,11 +21591,11 @@
           </a:p>
           <a:p>
             <a:r>
-              <a:rPr lang="en-US" sz="1800" dirty="0" smtClean="0"/>
+              <a:rPr lang="en-US" sz="2400" dirty="0" smtClean="0"/>
               <a:t>A value of </a:t>
             </a:r>
             <a:r>
-              <a:rPr lang="en-US" sz="1800" b="1" dirty="0" smtClean="0">
+              <a:rPr lang="en-US" sz="2400" b="1" dirty="0" smtClean="0">
                 <a:solidFill>
                   <a:schemeClr val="accent1"/>
                 </a:solidFill>
@@ -21589,17 +21603,17 @@
               <a:t>NULL</a:t>
             </a:r>
             <a:r>
-              <a:rPr lang="en-US" sz="1800" dirty="0" smtClean="0"/>
+              <a:rPr lang="en-US" sz="2400" dirty="0" smtClean="0"/>
               <a:t> indicates that the value is unknown</a:t>
             </a:r>
           </a:p>
           <a:p>
             <a:r>
-              <a:rPr lang="en-US" sz="1800" dirty="0" smtClean="0"/>
+              <a:rPr lang="en-US" sz="2400" dirty="0" smtClean="0"/>
               <a:t>A value of </a:t>
             </a:r>
             <a:r>
-              <a:rPr lang="en-US" sz="1800" b="1" dirty="0" smtClean="0">
+              <a:rPr lang="en-US" sz="2400" b="1" dirty="0" smtClean="0">
                 <a:solidFill>
                   <a:schemeClr val="accent1"/>
                 </a:solidFill>
@@ -21607,17 +21621,17 @@
               <a:t>NULL</a:t>
             </a:r>
             <a:r>
-              <a:rPr lang="en-US" sz="1800" dirty="0" smtClean="0"/>
+              <a:rPr lang="en-US" sz="2400" dirty="0" smtClean="0"/>
               <a:t> is different from an empty or zero value</a:t>
             </a:r>
           </a:p>
           <a:p>
             <a:r>
-              <a:rPr lang="en-US" sz="1800" dirty="0" smtClean="0"/>
+              <a:rPr lang="en-US" sz="2400" dirty="0" smtClean="0"/>
               <a:t>No two </a:t>
             </a:r>
             <a:r>
-              <a:rPr lang="en-US" sz="1800" b="1" dirty="0" smtClean="0">
+              <a:rPr lang="en-US" sz="2400" b="1" dirty="0" smtClean="0">
                 <a:solidFill>
                   <a:schemeClr val="accent1"/>
                 </a:solidFill>
@@ -21625,17 +21639,17 @@
               <a:t>NULL</a:t>
             </a:r>
             <a:r>
-              <a:rPr lang="en-US" sz="1800" dirty="0" smtClean="0"/>
+              <a:rPr lang="en-US" sz="2400" dirty="0" smtClean="0"/>
               <a:t> values are equal</a:t>
             </a:r>
           </a:p>
           <a:p>
             <a:r>
-              <a:rPr lang="en-US" sz="1800" dirty="0" smtClean="0"/>
+              <a:rPr lang="en-US" sz="2400" dirty="0" smtClean="0"/>
               <a:t>Comparisons between two null values, or between a </a:t>
             </a:r>
             <a:r>
-              <a:rPr lang="en-US" sz="1800" b="1" dirty="0" smtClean="0">
+              <a:rPr lang="en-US" sz="2400" b="1" dirty="0" smtClean="0">
                 <a:solidFill>
                   <a:schemeClr val="accent1"/>
                 </a:solidFill>
@@ -21643,11 +21657,11 @@
               <a:t>NULL</a:t>
             </a:r>
             <a:r>
-              <a:rPr lang="en-US" sz="1800" dirty="0" smtClean="0"/>
+              <a:rPr lang="en-US" sz="2400" dirty="0" smtClean="0"/>
               <a:t> and any other value, return unknown because the value of each </a:t>
             </a:r>
             <a:r>
-              <a:rPr lang="en-US" sz="1800" dirty="0" smtClean="0">
+              <a:rPr lang="en-US" sz="2400" dirty="0" smtClean="0">
                 <a:solidFill>
                   <a:schemeClr val="accent1"/>
                 </a:solidFill>
@@ -21655,7 +21669,7 @@
               <a:t>NULL</a:t>
             </a:r>
             <a:r>
-              <a:rPr lang="en-US" sz="1800" dirty="0" smtClean="0"/>
+              <a:rPr lang="en-US" sz="2400" dirty="0" smtClean="0"/>
               <a:t> is unknown</a:t>
             </a:r>
           </a:p>
@@ -21906,7 +21920,7 @@
           </a:p>
           <a:p>
             <a:r>
-              <a:rPr lang="en-US" sz="1800" dirty="0" smtClean="0"/>
+              <a:rPr lang="en-US" sz="2400" dirty="0" smtClean="0"/>
               <a:t>Order the result set of a query by the specified column list</a:t>
             </a:r>
           </a:p>
@@ -22174,36 +22188,74 @@
           <a:p>
             <a:pPr algn="ctr"/>
             <a:r>
-              <a:rPr lang="en-US" dirty="0" err="1" smtClean="0"/>
-              <a:t>JOINs</a:t>
+              <a:rPr lang="en-US" dirty="0" smtClean="0"/>
+              <a:t>GROUP BY</a:t>
             </a:r>
             <a:endParaRPr lang="en-US" dirty="0"/>
           </a:p>
         </p:txBody>
       </p:sp>
-      <p:pic>
-        <p:nvPicPr>
-          <p:cNvPr id="5" name="Content Placeholder 4" descr="Visual_SQL_JOINS_V2.png"/>
-          <p:cNvPicPr>
-            <a:picLocks noGrp="1" noChangeAspect="1"/>
-          </p:cNvPicPr>
+      <p:sp>
+        <p:nvSpPr>
+          <p:cNvPr id="4" name="Content Placeholder 3"/>
+          <p:cNvSpPr>
+            <a:spLocks noGrp="1"/>
+          </p:cNvSpPr>
           <p:nvPr>
             <p:ph sz="half" idx="2"/>
           </p:nvPr>
-        </p:nvPicPr>
-        <p:blipFill>
-          <a:blip r:embed="rId3" cstate="print"/>
-          <a:stretch>
-            <a:fillRect/>
-          </a:stretch>
-        </p:blipFill>
+        </p:nvSpPr>
         <p:spPr>
           <a:xfrm>
-            <a:off x="1619672" y="1844824"/>
-            <a:ext cx="5075411" cy="3992657"/>
+            <a:off x="720724" y="1773371"/>
+            <a:ext cx="7667700" cy="4499026"/>
           </a:xfrm>
         </p:spPr>
-      </p:pic>
+        <p:txBody>
+          <a:bodyPr>
+            <a:normAutofit/>
+          </a:bodyPr>
+          <a:lstStyle/>
+          <a:p>
+            <a:r>
+              <a:rPr lang="en-US" sz="2400" dirty="0" smtClean="0"/>
+              <a:t>Groups a selected set of rows into a set of summary rows by the values of one or more columns or expressions</a:t>
+            </a:r>
+          </a:p>
+          <a:p>
+            <a:r>
+              <a:rPr lang="en-US" sz="2400" dirty="0" smtClean="0"/>
+              <a:t>One row is returned for each group</a:t>
+            </a:r>
+          </a:p>
+          <a:p>
+            <a:r>
+              <a:rPr lang="en-US" sz="2400" dirty="0" smtClean="0"/>
+              <a:t>Aggregate functions (</a:t>
+            </a:r>
+            <a:r>
+              <a:rPr lang="en-US" sz="2400" b="1" dirty="0" err="1" smtClean="0">
+                <a:solidFill>
+                  <a:schemeClr val="accent1"/>
+                </a:solidFill>
+              </a:rPr>
+              <a:t>AVG</a:t>
+            </a:r>
+            <a:r>
+              <a:rPr lang="en-US" sz="2400" b="1" dirty="0" smtClean="0">
+                <a:solidFill>
+                  <a:schemeClr val="accent1"/>
+                </a:solidFill>
+              </a:rPr>
+              <a:t>, MIN, SUM, COUNT, MAX</a:t>
+            </a:r>
+            <a:r>
+              <a:rPr lang="en-US" sz="2400" dirty="0" smtClean="0"/>
+              <a:t>)</a:t>
+            </a:r>
+          </a:p>
+        </p:txBody>
+      </p:sp>
     </p:spTree>
   </p:cSld>
   <p:clrMapOvr>
@@ -22258,8 +22310,8 @@
           <a:p>
             <a:pPr algn="ctr"/>
             <a:r>
-              <a:rPr lang="en-US" dirty="0" err="1" smtClean="0"/>
-              <a:t>JOINs</a:t>
+              <a:rPr lang="en-US" dirty="0" smtClean="0"/>
+              <a:t>HAVING </a:t>
             </a:r>
             <a:endParaRPr lang="en-US" dirty="0"/>
           </a:p>
@@ -22267,7 +22319,7 @@
       </p:sp>
       <p:sp>
         <p:nvSpPr>
-          <p:cNvPr id="4" name="Content Placeholder 3"/>
+          <p:cNvPr id="6" name="Content Placeholder 5"/>
           <p:cNvSpPr>
             <a:spLocks noGrp="1"/>
           </p:cNvSpPr>
@@ -22277,7 +22329,7 @@
         </p:nvSpPr>
         <p:spPr>
           <a:xfrm>
-            <a:off x="720724" y="1773371"/>
+            <a:off x="720724" y="1772816"/>
             <a:ext cx="7667700" cy="4499026"/>
           </a:xfrm>
         </p:spPr>
@@ -22288,88 +22340,24 @@
           <a:lstStyle/>
           <a:p>
             <a:r>
-              <a:rPr lang="en-US" sz="1800" b="1" dirty="0" smtClean="0">
-                <a:solidFill>
-                  <a:schemeClr val="accent1"/>
-                </a:solidFill>
-              </a:rPr>
-              <a:t>INNER JOIN </a:t>
-            </a:r>
-            <a:r>
-              <a:rPr lang="en-US" sz="1800" dirty="0" smtClean="0"/>
-              <a:t>(the typical join operation, which uses some comparison operator like = or &lt;&gt;).</a:t>
-            </a:r>
-          </a:p>
-          <a:p>
-            <a:r>
-              <a:rPr lang="en-US" sz="1800" b="1" dirty="0" smtClean="0">
-                <a:solidFill>
-                  <a:schemeClr val="accent1"/>
-                </a:solidFill>
-              </a:rPr>
-              <a:t>INNER JOIN </a:t>
-            </a:r>
-            <a:r>
-              <a:rPr lang="en-US" sz="1800" dirty="0" smtClean="0"/>
-              <a:t>return rows only when there is at least one row from both tables that matches the join condition</a:t>
-            </a:r>
-          </a:p>
-          <a:p>
-            <a:r>
-              <a:rPr lang="en-US" sz="1800" b="1" dirty="0" smtClean="0">
-                <a:solidFill>
-                  <a:schemeClr val="accent1"/>
-                </a:solidFill>
-              </a:rPr>
-              <a:t>INNER JOIN </a:t>
-            </a:r>
-            <a:r>
-              <a:rPr lang="en-US" sz="1800" dirty="0" smtClean="0"/>
-              <a:t>joins eliminate the rows that do not match with a row from the other table</a:t>
-            </a:r>
-          </a:p>
-          <a:p>
-            <a:r>
-              <a:rPr lang="en-US" sz="1800" b="1" dirty="0" smtClean="0">
-                <a:solidFill>
-                  <a:schemeClr val="accent1"/>
-                </a:solidFill>
-              </a:rPr>
-              <a:t>Outer joins </a:t>
-            </a:r>
-            <a:r>
-              <a:rPr lang="en-US" sz="1800" dirty="0" smtClean="0"/>
-              <a:t>return all rows from at least one of the tables (LEFT, RIGHT)</a:t>
-            </a:r>
-          </a:p>
-          <a:p>
-            <a:r>
-              <a:rPr lang="en-US" sz="1800" b="1" dirty="0" smtClean="0">
-                <a:solidFill>
-                  <a:schemeClr val="accent1"/>
-                </a:solidFill>
-              </a:rPr>
-              <a:t>LEFT JOIN </a:t>
-            </a:r>
-            <a:r>
-              <a:rPr lang="en-US" sz="1800" dirty="0" smtClean="0"/>
-              <a:t>keyword returns all rows from the left table, with the matching rows in the right table. The result is NULL in the right side when there is no match</a:t>
-            </a:r>
-          </a:p>
-          <a:p>
-            <a:r>
-              <a:rPr lang="en-US" sz="1800" b="1" dirty="0" smtClean="0">
-                <a:solidFill>
-                  <a:schemeClr val="accent1"/>
-                </a:solidFill>
-              </a:rPr>
-              <a:t>RIGHT JOIN </a:t>
-            </a:r>
-            <a:r>
-              <a:rPr lang="en-US" sz="1800" dirty="0" smtClean="0"/>
-              <a:t>keyword returns all rows from the right table, with the matching rows in the left table. The result is NULL in the left side when there is no match</a:t>
-            </a:r>
-            <a:endParaRPr lang="en-US" sz="1800" dirty="0"/>
+              <a:rPr lang="en-US" sz="2400" dirty="0" smtClean="0"/>
+              <a:t>search condition for a group or an aggregate</a:t>
+            </a:r>
+          </a:p>
+          <a:p>
+            <a:r>
+              <a:rPr lang="en-US" sz="2400" dirty="0" smtClean="0"/>
+              <a:t>is typically used in a GROUP BY clause</a:t>
+            </a:r>
+          </a:p>
+          <a:p>
+            <a:r>
+              <a:rPr lang="en-US" sz="2400" dirty="0" smtClean="0"/>
+              <a:t>When GROUP BY is not used, HAVING behaves like a WHERE clause</a:t>
+            </a:r>
+          </a:p>
+          <a:p>
+            <a:endParaRPr lang="en-US" sz="2400" dirty="0"/>
           </a:p>
         </p:txBody>
       </p:sp>
@@ -22427,74 +22415,36 @@
           <a:p>
             <a:pPr algn="ctr"/>
             <a:r>
-              <a:rPr lang="en-US" dirty="0" smtClean="0"/>
-              <a:t>GROUP BY</a:t>
+              <a:rPr lang="en-US" dirty="0" err="1" smtClean="0"/>
+              <a:t>JOINs</a:t>
             </a:r>
             <a:endParaRPr lang="en-US" dirty="0"/>
           </a:p>
         </p:txBody>
       </p:sp>
-      <p:sp>
-        <p:nvSpPr>
-          <p:cNvPr id="4" name="Content Placeholder 3"/>
-          <p:cNvSpPr>
-            <a:spLocks noGrp="1"/>
-          </p:cNvSpPr>
+      <p:pic>
+        <p:nvPicPr>
+          <p:cNvPr id="5" name="Content Placeholder 4" descr="Visual_SQL_JOINS_V2.png"/>
+          <p:cNvPicPr>
+            <a:picLocks noGrp="1" noChangeAspect="1"/>
+          </p:cNvPicPr>
           <p:nvPr>
             <p:ph sz="half" idx="2"/>
           </p:nvPr>
-        </p:nvSpPr>
+        </p:nvPicPr>
+        <p:blipFill>
+          <a:blip r:embed="rId3" cstate="print"/>
+          <a:stretch>
+            <a:fillRect/>
+          </a:stretch>
+        </p:blipFill>
         <p:spPr>
           <a:xfrm>
-            <a:off x="720724" y="1773371"/>
-            <a:ext cx="7667700" cy="4499026"/>
+            <a:off x="1619672" y="1844824"/>
+            <a:ext cx="5075411" cy="3992657"/>
           </a:xfrm>
         </p:spPr>
-        <p:txBody>
-          <a:bodyPr>
-            <a:normAutofit/>
-          </a:bodyPr>
-          <a:lstStyle/>
-          <a:p>
-            <a:r>
-              <a:rPr lang="en-US" sz="2400" dirty="0" smtClean="0"/>
-              <a:t>Groups a selected set of rows into a set of summary rows by the values of one or more columns or expressions</a:t>
-            </a:r>
-          </a:p>
-          <a:p>
-            <a:r>
-              <a:rPr lang="en-US" sz="2400" dirty="0" smtClean="0"/>
-              <a:t>One row is returned for each group</a:t>
-            </a:r>
-          </a:p>
-          <a:p>
-            <a:r>
-              <a:rPr lang="en-US" sz="2400" dirty="0" smtClean="0"/>
-              <a:t>Aggregate functions (</a:t>
-            </a:r>
-            <a:r>
-              <a:rPr lang="en-US" sz="2400" b="1" dirty="0" err="1" smtClean="0">
-                <a:solidFill>
-                  <a:schemeClr val="accent1"/>
-                </a:solidFill>
-              </a:rPr>
-              <a:t>AVG</a:t>
-            </a:r>
-            <a:r>
-              <a:rPr lang="en-US" sz="2400" b="1" dirty="0" smtClean="0">
-                <a:solidFill>
-                  <a:schemeClr val="accent1"/>
-                </a:solidFill>
-              </a:rPr>
-              <a:t>, MIN, SUM, COUNT, MAX</a:t>
-            </a:r>
-            <a:r>
-              <a:rPr lang="en-US" sz="2400" dirty="0" smtClean="0"/>
-              <a:t>)</a:t>
-            </a:r>
-          </a:p>
-        </p:txBody>
-      </p:sp>
+      </p:pic>
     </p:spTree>
   </p:cSld>
   <p:clrMapOvr>
@@ -22549,8 +22499,8 @@
           <a:p>
             <a:pPr algn="ctr"/>
             <a:r>
-              <a:rPr lang="en-US" dirty="0" smtClean="0"/>
-              <a:t>HAVING </a:t>
+              <a:rPr lang="en-US" dirty="0" err="1" smtClean="0"/>
+              <a:t>JOINs</a:t>
             </a:r>
             <a:endParaRPr lang="en-US" dirty="0"/>
           </a:p>
@@ -22558,7 +22508,7 @@
       </p:sp>
       <p:sp>
         <p:nvSpPr>
-          <p:cNvPr id="6" name="Content Placeholder 5"/>
+          <p:cNvPr id="4" name="Content Placeholder 3"/>
           <p:cNvSpPr>
             <a:spLocks noGrp="1"/>
           </p:cNvSpPr>
@@ -22568,7 +22518,7 @@
         </p:nvSpPr>
         <p:spPr>
           <a:xfrm>
-            <a:off x="720724" y="1772816"/>
+            <a:off x="720724" y="1773371"/>
             <a:ext cx="7667700" cy="4499026"/>
           </a:xfrm>
         </p:spPr>
@@ -22579,24 +22529,88 @@
           <a:lstStyle/>
           <a:p>
             <a:r>
-              <a:rPr lang="en-US" sz="2400" dirty="0" smtClean="0"/>
-              <a:t>search condition for a group or an aggregate</a:t>
-            </a:r>
-          </a:p>
-          <a:p>
-            <a:r>
-              <a:rPr lang="en-US" sz="2400" dirty="0" smtClean="0"/>
-              <a:t>is typically used in a GROUP BY clause</a:t>
-            </a:r>
-          </a:p>
-          <a:p>
-            <a:r>
-              <a:rPr lang="en-US" sz="2400" dirty="0" smtClean="0"/>
-              <a:t>When GROUP BY is not used, HAVING behaves like a WHERE clause</a:t>
-            </a:r>
-          </a:p>
-          <a:p>
-            <a:endParaRPr lang="en-US" sz="2400" dirty="0"/>
+              <a:rPr lang="en-US" sz="1800" b="1" dirty="0" smtClean="0">
+                <a:solidFill>
+                  <a:schemeClr val="accent1"/>
+                </a:solidFill>
+              </a:rPr>
+              <a:t>INNER JOIN </a:t>
+            </a:r>
+            <a:r>
+              <a:rPr lang="en-US" sz="1800" dirty="0" smtClean="0"/>
+              <a:t>(the typical join operation, which uses some comparison operator like = or &lt;&gt;).</a:t>
+            </a:r>
+          </a:p>
+          <a:p>
+            <a:r>
+              <a:rPr lang="en-US" sz="1800" b="1" dirty="0" smtClean="0">
+                <a:solidFill>
+                  <a:schemeClr val="accent1"/>
+                </a:solidFill>
+              </a:rPr>
+              <a:t>INNER JOIN </a:t>
+            </a:r>
+            <a:r>
+              <a:rPr lang="en-US" sz="1800" dirty="0" smtClean="0"/>
+              <a:t>return rows only when there is at least one row from both tables that matches the join condition</a:t>
+            </a:r>
+          </a:p>
+          <a:p>
+            <a:r>
+              <a:rPr lang="en-US" sz="1800" b="1" dirty="0" smtClean="0">
+                <a:solidFill>
+                  <a:schemeClr val="accent1"/>
+                </a:solidFill>
+              </a:rPr>
+              <a:t>INNER JOIN </a:t>
+            </a:r>
+            <a:r>
+              <a:rPr lang="en-US" sz="1800" dirty="0" smtClean="0"/>
+              <a:t>joins eliminate the rows that do not match with a row from the other table</a:t>
+            </a:r>
+          </a:p>
+          <a:p>
+            <a:r>
+              <a:rPr lang="en-US" sz="1800" b="1" dirty="0" smtClean="0">
+                <a:solidFill>
+                  <a:schemeClr val="accent1"/>
+                </a:solidFill>
+              </a:rPr>
+              <a:t>Outer joins </a:t>
+            </a:r>
+            <a:r>
+              <a:rPr lang="en-US" sz="1800" dirty="0" smtClean="0"/>
+              <a:t>return all rows from at least one of the tables (LEFT, RIGHT)</a:t>
+            </a:r>
+          </a:p>
+          <a:p>
+            <a:r>
+              <a:rPr lang="en-US" sz="1800" b="1" dirty="0" smtClean="0">
+                <a:solidFill>
+                  <a:schemeClr val="accent1"/>
+                </a:solidFill>
+              </a:rPr>
+              <a:t>LEFT JOIN </a:t>
+            </a:r>
+            <a:r>
+              <a:rPr lang="en-US" sz="1800" dirty="0" smtClean="0"/>
+              <a:t>keyword returns all rows from the left table, with the matching rows in the right table. The result is NULL in the right side when there is no match</a:t>
+            </a:r>
+          </a:p>
+          <a:p>
+            <a:r>
+              <a:rPr lang="en-US" sz="1800" b="1" dirty="0" smtClean="0">
+                <a:solidFill>
+                  <a:schemeClr val="accent1"/>
+                </a:solidFill>
+              </a:rPr>
+              <a:t>RIGHT JOIN </a:t>
+            </a:r>
+            <a:r>
+              <a:rPr lang="en-US" sz="1800" dirty="0" smtClean="0"/>
+              <a:t>keyword returns all rows from the right table, with the matching rows in the left table. The result is NULL in the left side when there is no match</a:t>
+            </a:r>
+            <a:endParaRPr lang="en-US" sz="1800" dirty="0"/>
           </a:p>
         </p:txBody>
       </p:sp>

</xml_diff>

<commit_message>
updates on scripts and presentation
</commit_message>
<xml_diff>
--- a/presentation/SQL Z2H 2016.pptx
+++ b/presentation/SQL Z2H 2016.pptx
@@ -263,7 +263,7 @@
             <a:fld id="{A30BC2FF-3801-4EF5-A93B-A94D46A8EDF1}" type="datetimeFigureOut">
               <a:rPr lang="en-US" smtClean="0"/>
               <a:pPr/>
-              <a:t>7/4/2016</a:t>
+              <a:t>7/5/2016</a:t>
             </a:fld>
             <a:endParaRPr lang="en-US"/>
           </a:p>
@@ -942,13 +942,8 @@
             </a:pPr>
             <a:r>
               <a:rPr lang="en-US" baseline="0" dirty="0" smtClean="0"/>
-              <a:t>Details about features and editions: </a:t>
-            </a:r>
-            <a:r>
-              <a:rPr lang="en-US" baseline="0" dirty="0" err="1" smtClean="0"/>
-              <a:t>https://msdn.microsoft.com/library/cc645993.aspx</a:t>
-            </a:r>
-            <a:endParaRPr lang="en-US" baseline="0" dirty="0" smtClean="0"/>
+              <a:t>Details about features and editions: https://msdn.microsoft.com/library/cc645993.aspx</a:t>
+            </a:r>
           </a:p>
         </p:txBody>
       </p:sp>
@@ -4612,7 +4607,6 @@
               <a:rPr lang="en-US" baseline="0" dirty="0" smtClean="0"/>
               <a:t> created</a:t>
             </a:r>
-            <a:endParaRPr lang="en-US" baseline="0" dirty="0" smtClean="0"/>
           </a:p>
           <a:p>
             <a:endParaRPr lang="en-US" baseline="0" dirty="0" smtClean="0"/>
@@ -5023,11 +5017,7 @@
             </a:r>
             <a:r>
               <a:rPr lang="en-US" baseline="0" dirty="0" smtClean="0"/>
-              <a:t> de </a:t>
-            </a:r>
-            <a:r>
-              <a:rPr lang="en-US" baseline="0" dirty="0" smtClean="0"/>
-              <a:t>date</a:t>
+              <a:t> de date</a:t>
             </a:r>
           </a:p>
           <a:p>
@@ -5076,7 +5066,6 @@
               <a:rPr lang="en-US" baseline="0" dirty="0" smtClean="0"/>
               <a:t> de date</a:t>
             </a:r>
-            <a:endParaRPr lang="en-US" baseline="0" dirty="0" smtClean="0"/>
           </a:p>
           <a:p>
             <a:pPr marL="0" marR="0" indent="0" algn="l" defTabSz="914400" rtl="0" eaLnBrk="1" fontAlgn="auto" latinLnBrk="0" hangingPunct="1">
@@ -5356,7 +5345,6 @@
               <a:rPr lang="en-US" dirty="0" smtClean="0"/>
               <a:t>DML Triggers</a:t>
             </a:r>
-            <a:endParaRPr lang="en-US" dirty="0" smtClean="0"/>
           </a:p>
         </p:txBody>
       </p:sp>
@@ -8197,11 +8185,7 @@
           <a:p>
             <a:r>
               <a:rPr lang="en-US" baseline="0" dirty="0" smtClean="0"/>
-              <a:t>Topics: allow functions on select </a:t>
-            </a:r>
-            <a:r>
-              <a:rPr lang="en-US" baseline="0" dirty="0" smtClean="0"/>
-              <a:t>clause</a:t>
+              <a:t>Topics: allow functions on select clause</a:t>
             </a:r>
           </a:p>
           <a:p>
@@ -8212,7 +8196,6 @@
               <a:rPr lang="en-US" baseline="0" dirty="0" smtClean="0"/>
               <a:t>https://msdn.microsoft.com/en-us/library/ms189499.aspx</a:t>
             </a:r>
-            <a:endParaRPr lang="en-US" baseline="0" dirty="0" smtClean="0"/>
           </a:p>
           <a:p>
             <a:endParaRPr lang="en-US" baseline="0" dirty="0" smtClean="0"/>
@@ -11517,11 +11500,7 @@
             </a:r>
             <a:r>
               <a:rPr lang="en-US" dirty="0" smtClean="0"/>
-              <a:t> </a:t>
-            </a:r>
-            <a:r>
-              <a:rPr lang="en-US" dirty="0" smtClean="0"/>
-              <a:t>server</a:t>
+              <a:t> server</a:t>
             </a:r>
           </a:p>
           <a:p>
@@ -12118,7 +12097,7 @@
             <a:fld id="{4F88EE5D-E666-41E5-81D2-BB9A71F4DE66}" type="datetimeFigureOut">
               <a:rPr lang="en-US" smtClean="0"/>
               <a:pPr/>
-              <a:t>7/4/2016</a:t>
+              <a:t>7/5/2016</a:t>
             </a:fld>
             <a:endParaRPr lang="en-US"/>
           </a:p>
@@ -12285,7 +12264,7 @@
             <a:fld id="{4F88EE5D-E666-41E5-81D2-BB9A71F4DE66}" type="datetimeFigureOut">
               <a:rPr lang="en-US" smtClean="0"/>
               <a:pPr/>
-              <a:t>7/4/2016</a:t>
+              <a:t>7/5/2016</a:t>
             </a:fld>
             <a:endParaRPr lang="en-US"/>
           </a:p>
@@ -12462,7 +12441,7 @@
             <a:fld id="{4F88EE5D-E666-41E5-81D2-BB9A71F4DE66}" type="datetimeFigureOut">
               <a:rPr lang="en-US" smtClean="0"/>
               <a:pPr/>
-              <a:t>7/4/2016</a:t>
+              <a:t>7/5/2016</a:t>
             </a:fld>
             <a:endParaRPr lang="en-US"/>
           </a:p>
@@ -13000,7 +12979,7 @@
             <a:fld id="{4F88EE5D-E666-41E5-81D2-BB9A71F4DE66}" type="datetimeFigureOut">
               <a:rPr lang="en-US" smtClean="0"/>
               <a:pPr/>
-              <a:t>7/4/2016</a:t>
+              <a:t>7/5/2016</a:t>
             </a:fld>
             <a:endParaRPr lang="en-US"/>
           </a:p>
@@ -13243,7 +13222,7 @@
             <a:fld id="{4F88EE5D-E666-41E5-81D2-BB9A71F4DE66}" type="datetimeFigureOut">
               <a:rPr lang="en-US" smtClean="0"/>
               <a:pPr/>
-              <a:t>7/4/2016</a:t>
+              <a:t>7/5/2016</a:t>
             </a:fld>
             <a:endParaRPr lang="en-US"/>
           </a:p>
@@ -13528,7 +13507,7 @@
             <a:fld id="{4F88EE5D-E666-41E5-81D2-BB9A71F4DE66}" type="datetimeFigureOut">
               <a:rPr lang="en-US" smtClean="0"/>
               <a:pPr/>
-              <a:t>7/4/2016</a:t>
+              <a:t>7/5/2016</a:t>
             </a:fld>
             <a:endParaRPr lang="en-US"/>
           </a:p>
@@ -13947,7 +13926,7 @@
             <a:fld id="{4F88EE5D-E666-41E5-81D2-BB9A71F4DE66}" type="datetimeFigureOut">
               <a:rPr lang="en-US" smtClean="0"/>
               <a:pPr/>
-              <a:t>7/4/2016</a:t>
+              <a:t>7/5/2016</a:t>
             </a:fld>
             <a:endParaRPr lang="en-US"/>
           </a:p>
@@ -14062,7 +14041,7 @@
             <a:fld id="{4F88EE5D-E666-41E5-81D2-BB9A71F4DE66}" type="datetimeFigureOut">
               <a:rPr lang="en-US" smtClean="0"/>
               <a:pPr/>
-              <a:t>7/4/2016</a:t>
+              <a:t>7/5/2016</a:t>
             </a:fld>
             <a:endParaRPr lang="en-US"/>
           </a:p>
@@ -14154,7 +14133,7 @@
             <a:fld id="{4F88EE5D-E666-41E5-81D2-BB9A71F4DE66}" type="datetimeFigureOut">
               <a:rPr lang="en-US" smtClean="0"/>
               <a:pPr/>
-              <a:t>7/4/2016</a:t>
+              <a:t>7/5/2016</a:t>
             </a:fld>
             <a:endParaRPr lang="en-US"/>
           </a:p>
@@ -14428,7 +14407,7 @@
             <a:fld id="{4F88EE5D-E666-41E5-81D2-BB9A71F4DE66}" type="datetimeFigureOut">
               <a:rPr lang="en-US" smtClean="0"/>
               <a:pPr/>
-              <a:t>7/4/2016</a:t>
+              <a:t>7/5/2016</a:t>
             </a:fld>
             <a:endParaRPr lang="en-US"/>
           </a:p>
@@ -14678,7 +14657,7 @@
             <a:fld id="{4F88EE5D-E666-41E5-81D2-BB9A71F4DE66}" type="datetimeFigureOut">
               <a:rPr lang="en-US" smtClean="0"/>
               <a:pPr/>
-              <a:t>7/4/2016</a:t>
+              <a:t>7/5/2016</a:t>
             </a:fld>
             <a:endParaRPr lang="en-US"/>
           </a:p>
@@ -14888,7 +14867,7 @@
             <a:fld id="{4F88EE5D-E666-41E5-81D2-BB9A71F4DE66}" type="datetimeFigureOut">
               <a:rPr lang="en-US" smtClean="0"/>
               <a:pPr/>
-              <a:t>7/4/2016</a:t>
+              <a:t>7/5/2016</a:t>
             </a:fld>
             <a:endParaRPr lang="en-US"/>
           </a:p>
@@ -15358,14 +15337,14 @@
               <a:t>: </a:t>
             </a:r>
             <a:r>
-              <a:rPr lang="en-US" sz="800" smtClean="0">
+              <a:rPr lang="en-US" sz="800" dirty="0" smtClean="0">
                 <a:solidFill>
                   <a:srgbClr val="FFFFFF"/>
                 </a:solidFill>
                 <a:latin typeface="Arial"/>
                 <a:cs typeface="Arial"/>
               </a:rPr>
-              <a:t>25.</a:t>
+              <a:t>5.</a:t>
             </a:r>
             <a:r>
               <a:rPr lang="de-DE" sz="800" dirty="0" smtClean="0">
@@ -15375,27 +15354,7 @@
                 <a:latin typeface="Arial"/>
                 <a:cs typeface="Arial"/>
               </a:rPr>
-              <a:t>08</a:t>
-            </a:r>
-            <a:r>
-              <a:rPr lang="en-US" sz="800" dirty="0" smtClean="0">
-                <a:solidFill>
-                  <a:srgbClr val="FFFFFF"/>
-                </a:solidFill>
-                <a:latin typeface="Arial"/>
-                <a:cs typeface="Arial"/>
-              </a:rPr>
-              <a:t>.</a:t>
-            </a:r>
-            <a:r>
-              <a:rPr lang="de-DE" sz="800" dirty="0" smtClean="0">
-                <a:solidFill>
-                  <a:srgbClr val="FFFFFF"/>
-                </a:solidFill>
-                <a:latin typeface="Arial"/>
-                <a:cs typeface="Arial"/>
-              </a:rPr>
-              <a:t>2015</a:t>
+              <a:t>07.2016</a:t>
             </a:r>
             <a:endParaRPr lang="en-US" sz="800" dirty="0">
               <a:solidFill>
@@ -15831,7 +15790,6 @@
               <a:rPr lang="en-US" sz="2800" dirty="0" smtClean="0"/>
               <a:t>Books on line</a:t>
             </a:r>
-            <a:endParaRPr lang="en-US" sz="2800" dirty="0" smtClean="0"/>
           </a:p>
           <a:p>
             <a:pPr lvl="1"/>
@@ -15839,14 +15797,12 @@
               <a:rPr lang="en-US" sz="2400" dirty="0" smtClean="0"/>
               <a:t>offline</a:t>
             </a:r>
-            <a:endParaRPr lang="en-US" sz="2400" dirty="0" smtClean="0"/>
           </a:p>
           <a:p>
             <a:r>
               <a:rPr lang="en-US" sz="2800" dirty="0" smtClean="0"/>
               <a:t>Resources on internet</a:t>
             </a:r>
-            <a:endParaRPr lang="en-US" sz="2800" dirty="0" smtClean="0"/>
           </a:p>
           <a:p>
             <a:pPr lvl="1"/>
@@ -15989,7 +15945,6 @@
               <a:rPr lang="en-US" sz="2800" dirty="0" smtClean="0"/>
               <a:t>Tables </a:t>
             </a:r>
-            <a:endParaRPr lang="en-US" sz="2800" dirty="0" smtClean="0"/>
           </a:p>
           <a:p>
             <a:r>
@@ -17298,11 +17253,7 @@
             <a:pPr algn="ctr"/>
             <a:r>
               <a:rPr lang="en-US" sz="4400" dirty="0" smtClean="0"/>
-              <a:t>SSMS - Working </a:t>
-            </a:r>
-            <a:r>
-              <a:rPr lang="en-US" sz="4400" dirty="0" smtClean="0"/>
-              <a:t>Scenario</a:t>
+              <a:t>SSMS - Working Scenario</a:t>
             </a:r>
             <a:endParaRPr lang="en-US" sz="4400" dirty="0"/>
           </a:p>
@@ -17571,7 +17522,6 @@
               <a:rPr lang="en-US" sz="3200" dirty="0" smtClean="0"/>
               <a:t>Referential integrity</a:t>
             </a:r>
-            <a:endParaRPr lang="en-US" sz="3200" dirty="0" smtClean="0"/>
           </a:p>
           <a:p>
             <a:endParaRPr lang="en-US" sz="2200" dirty="0" smtClean="0"/>
@@ -17706,7 +17656,6 @@
               <a:rPr lang="en-US" sz="3200" dirty="0" smtClean="0"/>
               <a:t>Identity columns</a:t>
             </a:r>
-            <a:endParaRPr lang="en-US" sz="3200" dirty="0" smtClean="0"/>
           </a:p>
           <a:p>
             <a:endParaRPr lang="en-US" sz="2200" dirty="0" smtClean="0"/>
@@ -17821,7 +17770,6 @@
               <a:rPr lang="en-US" sz="3200" dirty="0" smtClean="0"/>
               <a:t>table</a:t>
             </a:r>
-            <a:endParaRPr lang="en-US" sz="3200" dirty="0" smtClean="0"/>
           </a:p>
           <a:p>
             <a:endParaRPr lang="en-US" sz="2200" dirty="0" smtClean="0"/>
@@ -17902,11 +17850,7 @@
             <a:pPr algn="ctr"/>
             <a:r>
               <a:rPr lang="en-US" sz="4400" dirty="0" smtClean="0"/>
-              <a:t>SSMS - Working </a:t>
-            </a:r>
-            <a:r>
-              <a:rPr lang="en-US" sz="4400" dirty="0" smtClean="0"/>
-              <a:t>Scenario</a:t>
+              <a:t>SSMS - Working Scenario</a:t>
             </a:r>
             <a:endParaRPr lang="en-US" sz="4400" dirty="0"/>
           </a:p>
@@ -17936,7 +17880,6 @@
               <a:rPr lang="en-US" sz="2400" dirty="0" smtClean="0"/>
               <a:t>Alter table</a:t>
             </a:r>
-            <a:endParaRPr lang="en-US" sz="2400" dirty="0" smtClean="0"/>
           </a:p>
           <a:p>
             <a:pPr lvl="1"/>
@@ -17955,11 +17898,7 @@
           <a:p>
             <a:r>
               <a:rPr lang="en-US" sz="2400" dirty="0" smtClean="0"/>
-              <a:t>Create </a:t>
-            </a:r>
-            <a:r>
-              <a:rPr lang="en-US" sz="2400" dirty="0" smtClean="0"/>
-              <a:t>relations</a:t>
+              <a:t>Create relations</a:t>
             </a:r>
           </a:p>
           <a:p>
@@ -18093,7 +18032,6 @@
               <a:rPr lang="en-US" sz="2400" dirty="0" smtClean="0"/>
               <a:t>Create a database : City</a:t>
             </a:r>
-            <a:endParaRPr lang="en-US" sz="2400" dirty="0" smtClean="0"/>
           </a:p>
           <a:p>
             <a:pPr lvl="1"/>
@@ -18130,11 +18068,7 @@
           <a:p>
             <a:r>
               <a:rPr lang="en-US" sz="2400" dirty="0" smtClean="0"/>
-              <a:t>Create </a:t>
-            </a:r>
-            <a:r>
-              <a:rPr lang="en-US" sz="2400" dirty="0" smtClean="0"/>
-              <a:t>relations between tables</a:t>
+              <a:t>Create relations between tables</a:t>
             </a:r>
           </a:p>
           <a:p>
@@ -23295,7 +23229,6 @@
               <a:rPr lang="en-US" sz="2800" dirty="0" smtClean="0"/>
               <a:t>service</a:t>
             </a:r>
-            <a:endParaRPr lang="en-US" sz="2800" dirty="0" smtClean="0"/>
           </a:p>
           <a:p>
             <a:r>

</xml_diff>

<commit_message>
update on insert statement
</commit_message>
<xml_diff>
--- a/presentation/SQL Z2H 2016.pptx
+++ b/presentation/SQL Z2H 2016.pptx
@@ -5,7 +5,7 @@
     <p:sldMasterId id="2147483648" r:id="rId1"/>
   </p:sldMasterIdLst>
   <p:notesMasterIdLst>
-    <p:notesMasterId r:id="rId57"/>
+    <p:notesMasterId r:id="rId61"/>
   </p:notesMasterIdLst>
   <p:sldIdLst>
     <p:sldId id="284" r:id="rId2"/>
@@ -53,16 +53,20 @@
     <p:sldId id="355" r:id="rId44"/>
     <p:sldId id="361" r:id="rId45"/>
     <p:sldId id="358" r:id="rId46"/>
-    <p:sldId id="362" r:id="rId47"/>
-    <p:sldId id="363" r:id="rId48"/>
-    <p:sldId id="364" r:id="rId49"/>
-    <p:sldId id="366" r:id="rId50"/>
-    <p:sldId id="367" r:id="rId51"/>
-    <p:sldId id="368" r:id="rId52"/>
-    <p:sldId id="375" r:id="rId53"/>
-    <p:sldId id="369" r:id="rId54"/>
-    <p:sldId id="370" r:id="rId55"/>
-    <p:sldId id="309" r:id="rId56"/>
+    <p:sldId id="366" r:id="rId47"/>
+    <p:sldId id="367" r:id="rId48"/>
+    <p:sldId id="362" r:id="rId49"/>
+    <p:sldId id="363" r:id="rId50"/>
+    <p:sldId id="364" r:id="rId51"/>
+    <p:sldId id="390" r:id="rId52"/>
+    <p:sldId id="392" r:id="rId53"/>
+    <p:sldId id="391" r:id="rId54"/>
+    <p:sldId id="393" r:id="rId55"/>
+    <p:sldId id="368" r:id="rId56"/>
+    <p:sldId id="375" r:id="rId57"/>
+    <p:sldId id="369" r:id="rId58"/>
+    <p:sldId id="370" r:id="rId59"/>
+    <p:sldId id="309" r:id="rId60"/>
   </p:sldIdLst>
   <p:sldSz cx="9144000" cy="6858000" type="screen4x3"/>
   <p:notesSz cx="6858000" cy="9144000"/>
@@ -263,7 +267,7 @@
             <a:fld id="{A30BC2FF-3801-4EF5-A93B-A94D46A8EDF1}" type="datetimeFigureOut">
               <a:rPr lang="en-US" smtClean="0"/>
               <a:pPr/>
-              <a:t>7/6/2016</a:t>
+              <a:t>7/7/2016</a:t>
             </a:fld>
             <a:endParaRPr lang="en-US"/>
           </a:p>
@@ -10642,165 +10646,108 @@
         </p:nvSpPr>
         <p:spPr/>
         <p:txBody>
-          <a:bodyPr/>
-          <a:lstStyle/>
-          <a:p>
-            <a:r>
-              <a:rPr lang="en-US" dirty="0" smtClean="0"/>
-              <a:t>Topics</a:t>
-            </a:r>
-          </a:p>
-          <a:p>
-            <a:r>
-              <a:rPr lang="en-US" dirty="0" smtClean="0"/>
-              <a:t>	Syntax:</a:t>
-            </a:r>
-            <a:r>
-              <a:rPr lang="en-US" baseline="0" dirty="0" smtClean="0"/>
-              <a:t> insert &lt;column&gt; values ()</a:t>
-            </a:r>
-          </a:p>
-          <a:p>
-            <a:r>
-              <a:rPr lang="en-US" baseline="0" dirty="0" smtClean="0"/>
-              <a:t>	Permissions</a:t>
-            </a:r>
-          </a:p>
-          <a:p>
-            <a:r>
-              <a:rPr lang="en-US" baseline="0" dirty="0" smtClean="0"/>
-              <a:t>	Create new tables </a:t>
-            </a:r>
-          </a:p>
-          <a:p>
-            <a:r>
-              <a:rPr lang="en-US" sz="1200" b="0" i="0" kern="1200" baseline="0" dirty="0" smtClean="0">
-                <a:solidFill>
-                  <a:schemeClr val="tx1"/>
-                </a:solidFill>
-                <a:effectLst/>
-                <a:latin typeface="+mn-lt"/>
-                <a:ea typeface="+mn-ea"/>
-                <a:cs typeface="+mn-cs"/>
-              </a:rPr>
-              <a:t>	</a:t>
-            </a:r>
-            <a:r>
-              <a:rPr lang="en-US" sz="1200" b="0" i="0" kern="1200" dirty="0" smtClean="0">
-                <a:solidFill>
-                  <a:schemeClr val="tx1"/>
-                </a:solidFill>
-                <a:effectLst/>
-                <a:latin typeface="+mn-lt"/>
-                <a:ea typeface="+mn-ea"/>
-                <a:cs typeface="+mn-cs"/>
-              </a:rPr>
-              <a:t>use INSERT INTO &lt;</a:t>
-            </a:r>
-            <a:r>
-              <a:rPr lang="en-US" sz="1200" b="0" i="0" kern="1200" dirty="0" err="1" smtClean="0">
-                <a:solidFill>
-                  <a:schemeClr val="tx1"/>
-                </a:solidFill>
-                <a:effectLst/>
-                <a:latin typeface="+mn-lt"/>
-                <a:ea typeface="+mn-ea"/>
-                <a:cs typeface="+mn-cs"/>
-              </a:rPr>
-              <a:t>target_table</a:t>
-            </a:r>
-            <a:r>
-              <a:rPr lang="en-US" sz="1200" b="0" i="0" kern="1200" dirty="0" smtClean="0">
-                <a:solidFill>
-                  <a:schemeClr val="tx1"/>
-                </a:solidFill>
-                <a:effectLst/>
-                <a:latin typeface="+mn-lt"/>
-                <a:ea typeface="+mn-ea"/>
-                <a:cs typeface="+mn-cs"/>
-              </a:rPr>
-              <a:t>&gt; SELECT &lt;columns&gt; FROM &lt;</a:t>
-            </a:r>
-            <a:r>
-              <a:rPr lang="en-US" sz="1200" b="0" i="0" kern="1200" dirty="0" err="1" smtClean="0">
-                <a:solidFill>
-                  <a:schemeClr val="tx1"/>
-                </a:solidFill>
-                <a:effectLst/>
-                <a:latin typeface="+mn-lt"/>
-                <a:ea typeface="+mn-ea"/>
-                <a:cs typeface="+mn-cs"/>
-              </a:rPr>
-              <a:t>source_table</a:t>
-            </a:r>
-            <a:r>
-              <a:rPr lang="en-US" sz="1200" b="0" i="0" kern="1200" dirty="0" smtClean="0">
-                <a:solidFill>
-                  <a:schemeClr val="tx1"/>
-                </a:solidFill>
-                <a:effectLst/>
-                <a:latin typeface="+mn-lt"/>
-                <a:ea typeface="+mn-ea"/>
-                <a:cs typeface="+mn-cs"/>
-              </a:rPr>
-              <a:t>&gt; to efficiently transfer a large number of rows from one table, such as a staging table, to another table with minimal logging</a:t>
-            </a:r>
+          <a:bodyPr>
+            <a:normAutofit/>
+          </a:bodyPr>
+          <a:lstStyle/>
+          <a:p>
+            <a:r>
+              <a:rPr lang="en-US" dirty="0" err="1" smtClean="0"/>
+              <a:t>Administrarea</a:t>
+            </a:r>
+            <a:r>
+              <a:rPr lang="en-US" baseline="0" dirty="0" smtClean="0"/>
+              <a:t> </a:t>
+            </a:r>
+            <a:r>
+              <a:rPr lang="en-US" baseline="0" dirty="0" err="1" smtClean="0"/>
+              <a:t>serverului</a:t>
+            </a:r>
+            <a:r>
+              <a:rPr lang="en-US" baseline="0" dirty="0" smtClean="0"/>
+              <a:t> de </a:t>
+            </a:r>
+            <a:r>
+              <a:rPr lang="en-US" baseline="0" dirty="0" err="1" smtClean="0"/>
+              <a:t>baze</a:t>
+            </a:r>
+            <a:r>
+              <a:rPr lang="en-US" baseline="0" dirty="0" smtClean="0"/>
+              <a:t> de date</a:t>
+            </a:r>
+          </a:p>
+          <a:p>
+            <a:pPr>
+              <a:buFontTx/>
+              <a:buChar char="-"/>
+            </a:pPr>
+            <a:r>
+              <a:rPr lang="en-US" baseline="0" dirty="0" smtClean="0"/>
+              <a:t>Security</a:t>
+            </a:r>
+          </a:p>
+          <a:p>
+            <a:pPr lvl="1">
+              <a:buFontTx/>
+              <a:buChar char="-"/>
+            </a:pPr>
+            <a:r>
+              <a:rPr lang="en-US" baseline="0" dirty="0" smtClean="0"/>
+              <a:t>User </a:t>
+            </a:r>
+          </a:p>
+          <a:p>
+            <a:pPr lvl="1">
+              <a:buFontTx/>
+              <a:buChar char="-"/>
+            </a:pPr>
+            <a:r>
+              <a:rPr lang="en-US" baseline="0" dirty="0" smtClean="0"/>
+              <a:t>Logins </a:t>
+            </a:r>
+          </a:p>
+          <a:p>
+            <a:pPr lvl="1">
+              <a:buFontTx/>
+              <a:buChar char="-"/>
+            </a:pPr>
+            <a:r>
+              <a:rPr lang="en-US" baseline="0" dirty="0" smtClean="0"/>
+              <a:t>Schemas</a:t>
+            </a:r>
+          </a:p>
+          <a:p>
+            <a:pPr lvl="1">
+              <a:buFontTx/>
+              <a:buChar char="-"/>
+            </a:pPr>
             <a:endParaRPr lang="en-US" baseline="0" dirty="0" smtClean="0"/>
           </a:p>
           <a:p>
-            <a:r>
-              <a:rPr lang="en-US" baseline="0" dirty="0" smtClean="0"/>
-              <a:t>	transaction </a:t>
-            </a:r>
-          </a:p>
-          <a:p>
-            <a:r>
-              <a:rPr lang="en-US" baseline="0" dirty="0" smtClean="0"/>
-              <a:t>	impact on performance</a:t>
-            </a:r>
-          </a:p>
-          <a:p>
-            <a:r>
-              <a:rPr lang="en-US" baseline="0" dirty="0" smtClean="0"/>
-              <a:t>	Apply functions on selected columns</a:t>
-            </a:r>
-          </a:p>
-          <a:p>
-            <a:r>
-              <a:rPr lang="en-US" baseline="0" dirty="0" smtClean="0"/>
-              <a:t>	IDENTITY columns – used for primary keys</a:t>
-            </a:r>
-          </a:p>
-          <a:p>
-            <a:r>
-              <a:rPr lang="en-US" baseline="0" dirty="0" smtClean="0"/>
-              <a:t>	SEQUENCE – used also for primary keys</a:t>
-            </a:r>
-          </a:p>
-          <a:p>
-            <a:r>
-              <a:rPr lang="en-US" baseline="0" dirty="0" err="1" smtClean="0"/>
-              <a:t>Bol</a:t>
-            </a:r>
-            <a:r>
-              <a:rPr lang="en-US" baseline="0" dirty="0" smtClean="0"/>
-              <a:t> Link</a:t>
-            </a:r>
-          </a:p>
-          <a:p>
-            <a:r>
-              <a:rPr lang="en-US" baseline="0" dirty="0" smtClean="0"/>
-              <a:t>	https://msdn.microsoft.com/en-us/library/ms174335.aspx#InsertExamples</a:t>
-            </a:r>
-          </a:p>
-          <a:p>
-            <a:endParaRPr lang="en-US" baseline="0" dirty="0" smtClean="0"/>
-          </a:p>
-          <a:p>
-            <a:r>
-              <a:rPr lang="en-US" baseline="0" dirty="0" smtClean="0"/>
-              <a:t>	</a:t>
-            </a:r>
+            <a:pPr>
+              <a:buFontTx/>
+              <a:buChar char="-"/>
+            </a:pPr>
+            <a:r>
+              <a:rPr lang="en-US" baseline="0" dirty="0" smtClean="0"/>
+              <a:t>back-up restore</a:t>
+            </a:r>
+          </a:p>
+          <a:p>
+            <a:pPr lvl="1">
+              <a:buFontTx/>
+              <a:buChar char="-"/>
+            </a:pPr>
+            <a:r>
+              <a:rPr lang="en-US" baseline="0" dirty="0" smtClean="0"/>
+              <a:t> </a:t>
+            </a:r>
+          </a:p>
+          <a:p>
+            <a:pPr>
+              <a:buFontTx/>
+              <a:buChar char="-"/>
+            </a:pPr>
             <a:endParaRPr lang="en-US" dirty="0"/>
           </a:p>
         </p:txBody>
@@ -10832,7 +10779,7 @@
     </p:spTree>
     <p:extLst>
       <p:ext uri="{BB962C8B-B14F-4D97-AF65-F5344CB8AC3E}">
-        <p14:creationId xmlns:p14="http://schemas.microsoft.com/office/powerpoint/2010/main" val="5408430"/>
+        <p14:creationId xmlns:p14="http://schemas.microsoft.com/office/powerpoint/2010/main" val="38883166"/>
       </p:ext>
     </p:extLst>
   </p:cSld>
@@ -10889,103 +10836,28 @@
           <a:lstStyle/>
           <a:p>
             <a:r>
-              <a:rPr lang="en-US" dirty="0" err="1" smtClean="0"/>
-              <a:t>Administrarea</a:t>
-            </a:r>
-            <a:r>
-              <a:rPr lang="en-US" baseline="0" dirty="0" smtClean="0"/>
-              <a:t> </a:t>
-            </a:r>
-            <a:r>
-              <a:rPr lang="en-US" baseline="0" dirty="0" err="1" smtClean="0"/>
-              <a:t>serverului</a:t>
-            </a:r>
-            <a:r>
-              <a:rPr lang="en-US" baseline="0" dirty="0" smtClean="0"/>
-              <a:t> de </a:t>
-            </a:r>
-            <a:r>
-              <a:rPr lang="en-US" baseline="0" dirty="0" err="1" smtClean="0"/>
-              <a:t>baze</a:t>
-            </a:r>
-            <a:r>
-              <a:rPr lang="en-US" baseline="0" dirty="0" smtClean="0"/>
-              <a:t> de date</a:t>
-            </a:r>
-          </a:p>
-          <a:p>
-            <a:pPr>
-              <a:buFontTx/>
-              <a:buChar char="-"/>
-            </a:pPr>
-            <a:r>
-              <a:rPr lang="en-US" baseline="0" dirty="0" smtClean="0"/>
-              <a:t>Security</a:t>
-            </a:r>
-          </a:p>
-          <a:p>
-            <a:pPr lvl="1">
-              <a:buFontTx/>
-              <a:buChar char="-"/>
-            </a:pPr>
-            <a:r>
-              <a:rPr lang="en-US" baseline="0" dirty="0" smtClean="0"/>
-              <a:t>User </a:t>
-            </a:r>
-          </a:p>
-          <a:p>
-            <a:pPr lvl="1">
-              <a:buFontTx/>
-              <a:buChar char="-"/>
-            </a:pPr>
-            <a:r>
-              <a:rPr lang="en-US" baseline="0" dirty="0" smtClean="0"/>
-              <a:t>Logins </a:t>
-            </a:r>
-          </a:p>
-          <a:p>
-            <a:pPr lvl="1">
-              <a:buFontTx/>
-              <a:buChar char="-"/>
-            </a:pPr>
-            <a:r>
-              <a:rPr lang="en-US" baseline="0" dirty="0" smtClean="0"/>
-              <a:t>Schemas</a:t>
-            </a:r>
-          </a:p>
-          <a:p>
-            <a:pPr lvl="1">
-              <a:buFontTx/>
-              <a:buChar char="-"/>
-            </a:pPr>
-            <a:endParaRPr lang="en-US" baseline="0" dirty="0" smtClean="0"/>
-          </a:p>
-          <a:p>
-            <a:pPr>
-              <a:buFontTx/>
-              <a:buChar char="-"/>
-            </a:pPr>
-            <a:r>
-              <a:rPr lang="en-US" baseline="0" dirty="0" smtClean="0"/>
-              <a:t>back-up restore</a:t>
-            </a:r>
-          </a:p>
-          <a:p>
-            <a:pPr lvl="1">
-              <a:buFontTx/>
-              <a:buChar char="-"/>
-            </a:pPr>
-            <a:r>
-              <a:rPr lang="en-US" baseline="0" dirty="0" smtClean="0"/>
-              <a:t> </a:t>
-            </a:r>
-          </a:p>
-          <a:p>
-            <a:pPr>
-              <a:buFontTx/>
-              <a:buChar char="-"/>
-            </a:pPr>
-            <a:endParaRPr lang="en-US" dirty="0"/>
+              <a:rPr lang="en-GB" sz="1200" dirty="0" smtClean="0"/>
+              <a:t>Understanding SQL Server Security</a:t>
+            </a:r>
+          </a:p>
+          <a:p>
+            <a:r>
+              <a:rPr lang="en-GB" sz="1200" dirty="0" smtClean="0"/>
+              <a:t>Securing SQL Server databases and objects</a:t>
+            </a:r>
+          </a:p>
+          <a:p>
+            <a:r>
+              <a:rPr lang="en-GB" sz="1200" dirty="0" smtClean="0"/>
+              <a:t>Using SSMS to backup SQL Server databases</a:t>
+            </a:r>
+          </a:p>
+          <a:p>
+            <a:r>
+              <a:rPr lang="en-GB" sz="1200" dirty="0" smtClean="0"/>
+              <a:t>Using SSMS to restore SQL Server databases</a:t>
+            </a:r>
+            <a:endParaRPr lang="en-GB" sz="1200" dirty="0"/>
           </a:p>
         </p:txBody>
       </p:sp>
@@ -11007,7 +10879,7 @@
             <a:fld id="{EDDFAA07-3B04-4F4C-AB8C-BB35A2248691}" type="slidenum">
               <a:rPr lang="en-US" smtClean="0"/>
               <a:pPr/>
-              <a:t>49</a:t>
+              <a:t>47</a:t>
             </a:fld>
             <a:endParaRPr lang="en-US"/>
           </a:p>
@@ -11016,7 +10888,7 @@
     </p:spTree>
     <p:extLst>
       <p:ext uri="{BB962C8B-B14F-4D97-AF65-F5344CB8AC3E}">
-        <p14:creationId xmlns:p14="http://schemas.microsoft.com/office/powerpoint/2010/main" val="38883166"/>
+        <p14:creationId xmlns:p14="http://schemas.microsoft.com/office/powerpoint/2010/main" val="1401794392"/>
       </p:ext>
     </p:extLst>
   </p:cSld>
@@ -11067,34 +10939,166 @@
         </p:nvSpPr>
         <p:spPr/>
         <p:txBody>
-          <a:bodyPr>
-            <a:normAutofit/>
-          </a:bodyPr>
-          <a:lstStyle/>
-          <a:p>
-            <a:r>
-              <a:rPr lang="en-GB" sz="1200" dirty="0" smtClean="0"/>
-              <a:t>Understanding SQL Server Security</a:t>
-            </a:r>
-          </a:p>
-          <a:p>
-            <a:r>
-              <a:rPr lang="en-GB" sz="1200" dirty="0" smtClean="0"/>
-              <a:t>Securing SQL Server databases and objects</a:t>
-            </a:r>
-          </a:p>
-          <a:p>
-            <a:r>
-              <a:rPr lang="en-GB" sz="1200" dirty="0" smtClean="0"/>
-              <a:t>Using SSMS to backup SQL Server databases</a:t>
-            </a:r>
-          </a:p>
-          <a:p>
-            <a:r>
-              <a:rPr lang="en-GB" sz="1200" dirty="0" smtClean="0"/>
-              <a:t>Using SSMS to restore SQL Server databases</a:t>
-            </a:r>
-            <a:endParaRPr lang="en-GB" sz="1200" dirty="0"/>
+          <a:bodyPr/>
+          <a:lstStyle/>
+          <a:p>
+            <a:r>
+              <a:rPr lang="en-US" dirty="0" smtClean="0"/>
+              <a:t>Topics</a:t>
+            </a:r>
+          </a:p>
+          <a:p>
+            <a:r>
+              <a:rPr lang="en-US" dirty="0" smtClean="0"/>
+              <a:t>	Syntax:</a:t>
+            </a:r>
+            <a:r>
+              <a:rPr lang="en-US" baseline="0" dirty="0" smtClean="0"/>
+              <a:t> insert &lt;column&gt; values ()</a:t>
+            </a:r>
+          </a:p>
+          <a:p>
+            <a:r>
+              <a:rPr lang="en-US" baseline="0" dirty="0" smtClean="0"/>
+              <a:t>	Permissions</a:t>
+            </a:r>
+          </a:p>
+          <a:p>
+            <a:r>
+              <a:rPr lang="en-US" baseline="0" dirty="0" smtClean="0"/>
+              <a:t>	Create new tables </a:t>
+            </a:r>
+          </a:p>
+          <a:p>
+            <a:r>
+              <a:rPr lang="en-US" sz="1200" b="0" i="0" kern="1200" baseline="0" dirty="0" smtClean="0">
+                <a:solidFill>
+                  <a:schemeClr val="tx1"/>
+                </a:solidFill>
+                <a:effectLst/>
+                <a:latin typeface="+mn-lt"/>
+                <a:ea typeface="+mn-ea"/>
+                <a:cs typeface="+mn-cs"/>
+              </a:rPr>
+              <a:t>	</a:t>
+            </a:r>
+            <a:r>
+              <a:rPr lang="en-US" sz="1200" b="0" i="0" kern="1200" dirty="0" smtClean="0">
+                <a:solidFill>
+                  <a:schemeClr val="tx1"/>
+                </a:solidFill>
+                <a:effectLst/>
+                <a:latin typeface="+mn-lt"/>
+                <a:ea typeface="+mn-ea"/>
+                <a:cs typeface="+mn-cs"/>
+              </a:rPr>
+              <a:t>use INSERT INTO &lt;</a:t>
+            </a:r>
+            <a:r>
+              <a:rPr lang="en-US" sz="1200" b="0" i="0" kern="1200" dirty="0" err="1" smtClean="0">
+                <a:solidFill>
+                  <a:schemeClr val="tx1"/>
+                </a:solidFill>
+                <a:effectLst/>
+                <a:latin typeface="+mn-lt"/>
+                <a:ea typeface="+mn-ea"/>
+                <a:cs typeface="+mn-cs"/>
+              </a:rPr>
+              <a:t>target_table</a:t>
+            </a:r>
+            <a:r>
+              <a:rPr lang="en-US" sz="1200" b="0" i="0" kern="1200" dirty="0" smtClean="0">
+                <a:solidFill>
+                  <a:schemeClr val="tx1"/>
+                </a:solidFill>
+                <a:effectLst/>
+                <a:latin typeface="+mn-lt"/>
+                <a:ea typeface="+mn-ea"/>
+                <a:cs typeface="+mn-cs"/>
+              </a:rPr>
+              <a:t>&gt; SELECT &lt;columns&gt; FROM &lt;</a:t>
+            </a:r>
+            <a:r>
+              <a:rPr lang="en-US" sz="1200" b="0" i="0" kern="1200" dirty="0" err="1" smtClean="0">
+                <a:solidFill>
+                  <a:schemeClr val="tx1"/>
+                </a:solidFill>
+                <a:effectLst/>
+                <a:latin typeface="+mn-lt"/>
+                <a:ea typeface="+mn-ea"/>
+                <a:cs typeface="+mn-cs"/>
+              </a:rPr>
+              <a:t>source_table</a:t>
+            </a:r>
+            <a:r>
+              <a:rPr lang="en-US" sz="1200" b="0" i="0" kern="1200" dirty="0" smtClean="0">
+                <a:solidFill>
+                  <a:schemeClr val="tx1"/>
+                </a:solidFill>
+                <a:effectLst/>
+                <a:latin typeface="+mn-lt"/>
+                <a:ea typeface="+mn-ea"/>
+                <a:cs typeface="+mn-cs"/>
+              </a:rPr>
+              <a:t>&gt; to efficiently transfer a large number of rows from one table, such as a staging table, to another table with minimal logging</a:t>
+            </a:r>
+            <a:endParaRPr lang="en-US" baseline="0" dirty="0" smtClean="0"/>
+          </a:p>
+          <a:p>
+            <a:r>
+              <a:rPr lang="en-US" baseline="0" dirty="0" smtClean="0"/>
+              <a:t>	transaction </a:t>
+            </a:r>
+          </a:p>
+          <a:p>
+            <a:r>
+              <a:rPr lang="en-US" baseline="0" dirty="0" smtClean="0"/>
+              <a:t>	impact on performance</a:t>
+            </a:r>
+          </a:p>
+          <a:p>
+            <a:r>
+              <a:rPr lang="en-US" baseline="0" dirty="0" smtClean="0"/>
+              <a:t>	Apply functions on selected columns</a:t>
+            </a:r>
+          </a:p>
+          <a:p>
+            <a:r>
+              <a:rPr lang="en-US" baseline="0" dirty="0" smtClean="0"/>
+              <a:t>	IDENTITY columns – used for primary keys</a:t>
+            </a:r>
+          </a:p>
+          <a:p>
+            <a:r>
+              <a:rPr lang="en-US" baseline="0" dirty="0" smtClean="0"/>
+              <a:t>	SEQUENCE – used also for primary keys</a:t>
+            </a:r>
+          </a:p>
+          <a:p>
+            <a:r>
+              <a:rPr lang="en-US" baseline="0" dirty="0" err="1" smtClean="0"/>
+              <a:t>Bol</a:t>
+            </a:r>
+            <a:r>
+              <a:rPr lang="en-US" baseline="0" dirty="0" smtClean="0"/>
+              <a:t> Link</a:t>
+            </a:r>
+          </a:p>
+          <a:p>
+            <a:r>
+              <a:rPr lang="en-US" baseline="0" dirty="0" smtClean="0"/>
+              <a:t>	https://msdn.microsoft.com/en-us/library/ms174335.aspx#InsertExamples</a:t>
+            </a:r>
+          </a:p>
+          <a:p>
+            <a:endParaRPr lang="en-US" baseline="0" dirty="0" smtClean="0"/>
+          </a:p>
+          <a:p>
+            <a:r>
+              <a:rPr lang="en-US" baseline="0" dirty="0" smtClean="0"/>
+              <a:t>	</a:t>
+            </a:r>
+            <a:endParaRPr lang="en-US" dirty="0"/>
           </a:p>
         </p:txBody>
       </p:sp>
@@ -11116,7 +11120,7 @@
             <a:fld id="{EDDFAA07-3B04-4F4C-AB8C-BB35A2248691}" type="slidenum">
               <a:rPr lang="en-US" smtClean="0"/>
               <a:pPr/>
-              <a:t>50</a:t>
+              <a:t>48</a:t>
             </a:fld>
             <a:endParaRPr lang="en-US"/>
           </a:p>
@@ -11125,7 +11129,98 @@
     </p:spTree>
     <p:extLst>
       <p:ext uri="{BB962C8B-B14F-4D97-AF65-F5344CB8AC3E}">
-        <p14:creationId xmlns:p14="http://schemas.microsoft.com/office/powerpoint/2010/main" val="1401794392"/>
+        <p14:creationId xmlns:p14="http://schemas.microsoft.com/office/powerpoint/2010/main" val="5408430"/>
+      </p:ext>
+    </p:extLst>
+  </p:cSld>
+  <p:clrMapOvr>
+    <a:masterClrMapping/>
+  </p:clrMapOvr>
+</p:notes>
+</file>
+
+<file path=ppt/notesSlides/notesSlide49.xml><?xml version="1.0" encoding="utf-8"?>
+<p:notes xmlns:a="http://schemas.openxmlformats.org/drawingml/2006/main" xmlns:r="http://schemas.openxmlformats.org/officeDocument/2006/relationships" xmlns:p="http://schemas.openxmlformats.org/presentationml/2006/main">
+  <p:cSld>
+    <p:spTree>
+      <p:nvGrpSpPr>
+        <p:cNvPr id="1" name=""/>
+        <p:cNvGrpSpPr/>
+        <p:nvPr/>
+      </p:nvGrpSpPr>
+      <p:grpSpPr>
+        <a:xfrm>
+          <a:off x="0" y="0"/>
+          <a:ext cx="0" cy="0"/>
+          <a:chOff x="0" y="0"/>
+          <a:chExt cx="0" cy="0"/>
+        </a:xfrm>
+      </p:grpSpPr>
+      <p:sp>
+        <p:nvSpPr>
+          <p:cNvPr id="2" name="Slide Image Placeholder 1"/>
+          <p:cNvSpPr>
+            <a:spLocks noGrp="1" noRot="1" noChangeAspect="1"/>
+          </p:cNvSpPr>
+          <p:nvPr>
+            <p:ph type="sldImg"/>
+          </p:nvPr>
+        </p:nvSpPr>
+        <p:spPr/>
+      </p:sp>
+      <p:sp>
+        <p:nvSpPr>
+          <p:cNvPr id="3" name="Notes Placeholder 2"/>
+          <p:cNvSpPr>
+            <a:spLocks noGrp="1"/>
+          </p:cNvSpPr>
+          <p:nvPr>
+            <p:ph type="body" idx="1"/>
+          </p:nvPr>
+        </p:nvSpPr>
+        <p:spPr/>
+        <p:txBody>
+          <a:bodyPr/>
+          <a:lstStyle/>
+          <a:p>
+            <a:r>
+              <a:rPr lang="en-US" dirty="0" smtClean="0"/>
+              <a:t>https://msdn.microsoft.com/en-us/library/ms177523.aspx</a:t>
+            </a:r>
+          </a:p>
+          <a:p>
+            <a:endParaRPr lang="en-US" dirty="0"/>
+          </a:p>
+        </p:txBody>
+      </p:sp>
+      <p:sp>
+        <p:nvSpPr>
+          <p:cNvPr id="4" name="Slide Number Placeholder 3"/>
+          <p:cNvSpPr>
+            <a:spLocks noGrp="1"/>
+          </p:cNvSpPr>
+          <p:nvPr>
+            <p:ph type="sldNum" sz="quarter" idx="10"/>
+          </p:nvPr>
+        </p:nvSpPr>
+        <p:spPr/>
+        <p:txBody>
+          <a:bodyPr/>
+          <a:lstStyle/>
+          <a:p>
+            <a:fld id="{EDDFAA07-3B04-4F4C-AB8C-BB35A2248691}" type="slidenum">
+              <a:rPr lang="en-US" smtClean="0"/>
+              <a:pPr/>
+              <a:t>49</a:t>
+            </a:fld>
+            <a:endParaRPr lang="en-US"/>
+          </a:p>
+        </p:txBody>
+      </p:sp>
+    </p:spTree>
+    <p:extLst>
+      <p:ext uri="{BB962C8B-B14F-4D97-AF65-F5344CB8AC3E}">
+        <p14:creationId xmlns:p14="http://schemas.microsoft.com/office/powerpoint/2010/main" val="1286248290"/>
       </p:ext>
     </p:extLst>
   </p:cSld>
@@ -11447,6 +11542,95 @@
     <p:extLst>
       <p:ext uri="{BB962C8B-B14F-4D97-AF65-F5344CB8AC3E}">
         <p14:creationId xmlns:p14="http://schemas.microsoft.com/office/powerpoint/2010/main" val="2113475915"/>
+      </p:ext>
+    </p:extLst>
+  </p:cSld>
+  <p:clrMapOvr>
+    <a:masterClrMapping/>
+  </p:clrMapOvr>
+</p:notes>
+</file>
+
+<file path=ppt/notesSlides/notesSlide50.xml><?xml version="1.0" encoding="utf-8"?>
+<p:notes xmlns:a="http://schemas.openxmlformats.org/drawingml/2006/main" xmlns:r="http://schemas.openxmlformats.org/officeDocument/2006/relationships" xmlns:p="http://schemas.openxmlformats.org/presentationml/2006/main">
+  <p:cSld>
+    <p:spTree>
+      <p:nvGrpSpPr>
+        <p:cNvPr id="1" name=""/>
+        <p:cNvGrpSpPr/>
+        <p:nvPr/>
+      </p:nvGrpSpPr>
+      <p:grpSpPr>
+        <a:xfrm>
+          <a:off x="0" y="0"/>
+          <a:ext cx="0" cy="0"/>
+          <a:chOff x="0" y="0"/>
+          <a:chExt cx="0" cy="0"/>
+        </a:xfrm>
+      </p:grpSpPr>
+      <p:sp>
+        <p:nvSpPr>
+          <p:cNvPr id="2" name="Slide Image Placeholder 1"/>
+          <p:cNvSpPr>
+            <a:spLocks noGrp="1" noRot="1" noChangeAspect="1"/>
+          </p:cNvSpPr>
+          <p:nvPr>
+            <p:ph type="sldImg"/>
+          </p:nvPr>
+        </p:nvSpPr>
+        <p:spPr/>
+      </p:sp>
+      <p:sp>
+        <p:nvSpPr>
+          <p:cNvPr id="3" name="Notes Placeholder 2"/>
+          <p:cNvSpPr>
+            <a:spLocks noGrp="1"/>
+          </p:cNvSpPr>
+          <p:nvPr>
+            <p:ph type="body" idx="1"/>
+          </p:nvPr>
+        </p:nvSpPr>
+        <p:spPr/>
+        <p:txBody>
+          <a:bodyPr/>
+          <a:lstStyle/>
+          <a:p>
+            <a:r>
+              <a:rPr lang="en-US" dirty="0" smtClean="0"/>
+              <a:t>https://msdn.microsoft.com/en-us/library/ms189835.aspx</a:t>
+            </a:r>
+            <a:endParaRPr lang="en-US" dirty="0"/>
+          </a:p>
+        </p:txBody>
+      </p:sp>
+      <p:sp>
+        <p:nvSpPr>
+          <p:cNvPr id="4" name="Slide Number Placeholder 3"/>
+          <p:cNvSpPr>
+            <a:spLocks noGrp="1"/>
+          </p:cNvSpPr>
+          <p:nvPr>
+            <p:ph type="sldNum" sz="quarter" idx="10"/>
+          </p:nvPr>
+        </p:nvSpPr>
+        <p:spPr/>
+        <p:txBody>
+          <a:bodyPr/>
+          <a:lstStyle/>
+          <a:p>
+            <a:fld id="{EDDFAA07-3B04-4F4C-AB8C-BB35A2248691}" type="slidenum">
+              <a:rPr lang="en-US" smtClean="0"/>
+              <a:pPr/>
+              <a:t>50</a:t>
+            </a:fld>
+            <a:endParaRPr lang="en-US"/>
+          </a:p>
+        </p:txBody>
+      </p:sp>
+    </p:spTree>
+    <p:extLst>
+      <p:ext uri="{BB962C8B-B14F-4D97-AF65-F5344CB8AC3E}">
+        <p14:creationId xmlns:p14="http://schemas.microsoft.com/office/powerpoint/2010/main" val="2583637371"/>
       </p:ext>
     </p:extLst>
   </p:cSld>
@@ -12133,7 +12317,7 @@
             <a:fld id="{4F88EE5D-E666-41E5-81D2-BB9A71F4DE66}" type="datetimeFigureOut">
               <a:rPr lang="en-US" smtClean="0"/>
               <a:pPr/>
-              <a:t>7/6/2016</a:t>
+              <a:t>7/7/2016</a:t>
             </a:fld>
             <a:endParaRPr lang="en-US"/>
           </a:p>
@@ -12300,7 +12484,7 @@
             <a:fld id="{4F88EE5D-E666-41E5-81D2-BB9A71F4DE66}" type="datetimeFigureOut">
               <a:rPr lang="en-US" smtClean="0"/>
               <a:pPr/>
-              <a:t>7/6/2016</a:t>
+              <a:t>7/7/2016</a:t>
             </a:fld>
             <a:endParaRPr lang="en-US"/>
           </a:p>
@@ -12477,7 +12661,7 @@
             <a:fld id="{4F88EE5D-E666-41E5-81D2-BB9A71F4DE66}" type="datetimeFigureOut">
               <a:rPr lang="en-US" smtClean="0"/>
               <a:pPr/>
-              <a:t>7/6/2016</a:t>
+              <a:t>7/7/2016</a:t>
             </a:fld>
             <a:endParaRPr lang="en-US"/>
           </a:p>
@@ -13015,7 +13199,7 @@
             <a:fld id="{4F88EE5D-E666-41E5-81D2-BB9A71F4DE66}" type="datetimeFigureOut">
               <a:rPr lang="en-US" smtClean="0"/>
               <a:pPr/>
-              <a:t>7/6/2016</a:t>
+              <a:t>7/7/2016</a:t>
             </a:fld>
             <a:endParaRPr lang="en-US"/>
           </a:p>
@@ -13258,7 +13442,7 @@
             <a:fld id="{4F88EE5D-E666-41E5-81D2-BB9A71F4DE66}" type="datetimeFigureOut">
               <a:rPr lang="en-US" smtClean="0"/>
               <a:pPr/>
-              <a:t>7/6/2016</a:t>
+              <a:t>7/7/2016</a:t>
             </a:fld>
             <a:endParaRPr lang="en-US"/>
           </a:p>
@@ -13543,7 +13727,7 @@
             <a:fld id="{4F88EE5D-E666-41E5-81D2-BB9A71F4DE66}" type="datetimeFigureOut">
               <a:rPr lang="en-US" smtClean="0"/>
               <a:pPr/>
-              <a:t>7/6/2016</a:t>
+              <a:t>7/7/2016</a:t>
             </a:fld>
             <a:endParaRPr lang="en-US"/>
           </a:p>
@@ -13962,7 +14146,7 @@
             <a:fld id="{4F88EE5D-E666-41E5-81D2-BB9A71F4DE66}" type="datetimeFigureOut">
               <a:rPr lang="en-US" smtClean="0"/>
               <a:pPr/>
-              <a:t>7/6/2016</a:t>
+              <a:t>7/7/2016</a:t>
             </a:fld>
             <a:endParaRPr lang="en-US"/>
           </a:p>
@@ -14077,7 +14261,7 @@
             <a:fld id="{4F88EE5D-E666-41E5-81D2-BB9A71F4DE66}" type="datetimeFigureOut">
               <a:rPr lang="en-US" smtClean="0"/>
               <a:pPr/>
-              <a:t>7/6/2016</a:t>
+              <a:t>7/7/2016</a:t>
             </a:fld>
             <a:endParaRPr lang="en-US"/>
           </a:p>
@@ -14169,7 +14353,7 @@
             <a:fld id="{4F88EE5D-E666-41E5-81D2-BB9A71F4DE66}" type="datetimeFigureOut">
               <a:rPr lang="en-US" smtClean="0"/>
               <a:pPr/>
-              <a:t>7/6/2016</a:t>
+              <a:t>7/7/2016</a:t>
             </a:fld>
             <a:endParaRPr lang="en-US"/>
           </a:p>
@@ -14443,7 +14627,7 @@
             <a:fld id="{4F88EE5D-E666-41E5-81D2-BB9A71F4DE66}" type="datetimeFigureOut">
               <a:rPr lang="en-US" smtClean="0"/>
               <a:pPr/>
-              <a:t>7/6/2016</a:t>
+              <a:t>7/7/2016</a:t>
             </a:fld>
             <a:endParaRPr lang="en-US"/>
           </a:p>
@@ -14693,7 +14877,7 @@
             <a:fld id="{4F88EE5D-E666-41E5-81D2-BB9A71F4DE66}" type="datetimeFigureOut">
               <a:rPr lang="en-US" smtClean="0"/>
               <a:pPr/>
-              <a:t>7/6/2016</a:t>
+              <a:t>7/7/2016</a:t>
             </a:fld>
             <a:endParaRPr lang="en-US"/>
           </a:p>
@@ -14903,7 +15087,7 @@
             <a:fld id="{4F88EE5D-E666-41E5-81D2-BB9A71F4DE66}" type="datetimeFigureOut">
               <a:rPr lang="en-US" smtClean="0"/>
               <a:pPr/>
-              <a:t>7/6/2016</a:t>
+              <a:t>7/7/2016</a:t>
             </a:fld>
             <a:endParaRPr lang="en-US"/>
           </a:p>
@@ -22623,126 +22807,199 @@
             <a:spLocks noGrp="1"/>
           </p:cNvSpPr>
           <p:nvPr>
-            <p:ph type="title"/>
-          </p:nvPr>
+            <p:ph type="ctrTitle"/>
+          </p:nvPr>
+        </p:nvSpPr>
+        <p:spPr/>
+        <p:txBody>
+          <a:bodyPr/>
+          <a:lstStyle/>
+          <a:p>
+            <a:pPr algn="ctr"/>
+            <a:r>
+              <a:rPr lang="en-US" dirty="0" smtClean="0"/>
+              <a:t>SQL Server </a:t>
+            </a:r>
+            <a:endParaRPr lang="en-US" dirty="0"/>
+          </a:p>
+        </p:txBody>
+      </p:sp>
+      <p:sp>
+        <p:nvSpPr>
+          <p:cNvPr id="7" name="TextBox 6"/>
+          <p:cNvSpPr txBox="1"/>
+          <p:nvPr/>
         </p:nvSpPr>
         <p:spPr>
           <a:xfrm>
-            <a:off x="1835696" y="766826"/>
-            <a:ext cx="5832648" cy="593092"/>
+            <a:off x="720725" y="6280150"/>
+            <a:ext cx="7704138" cy="123111"/>
           </a:xfrm>
+          <a:prstGeom prst="rect">
+            <a:avLst/>
+          </a:prstGeom>
+          <a:noFill/>
         </p:spPr>
         <p:txBody>
-          <a:bodyPr/>
-          <a:lstStyle/>
-          <a:p>
-            <a:pPr algn="ctr"/>
-            <a:r>
-              <a:rPr lang="en-US" dirty="0" smtClean="0"/>
-              <a:t>INSERT</a:t>
-            </a:r>
-            <a:endParaRPr lang="en-US" dirty="0"/>
-          </a:p>
-        </p:txBody>
-      </p:sp>
-      <p:sp>
-        <p:nvSpPr>
-          <p:cNvPr id="3" name="Content Placeholder 2"/>
-          <p:cNvSpPr>
-            <a:spLocks noGrp="1"/>
-          </p:cNvSpPr>
-          <p:nvPr>
-            <p:ph sz="half" idx="2"/>
-          </p:nvPr>
+          <a:bodyPr wrap="square" lIns="0" tIns="0" rIns="0" bIns="0" rtlCol="0" anchor="ctr" anchorCtr="0">
+            <a:spAutoFit/>
+          </a:bodyPr>
+          <a:lstStyle/>
+          <a:p>
+            <a:r>
+              <a:rPr lang="de-DE" sz="800" dirty="0">
+                <a:solidFill>
+                  <a:srgbClr val="FFFFFF"/>
+                </a:solidFill>
+                <a:latin typeface="Arial"/>
+                <a:cs typeface="Arial"/>
+              </a:rPr>
+              <a:t>Pregatit </a:t>
+            </a:r>
+            <a:r>
+              <a:rPr lang="de-DE" sz="800" dirty="0" smtClean="0">
+                <a:solidFill>
+                  <a:srgbClr val="FFFFFF"/>
+                </a:solidFill>
+                <a:latin typeface="Arial"/>
+                <a:cs typeface="Arial"/>
+              </a:rPr>
+              <a:t>de</a:t>
+            </a:r>
+            <a:r>
+              <a:rPr lang="ro-RO" sz="800" dirty="0" smtClean="0">
+                <a:solidFill>
+                  <a:srgbClr val="FFFFFF"/>
+                </a:solidFill>
+                <a:latin typeface="Arial"/>
+                <a:cs typeface="Arial"/>
+              </a:rPr>
+              <a:t> Marcel Soare </a:t>
+            </a:r>
+            <a:r>
+              <a:rPr lang="de-DE" sz="800" dirty="0" smtClean="0">
+                <a:solidFill>
+                  <a:srgbClr val="FFFFFF"/>
+                </a:solidFill>
+                <a:latin typeface="Arial"/>
+                <a:cs typeface="Arial"/>
+              </a:rPr>
+              <a:t>Data</a:t>
+            </a:r>
+            <a:r>
+              <a:rPr lang="de-DE" sz="800" dirty="0">
+                <a:solidFill>
+                  <a:srgbClr val="FFFFFF"/>
+                </a:solidFill>
+                <a:latin typeface="Arial"/>
+                <a:cs typeface="Arial"/>
+              </a:rPr>
+              <a:t>: </a:t>
+            </a:r>
+            <a:r>
+              <a:rPr lang="en-US" sz="800" dirty="0" smtClean="0">
+                <a:solidFill>
+                  <a:srgbClr val="FFFFFF"/>
+                </a:solidFill>
+                <a:latin typeface="Arial"/>
+                <a:cs typeface="Arial"/>
+              </a:rPr>
+              <a:t>27.</a:t>
+            </a:r>
+            <a:r>
+              <a:rPr lang="de-DE" sz="800" dirty="0" smtClean="0">
+                <a:solidFill>
+                  <a:srgbClr val="FFFFFF"/>
+                </a:solidFill>
+                <a:latin typeface="Arial"/>
+                <a:cs typeface="Arial"/>
+              </a:rPr>
+              <a:t>04</a:t>
+            </a:r>
+            <a:r>
+              <a:rPr lang="en-US" sz="800" dirty="0" smtClean="0">
+                <a:solidFill>
+                  <a:srgbClr val="FFFFFF"/>
+                </a:solidFill>
+                <a:latin typeface="Arial"/>
+                <a:cs typeface="Arial"/>
+              </a:rPr>
+              <a:t>.</a:t>
+            </a:r>
+            <a:r>
+              <a:rPr lang="de-DE" sz="800" dirty="0" smtClean="0">
+                <a:solidFill>
+                  <a:srgbClr val="FFFFFF"/>
+                </a:solidFill>
+                <a:latin typeface="Arial"/>
+                <a:cs typeface="Arial"/>
+              </a:rPr>
+              <a:t>2015</a:t>
+            </a:r>
+            <a:endParaRPr lang="en-US" sz="800" dirty="0">
+              <a:solidFill>
+                <a:srgbClr val="FFFFFF"/>
+              </a:solidFill>
+              <a:latin typeface="Arial"/>
+              <a:cs typeface="Arial"/>
+            </a:endParaRPr>
+          </a:p>
+        </p:txBody>
+      </p:sp>
+      <p:sp>
+        <p:nvSpPr>
+          <p:cNvPr id="5" name="Title 1"/>
+          <p:cNvSpPr txBox="1">
+            <a:spLocks/>
+          </p:cNvSpPr>
+          <p:nvPr/>
         </p:nvSpPr>
         <p:spPr>
           <a:xfrm>
-            <a:off x="720724" y="1773371"/>
-            <a:ext cx="7667700" cy="4499026"/>
+            <a:off x="827584" y="4509120"/>
+            <a:ext cx="7704856" cy="1008112"/>
           </a:xfrm>
+          <a:prstGeom prst="rect">
+            <a:avLst/>
+          </a:prstGeom>
         </p:spPr>
         <p:txBody>
-          <a:bodyPr>
+          <a:bodyPr vert="horz" lIns="0" tIns="0" rIns="0" bIns="0" rtlCol="0" anchor="t" anchorCtr="0">
             <a:normAutofit/>
           </a:bodyPr>
           <a:lstStyle/>
           <a:p>
-            <a:r>
-              <a:rPr lang="en-US" sz="2000" dirty="0" smtClean="0"/>
-              <a:t>Adds </a:t>
-            </a:r>
-            <a:r>
-              <a:rPr lang="en-US" sz="2000" dirty="0"/>
-              <a:t>one or more rows to a table or a view in SQL </a:t>
-            </a:r>
-            <a:r>
-              <a:rPr lang="en-US" sz="2000" dirty="0" smtClean="0"/>
-              <a:t>Server</a:t>
-            </a:r>
-          </a:p>
-          <a:p>
-            <a:r>
-              <a:rPr lang="en-US" sz="2000" dirty="0" smtClean="0"/>
-              <a:t>Syntax : </a:t>
-            </a:r>
-            <a:r>
-              <a:rPr lang="en-US" sz="2000" b="1" dirty="0">
-                <a:solidFill>
-                  <a:schemeClr val="tx2">
-                    <a:lumMod val="50000"/>
-                  </a:schemeClr>
-                </a:solidFill>
-              </a:rPr>
-              <a:t>INSERT INTO </a:t>
-            </a:r>
-            <a:r>
-              <a:rPr lang="en-US" sz="2000" dirty="0"/>
-              <a:t>&lt;object&gt; (&lt;</a:t>
-            </a:r>
-            <a:r>
-              <a:rPr lang="en-US" sz="2000" dirty="0" err="1"/>
-              <a:t>column_list</a:t>
-            </a:r>
-            <a:r>
-              <a:rPr lang="en-US" sz="2000" dirty="0"/>
-              <a:t>&gt;) </a:t>
-            </a:r>
-            <a:r>
-              <a:rPr lang="en-US" sz="2000" b="1" dirty="0">
-                <a:solidFill>
-                  <a:schemeClr val="tx2">
-                    <a:lumMod val="50000"/>
-                  </a:schemeClr>
-                </a:solidFill>
-              </a:rPr>
-              <a:t>VALUES</a:t>
-            </a:r>
-            <a:r>
-              <a:rPr lang="en-US" sz="2000" dirty="0">
-                <a:solidFill>
-                  <a:schemeClr val="tx2">
-                    <a:lumMod val="50000"/>
-                  </a:schemeClr>
-                </a:solidFill>
-              </a:rPr>
-              <a:t> </a:t>
-            </a:r>
-            <a:r>
-              <a:rPr lang="en-US" sz="2000" dirty="0"/>
-              <a:t>(&lt;</a:t>
-            </a:r>
-            <a:r>
-              <a:rPr lang="en-US" sz="2000" dirty="0" err="1"/>
-              <a:t>value_list</a:t>
-            </a:r>
-            <a:r>
-              <a:rPr lang="en-US" sz="2000" dirty="0"/>
-              <a:t>&gt;);</a:t>
-            </a:r>
+            <a:pPr algn="ctr"/>
+            <a:r>
+              <a:rPr lang="en-US" sz="3600" i="1" dirty="0" smtClean="0">
+                <a:solidFill>
+                  <a:schemeClr val="bg1"/>
+                </a:solidFill>
+              </a:rPr>
+              <a:t>“The other objects, </a:t>
+            </a:r>
+            <a:r>
+              <a:rPr lang="en-US" sz="3600" i="1" dirty="0" smtClean="0">
+                <a:solidFill>
+                  <a:schemeClr val="bg1"/>
+                </a:solidFill>
+              </a:rPr>
+              <a:t>design”</a:t>
+            </a:r>
+            <a:endParaRPr lang="en-US" sz="3600" dirty="0">
+              <a:solidFill>
+                <a:schemeClr val="bg1"/>
+              </a:solidFill>
+            </a:endParaRPr>
           </a:p>
         </p:txBody>
       </p:sp>
     </p:spTree>
+    <p:extLst>
+      <p:ext uri="{BB962C8B-B14F-4D97-AF65-F5344CB8AC3E}">
+        <p14:creationId xmlns:p14="http://schemas.microsoft.com/office/powerpoint/2010/main" val="1908241380"/>
+      </p:ext>
+    </p:extLst>
   </p:cSld>
   <p:clrMapOvr>
     <a:masterClrMapping/>
@@ -22786,39 +23043,22 @@
         </p:nvSpPr>
         <p:spPr>
           <a:xfrm>
-            <a:off x="1835696" y="766826"/>
-            <a:ext cx="5832648" cy="593092"/>
+            <a:off x="323528" y="764704"/>
+            <a:ext cx="8424936" cy="593092"/>
           </a:xfrm>
         </p:spPr>
         <p:txBody>
-          <a:bodyPr/>
+          <a:bodyPr>
+            <a:noAutofit/>
+          </a:bodyPr>
           <a:lstStyle/>
           <a:p>
             <a:pPr algn="ctr"/>
             <a:r>
-              <a:rPr lang="en-US" dirty="0" smtClean="0"/>
-              <a:t>UPDATE</a:t>
-            </a:r>
-            <a:endParaRPr lang="en-US" dirty="0"/>
-          </a:p>
-        </p:txBody>
-      </p:sp>
-      <p:sp>
-        <p:nvSpPr>
-          <p:cNvPr id="3" name="Content Placeholder 2"/>
-          <p:cNvSpPr>
-            <a:spLocks noGrp="1"/>
-          </p:cNvSpPr>
-          <p:nvPr>
-            <p:ph sz="half" idx="2"/>
-          </p:nvPr>
-        </p:nvSpPr>
-        <p:spPr/>
-        <p:txBody>
-          <a:bodyPr/>
-          <a:lstStyle/>
-          <a:p>
-            <a:endParaRPr lang="en-US" dirty="0"/>
+              <a:rPr lang="en-US" sz="4400" dirty="0" smtClean="0"/>
+              <a:t>Agenda day 3</a:t>
+            </a:r>
+            <a:endParaRPr lang="en-US" sz="4400" dirty="0"/>
           </a:p>
         </p:txBody>
       </p:sp>
@@ -22832,16 +23072,106 @@
             <p:ph sz="quarter" idx="4"/>
           </p:nvPr>
         </p:nvSpPr>
-        <p:spPr/>
-        <p:txBody>
-          <a:bodyPr/>
-          <a:lstStyle/>
-          <a:p>
-            <a:endParaRPr lang="en-US"/>
+        <p:spPr>
+          <a:xfrm>
+            <a:off x="683568" y="1844824"/>
+            <a:ext cx="7920880" cy="4032448"/>
+          </a:xfrm>
+        </p:spPr>
+        <p:txBody>
+          <a:bodyPr>
+            <a:normAutofit/>
+          </a:bodyPr>
+          <a:lstStyle/>
+          <a:p>
+            <a:endParaRPr lang="en-US" sz="2400" dirty="0" smtClean="0"/>
+          </a:p>
+          <a:p>
+            <a:endParaRPr lang="en-GB" baseline="30000" dirty="0"/>
+          </a:p>
+        </p:txBody>
+      </p:sp>
+      <p:sp>
+        <p:nvSpPr>
+          <p:cNvPr id="5" name="Content Placeholder 3"/>
+          <p:cNvSpPr>
+            <a:spLocks noGrp="1"/>
+          </p:cNvSpPr>
+          <p:nvPr>
+            <p:ph sz="quarter" idx="4"/>
+          </p:nvPr>
+        </p:nvSpPr>
+        <p:spPr>
+          <a:xfrm>
+            <a:off x="683568" y="1772816"/>
+            <a:ext cx="7920880" cy="4320480"/>
+          </a:xfrm>
+        </p:spPr>
+        <p:txBody>
+          <a:bodyPr>
+            <a:normAutofit/>
+          </a:bodyPr>
+          <a:lstStyle/>
+          <a:p>
+            <a:r>
+              <a:rPr lang="en-GB" sz="4000" baseline="30000" dirty="0" smtClean="0"/>
+              <a:t>Insert, Update</a:t>
+            </a:r>
+            <a:r>
+              <a:rPr lang="en-GB" sz="4000" baseline="30000" dirty="0"/>
+              <a:t>, </a:t>
+            </a:r>
+            <a:r>
+              <a:rPr lang="en-GB" sz="4000" baseline="30000" dirty="0" smtClean="0"/>
+              <a:t>Delete, Merge</a:t>
+            </a:r>
+            <a:endParaRPr lang="en-GB" sz="4000" baseline="30000" dirty="0"/>
+          </a:p>
+          <a:p>
+            <a:r>
+              <a:rPr lang="en-GB" sz="4000" baseline="30000" dirty="0" smtClean="0"/>
+              <a:t>Stored </a:t>
+            </a:r>
+            <a:r>
+              <a:rPr lang="en-GB" sz="4000" baseline="30000" dirty="0" smtClean="0"/>
+              <a:t>procedures</a:t>
+            </a:r>
+          </a:p>
+          <a:p>
+            <a:r>
+              <a:rPr lang="en-GB" sz="4000" baseline="30000" dirty="0" smtClean="0"/>
+              <a:t>Views</a:t>
+            </a:r>
+          </a:p>
+          <a:p>
+            <a:r>
+              <a:rPr lang="en-GB" sz="4000" baseline="30000" dirty="0" smtClean="0"/>
+              <a:t>Triggers</a:t>
+            </a:r>
+          </a:p>
+          <a:p>
+            <a:r>
+              <a:rPr lang="en-GB" sz="4000" baseline="30000" dirty="0" smtClean="0"/>
+              <a:t>Indexes</a:t>
+            </a:r>
+          </a:p>
+          <a:p>
+            <a:pPr>
+              <a:buNone/>
+            </a:pPr>
+            <a:endParaRPr lang="en-GB" sz="2800" baseline="30000" dirty="0" smtClean="0"/>
+          </a:p>
+          <a:p>
+            <a:endParaRPr lang="en-GB" sz="2800" baseline="30000" dirty="0" smtClean="0"/>
           </a:p>
         </p:txBody>
       </p:sp>
     </p:spTree>
+    <p:extLst>
+      <p:ext uri="{BB962C8B-B14F-4D97-AF65-F5344CB8AC3E}">
+        <p14:creationId xmlns:p14="http://schemas.microsoft.com/office/powerpoint/2010/main" val="826275463"/>
+      </p:ext>
+    </p:extLst>
   </p:cSld>
   <p:clrMapOvr>
     <a:masterClrMapping/>
@@ -22896,7 +23226,7 @@
             <a:pPr algn="ctr"/>
             <a:r>
               <a:rPr lang="en-US" dirty="0" smtClean="0"/>
-              <a:t>DELETE</a:t>
+              <a:t>INSERT</a:t>
             </a:r>
             <a:endParaRPr lang="en-US" dirty="0"/>
           </a:p>
@@ -22912,31 +23242,90 @@
             <p:ph sz="half" idx="2"/>
           </p:nvPr>
         </p:nvSpPr>
-        <p:spPr/>
-        <p:txBody>
-          <a:bodyPr/>
-          <a:lstStyle/>
-          <a:p>
-            <a:endParaRPr lang="en-US" dirty="0"/>
-          </a:p>
-        </p:txBody>
-      </p:sp>
-      <p:sp>
-        <p:nvSpPr>
-          <p:cNvPr id="4" name="Content Placeholder 3"/>
-          <p:cNvSpPr>
-            <a:spLocks noGrp="1"/>
-          </p:cNvSpPr>
-          <p:nvPr>
-            <p:ph sz="quarter" idx="4"/>
-          </p:nvPr>
-        </p:nvSpPr>
-        <p:spPr/>
-        <p:txBody>
-          <a:bodyPr/>
-          <a:lstStyle/>
-          <a:p>
-            <a:endParaRPr lang="en-US" dirty="0"/>
+        <p:spPr>
+          <a:xfrm>
+            <a:off x="720724" y="1773371"/>
+            <a:ext cx="7667700" cy="4499026"/>
+          </a:xfrm>
+        </p:spPr>
+        <p:txBody>
+          <a:bodyPr>
+            <a:normAutofit/>
+          </a:bodyPr>
+          <a:lstStyle/>
+          <a:p>
+            <a:r>
+              <a:rPr lang="en-US" sz="2000" dirty="0" smtClean="0"/>
+              <a:t>Adds </a:t>
+            </a:r>
+            <a:r>
+              <a:rPr lang="en-US" sz="2000" dirty="0"/>
+              <a:t>one or more rows to a table or a view in SQL </a:t>
+            </a:r>
+            <a:r>
+              <a:rPr lang="en-US" sz="2000" dirty="0" smtClean="0"/>
+              <a:t>Server</a:t>
+            </a:r>
+          </a:p>
+          <a:p>
+            <a:r>
+              <a:rPr lang="en-US" sz="2000" dirty="0" smtClean="0"/>
+              <a:t>Syntax : </a:t>
+            </a:r>
+            <a:r>
+              <a:rPr lang="en-US" sz="2000" b="1" dirty="0">
+                <a:solidFill>
+                  <a:schemeClr val="tx2">
+                    <a:lumMod val="50000"/>
+                  </a:schemeClr>
+                </a:solidFill>
+              </a:rPr>
+              <a:t>INSERT INTO </a:t>
+            </a:r>
+            <a:r>
+              <a:rPr lang="en-US" sz="2000" dirty="0"/>
+              <a:t>&lt;object&gt; (&lt;</a:t>
+            </a:r>
+            <a:r>
+              <a:rPr lang="en-US" sz="2000" dirty="0" err="1"/>
+              <a:t>column_list</a:t>
+            </a:r>
+            <a:r>
+              <a:rPr lang="en-US" sz="2000" dirty="0"/>
+              <a:t>&gt;) </a:t>
+            </a:r>
+            <a:r>
+              <a:rPr lang="en-US" sz="2000" b="1" dirty="0">
+                <a:solidFill>
+                  <a:schemeClr val="tx2">
+                    <a:lumMod val="50000"/>
+                  </a:schemeClr>
+                </a:solidFill>
+              </a:rPr>
+              <a:t>VALUES</a:t>
+            </a:r>
+            <a:r>
+              <a:rPr lang="en-US" sz="2000" dirty="0">
+                <a:solidFill>
+                  <a:schemeClr val="tx2">
+                    <a:lumMod val="50000"/>
+                  </a:schemeClr>
+                </a:solidFill>
+              </a:rPr>
+              <a:t> </a:t>
+            </a:r>
+            <a:r>
+              <a:rPr lang="en-US" sz="2000" dirty="0"/>
+              <a:t>(&lt;</a:t>
+            </a:r>
+            <a:r>
+              <a:rPr lang="en-US" sz="2000" dirty="0" err="1"/>
+              <a:t>value_list</a:t>
+            </a:r>
+            <a:r>
+              <a:rPr lang="en-US" sz="2000" dirty="0"/>
+              <a:t>&gt;);</a:t>
+            </a:r>
           </a:p>
         </p:txBody>
       </p:sp>
@@ -22979,191 +23368,178 @@
             <a:spLocks noGrp="1"/>
           </p:cNvSpPr>
           <p:nvPr>
-            <p:ph type="ctrTitle"/>
-          </p:nvPr>
-        </p:nvSpPr>
-        <p:spPr/>
-        <p:txBody>
-          <a:bodyPr/>
-          <a:lstStyle/>
-          <a:p>
-            <a:pPr algn="ctr"/>
-            <a:r>
-              <a:rPr lang="en-US" dirty="0" smtClean="0"/>
-              <a:t>SQL Server </a:t>
-            </a:r>
-            <a:endParaRPr lang="en-US" dirty="0"/>
-          </a:p>
-        </p:txBody>
-      </p:sp>
-      <p:sp>
-        <p:nvSpPr>
-          <p:cNvPr id="7" name="TextBox 6"/>
-          <p:cNvSpPr txBox="1"/>
-          <p:nvPr/>
+            <p:ph type="title"/>
+          </p:nvPr>
         </p:nvSpPr>
         <p:spPr>
           <a:xfrm>
-            <a:off x="720725" y="6280150"/>
-            <a:ext cx="7704138" cy="123111"/>
+            <a:off x="1835696" y="766826"/>
+            <a:ext cx="5832648" cy="593092"/>
           </a:xfrm>
-          <a:prstGeom prst="rect">
-            <a:avLst/>
-          </a:prstGeom>
-          <a:noFill/>
         </p:spPr>
         <p:txBody>
-          <a:bodyPr wrap="square" lIns="0" tIns="0" rIns="0" bIns="0" rtlCol="0" anchor="ctr" anchorCtr="0">
-            <a:spAutoFit/>
-          </a:bodyPr>
-          <a:lstStyle/>
-          <a:p>
-            <a:r>
-              <a:rPr lang="de-DE" sz="800" dirty="0">
-                <a:solidFill>
-                  <a:srgbClr val="FFFFFF"/>
-                </a:solidFill>
-                <a:latin typeface="Arial"/>
-                <a:cs typeface="Arial"/>
-              </a:rPr>
-              <a:t>Pregatit </a:t>
-            </a:r>
-            <a:r>
-              <a:rPr lang="de-DE" sz="800" dirty="0" smtClean="0">
-                <a:solidFill>
-                  <a:srgbClr val="FFFFFF"/>
-                </a:solidFill>
-                <a:latin typeface="Arial"/>
-                <a:cs typeface="Arial"/>
-              </a:rPr>
-              <a:t>de</a:t>
-            </a:r>
-            <a:r>
-              <a:rPr lang="ro-RO" sz="800" dirty="0" smtClean="0">
-                <a:solidFill>
-                  <a:srgbClr val="FFFFFF"/>
-                </a:solidFill>
-                <a:latin typeface="Arial"/>
-                <a:cs typeface="Arial"/>
-              </a:rPr>
-              <a:t> Marcel Soare </a:t>
-            </a:r>
-            <a:r>
-              <a:rPr lang="de-DE" sz="800" dirty="0" smtClean="0">
-                <a:solidFill>
-                  <a:srgbClr val="FFFFFF"/>
-                </a:solidFill>
-                <a:latin typeface="Arial"/>
-                <a:cs typeface="Arial"/>
-              </a:rPr>
-              <a:t>Data</a:t>
-            </a:r>
-            <a:r>
-              <a:rPr lang="de-DE" sz="800" dirty="0">
-                <a:solidFill>
-                  <a:srgbClr val="FFFFFF"/>
-                </a:solidFill>
-                <a:latin typeface="Arial"/>
-                <a:cs typeface="Arial"/>
-              </a:rPr>
-              <a:t>: </a:t>
-            </a:r>
-            <a:r>
-              <a:rPr lang="en-US" sz="800" dirty="0" smtClean="0">
-                <a:solidFill>
-                  <a:srgbClr val="FFFFFF"/>
-                </a:solidFill>
-                <a:latin typeface="Arial"/>
-                <a:cs typeface="Arial"/>
-              </a:rPr>
-              <a:t>27.</a:t>
-            </a:r>
-            <a:r>
-              <a:rPr lang="de-DE" sz="800" dirty="0" smtClean="0">
-                <a:solidFill>
-                  <a:srgbClr val="FFFFFF"/>
-                </a:solidFill>
-                <a:latin typeface="Arial"/>
-                <a:cs typeface="Arial"/>
-              </a:rPr>
-              <a:t>04</a:t>
-            </a:r>
-            <a:r>
-              <a:rPr lang="en-US" sz="800" dirty="0" smtClean="0">
-                <a:solidFill>
-                  <a:srgbClr val="FFFFFF"/>
-                </a:solidFill>
-                <a:latin typeface="Arial"/>
-                <a:cs typeface="Arial"/>
-              </a:rPr>
-              <a:t>.</a:t>
-            </a:r>
-            <a:r>
-              <a:rPr lang="de-DE" sz="800" dirty="0" smtClean="0">
-                <a:solidFill>
-                  <a:srgbClr val="FFFFFF"/>
-                </a:solidFill>
-                <a:latin typeface="Arial"/>
-                <a:cs typeface="Arial"/>
-              </a:rPr>
-              <a:t>2015</a:t>
-            </a:r>
-            <a:endParaRPr lang="en-US" sz="800" dirty="0">
-              <a:solidFill>
-                <a:srgbClr val="FFFFFF"/>
-              </a:solidFill>
-              <a:latin typeface="Arial"/>
-              <a:cs typeface="Arial"/>
-            </a:endParaRPr>
-          </a:p>
-        </p:txBody>
-      </p:sp>
-      <p:sp>
-        <p:nvSpPr>
-          <p:cNvPr id="5" name="Title 1"/>
-          <p:cNvSpPr txBox="1">
-            <a:spLocks/>
-          </p:cNvSpPr>
-          <p:nvPr/>
+          <a:bodyPr/>
+          <a:lstStyle/>
+          <a:p>
+            <a:pPr algn="ctr"/>
+            <a:r>
+              <a:rPr lang="en-US" dirty="0" smtClean="0"/>
+              <a:t>UPDATE</a:t>
+            </a:r>
+            <a:endParaRPr lang="en-US" dirty="0"/>
+          </a:p>
+        </p:txBody>
+      </p:sp>
+      <p:sp>
+        <p:nvSpPr>
+          <p:cNvPr id="3" name="Content Placeholder 2"/>
+          <p:cNvSpPr>
+            <a:spLocks noGrp="1"/>
+          </p:cNvSpPr>
+          <p:nvPr>
+            <p:ph sz="half" idx="2"/>
+          </p:nvPr>
         </p:nvSpPr>
         <p:spPr>
           <a:xfrm>
-            <a:off x="827584" y="4509120"/>
-            <a:ext cx="7704856" cy="1008112"/>
+            <a:off x="720724" y="1773371"/>
+            <a:ext cx="7739708" cy="4499026"/>
           </a:xfrm>
-          <a:prstGeom prst="rect">
-            <a:avLst/>
-          </a:prstGeom>
         </p:spPr>
         <p:txBody>
-          <a:bodyPr vert="horz" lIns="0" tIns="0" rIns="0" bIns="0" rtlCol="0" anchor="t" anchorCtr="0">
-            <a:normAutofit/>
-          </a:bodyPr>
-          <a:lstStyle/>
-          <a:p>
-            <a:pPr algn="ctr"/>
-            <a:r>
-              <a:rPr lang="en-US" sz="3600" i="1" dirty="0" smtClean="0">
-                <a:solidFill>
-                  <a:schemeClr val="bg1"/>
-                </a:solidFill>
-              </a:rPr>
-              <a:t>“The other objects, design, reporting”</a:t>
-            </a:r>
-            <a:endParaRPr lang="en-US" sz="3600" dirty="0">
-              <a:solidFill>
-                <a:schemeClr val="bg1"/>
-              </a:solidFill>
+          <a:bodyPr/>
+          <a:lstStyle/>
+          <a:p>
+            <a:pPr marL="0" indent="0">
+              <a:buNone/>
+            </a:pPr>
+            <a:r>
+              <a:rPr lang="en-US" sz="3200" b="1" dirty="0" smtClean="0">
+                <a:solidFill>
+                  <a:schemeClr val="tx2"/>
+                </a:solidFill>
+                <a:latin typeface="Consolas" panose="020B0609020204030204" pitchFamily="49" charset="0"/>
+              </a:rPr>
+              <a:t>	UPDATE </a:t>
+            </a:r>
+            <a:r>
+              <a:rPr lang="en-US" sz="3200" dirty="0" smtClean="0">
+                <a:latin typeface="Consolas" panose="020B0609020204030204" pitchFamily="49" charset="0"/>
+              </a:rPr>
+              <a:t>&lt;table&gt; </a:t>
+            </a:r>
+            <a:endParaRPr lang="en-US" sz="3200" dirty="0">
+              <a:latin typeface="Arial" panose="020B0604020202020204" pitchFamily="34" charset="0"/>
             </a:endParaRPr>
           </a:p>
+          <a:p>
+            <a:pPr marL="0" indent="0">
+              <a:buNone/>
+            </a:pPr>
+            <a:r>
+              <a:rPr lang="en-US" sz="3200" dirty="0">
+                <a:latin typeface="Consolas" panose="020B0609020204030204" pitchFamily="49" charset="0"/>
+              </a:rPr>
+              <a:t>	</a:t>
+            </a:r>
+            <a:r>
+              <a:rPr lang="en-US" sz="3200" b="1" dirty="0">
+                <a:solidFill>
+                  <a:schemeClr val="tx2"/>
+                </a:solidFill>
+                <a:latin typeface="Consolas" panose="020B0609020204030204" pitchFamily="49" charset="0"/>
+              </a:rPr>
+              <a:t>SET</a:t>
+            </a:r>
+            <a:r>
+              <a:rPr lang="en-US" sz="3200" dirty="0" smtClean="0">
+                <a:latin typeface="Consolas" panose="020B0609020204030204" pitchFamily="49" charset="0"/>
+              </a:rPr>
+              <a:t> &lt;column = expression&gt;</a:t>
+            </a:r>
+          </a:p>
+          <a:p>
+            <a:pPr marL="0" indent="0">
+              <a:buNone/>
+            </a:pPr>
+            <a:r>
+              <a:rPr lang="en-US" sz="3200" b="1" dirty="0">
+                <a:solidFill>
+                  <a:schemeClr val="tx2"/>
+                </a:solidFill>
+                <a:latin typeface="Consolas" panose="020B0609020204030204" pitchFamily="49" charset="0"/>
+              </a:rPr>
+              <a:t>	</a:t>
+            </a:r>
+            <a:r>
+              <a:rPr lang="en-US" sz="3200" b="1" dirty="0" smtClean="0">
+                <a:solidFill>
+                  <a:schemeClr val="tx2"/>
+                </a:solidFill>
+                <a:latin typeface="Consolas" panose="020B0609020204030204" pitchFamily="49" charset="0"/>
+              </a:rPr>
+              <a:t>FROM</a:t>
+            </a:r>
+            <a:r>
+              <a:rPr lang="en-US" sz="3200" dirty="0" smtClean="0">
+                <a:latin typeface="Consolas" panose="020B0609020204030204" pitchFamily="49" charset="0"/>
+              </a:rPr>
+              <a:t> </a:t>
+            </a:r>
+            <a:r>
+              <a:rPr lang="en-US" sz="3200" dirty="0">
+                <a:latin typeface="Consolas" panose="020B0609020204030204" pitchFamily="49" charset="0"/>
+              </a:rPr>
+              <a:t>&lt;tables&gt; </a:t>
+            </a:r>
+            <a:endParaRPr lang="en-US" sz="3200" dirty="0">
+              <a:latin typeface="Arial" panose="020B0604020202020204" pitchFamily="34" charset="0"/>
+            </a:endParaRPr>
+          </a:p>
+          <a:p>
+            <a:pPr marL="0" indent="0">
+              <a:buNone/>
+            </a:pPr>
+            <a:r>
+              <a:rPr lang="en-US" sz="3200" dirty="0">
+                <a:latin typeface="Consolas" panose="020B0609020204030204" pitchFamily="49" charset="0"/>
+              </a:rPr>
+              <a:t>	</a:t>
+            </a:r>
+            <a:r>
+              <a:rPr lang="en-US" sz="3200" b="1" dirty="0">
+                <a:solidFill>
+                  <a:schemeClr val="tx2"/>
+                </a:solidFill>
+                <a:latin typeface="Consolas" panose="020B0609020204030204" pitchFamily="49" charset="0"/>
+              </a:rPr>
+              <a:t>WHERE</a:t>
+            </a:r>
+            <a:r>
+              <a:rPr lang="en-US" sz="3200" dirty="0">
+                <a:latin typeface="Consolas" panose="020B0609020204030204" pitchFamily="49" charset="0"/>
+              </a:rPr>
+              <a:t> &lt;conditions&gt; </a:t>
+            </a:r>
+            <a:endParaRPr lang="en-US" sz="3200" dirty="0">
+              <a:latin typeface="Arial" panose="020B0604020202020204" pitchFamily="34" charset="0"/>
+            </a:endParaRPr>
+          </a:p>
+          <a:p>
+            <a:pPr marL="0" indent="0">
+              <a:buNone/>
+            </a:pPr>
+            <a:r>
+              <a:rPr lang="en-US" sz="2400" dirty="0">
+                <a:latin typeface="Arial" panose="020B0604020202020204" pitchFamily="34" charset="0"/>
+              </a:rPr>
+              <a:t>	</a:t>
+            </a:r>
+            <a:endParaRPr lang="en-US" dirty="0"/>
+          </a:p>
         </p:txBody>
       </p:sp>
     </p:spTree>
-    <p:extLst>
-      <p:ext uri="{BB962C8B-B14F-4D97-AF65-F5344CB8AC3E}">
-        <p14:creationId xmlns:p14="http://schemas.microsoft.com/office/powerpoint/2010/main" val="1908241380"/>
-      </p:ext>
-    </p:extLst>
   </p:cSld>
   <p:clrMapOvr>
     <a:masterClrMapping/>
@@ -23337,39 +23713,37 @@
         </p:nvSpPr>
         <p:spPr>
           <a:xfrm>
-            <a:off x="323528" y="764704"/>
-            <a:ext cx="8424936" cy="593092"/>
+            <a:off x="1835696" y="766826"/>
+            <a:ext cx="5832648" cy="593092"/>
           </a:xfrm>
         </p:spPr>
         <p:txBody>
-          <a:bodyPr>
-            <a:noAutofit/>
-          </a:bodyPr>
+          <a:bodyPr/>
           <a:lstStyle/>
           <a:p>
             <a:pPr algn="ctr"/>
             <a:r>
-              <a:rPr lang="en-US" sz="4400" dirty="0" smtClean="0"/>
-              <a:t>Agenda day 3</a:t>
-            </a:r>
-            <a:endParaRPr lang="en-US" sz="4400" dirty="0"/>
-          </a:p>
-        </p:txBody>
-      </p:sp>
-      <p:sp>
-        <p:nvSpPr>
-          <p:cNvPr id="4" name="Content Placeholder 3"/>
-          <p:cNvSpPr>
-            <a:spLocks noGrp="1"/>
-          </p:cNvSpPr>
-          <p:nvPr>
-            <p:ph sz="quarter" idx="4"/>
+              <a:rPr lang="en-US" dirty="0" smtClean="0"/>
+              <a:t>DELETE</a:t>
+            </a:r>
+            <a:endParaRPr lang="en-US" dirty="0"/>
+          </a:p>
+        </p:txBody>
+      </p:sp>
+      <p:sp>
+        <p:nvSpPr>
+          <p:cNvPr id="3" name="Content Placeholder 2"/>
+          <p:cNvSpPr>
+            <a:spLocks noGrp="1"/>
+          </p:cNvSpPr>
+          <p:nvPr>
+            <p:ph sz="half" idx="2"/>
           </p:nvPr>
         </p:nvSpPr>
         <p:spPr>
           <a:xfrm>
-            <a:off x="683568" y="1844824"/>
-            <a:ext cx="7920880" cy="4032448"/>
+            <a:off x="720724" y="1773371"/>
+            <a:ext cx="7667700" cy="4499026"/>
           </a:xfrm>
         </p:spPr>
         <p:txBody>
@@ -23378,78 +23752,79 @@
           </a:bodyPr>
           <a:lstStyle/>
           <a:p>
-            <a:endParaRPr lang="en-US" sz="2400" dirty="0" smtClean="0"/>
-          </a:p>
-          <a:p>
-            <a:endParaRPr lang="en-GB" baseline="30000" dirty="0"/>
-          </a:p>
-        </p:txBody>
-      </p:sp>
-      <p:sp>
-        <p:nvSpPr>
-          <p:cNvPr id="5" name="Content Placeholder 3"/>
-          <p:cNvSpPr>
-            <a:spLocks noGrp="1"/>
-          </p:cNvSpPr>
-          <p:nvPr>
-            <p:ph sz="quarter" idx="4"/>
-          </p:nvPr>
-        </p:nvSpPr>
-        <p:spPr>
-          <a:xfrm>
-            <a:off x="683568" y="1772816"/>
-            <a:ext cx="7920880" cy="4320480"/>
-          </a:xfrm>
-        </p:spPr>
-        <p:txBody>
-          <a:bodyPr>
-            <a:normAutofit/>
-          </a:bodyPr>
-          <a:lstStyle/>
-          <a:p>
-            <a:r>
-              <a:rPr lang="en-GB" sz="4000" baseline="30000" dirty="0" smtClean="0"/>
-              <a:t>Stored procedures</a:t>
-            </a:r>
-            <a:endParaRPr lang="en-GB" sz="4000" baseline="30000" dirty="0" smtClean="0"/>
-          </a:p>
-          <a:p>
-            <a:r>
-              <a:rPr lang="en-GB" sz="4000" baseline="30000" dirty="0" smtClean="0"/>
-              <a:t>Views</a:t>
-            </a:r>
-            <a:endParaRPr lang="en-GB" sz="4000" baseline="30000" dirty="0" smtClean="0"/>
-          </a:p>
-          <a:p>
-            <a:r>
-              <a:rPr lang="en-GB" sz="4000" baseline="30000" dirty="0" smtClean="0"/>
-              <a:t>Triggers</a:t>
-            </a:r>
-          </a:p>
-          <a:p>
-            <a:r>
-              <a:rPr lang="en-GB" sz="4000" baseline="30000" dirty="0" smtClean="0"/>
-              <a:t>Indexes</a:t>
-            </a:r>
-            <a:endParaRPr lang="en-GB" sz="4000" baseline="30000" dirty="0" smtClean="0"/>
-          </a:p>
-          <a:p>
-            <a:pPr>
+            <a:pPr marL="800100" lvl="2" indent="0">
               <a:buNone/>
             </a:pPr>
-            <a:endParaRPr lang="en-GB" sz="2800" baseline="30000" dirty="0" smtClean="0"/>
-          </a:p>
-          <a:p>
-            <a:endParaRPr lang="en-GB" sz="2800" baseline="30000" dirty="0" smtClean="0"/>
+            <a:r>
+              <a:rPr lang="en-US" sz="3600" b="1" smtClean="0">
+                <a:solidFill>
+                  <a:schemeClr val="tx2"/>
+                </a:solidFill>
+                <a:latin typeface="Consolas" panose="020B0609020204030204" pitchFamily="49" charset="0"/>
+              </a:rPr>
+              <a:t>DELETE </a:t>
+            </a:r>
+            <a:r>
+              <a:rPr lang="en-US" sz="3600" dirty="0" smtClean="0">
+                <a:latin typeface="Consolas" panose="020B0609020204030204" pitchFamily="49" charset="0"/>
+              </a:rPr>
+              <a:t>	[</a:t>
+            </a:r>
+            <a:r>
+              <a:rPr lang="en-US" sz="3600" b="1" dirty="0" smtClean="0">
+                <a:solidFill>
+                  <a:schemeClr val="tx2"/>
+                </a:solidFill>
+                <a:latin typeface="Consolas" panose="020B0609020204030204" pitchFamily="49" charset="0"/>
+              </a:rPr>
+              <a:t>FROM]</a:t>
+            </a:r>
+            <a:r>
+              <a:rPr lang="en-US" sz="3600" dirty="0" smtClean="0">
+                <a:latin typeface="Consolas" panose="020B0609020204030204" pitchFamily="49" charset="0"/>
+              </a:rPr>
+              <a:t> </a:t>
+            </a:r>
+            <a:r>
+              <a:rPr lang="en-US" sz="3600" dirty="0">
+                <a:latin typeface="Consolas" panose="020B0609020204030204" pitchFamily="49" charset="0"/>
+              </a:rPr>
+              <a:t>&lt;tables&gt; </a:t>
+            </a:r>
+            <a:endParaRPr lang="en-US" sz="3600" dirty="0">
+              <a:latin typeface="Arial" panose="020B0604020202020204" pitchFamily="34" charset="0"/>
+            </a:endParaRPr>
+          </a:p>
+          <a:p>
+            <a:pPr marL="0" indent="0">
+              <a:buNone/>
+            </a:pPr>
+            <a:r>
+              <a:rPr lang="en-US" sz="3600" dirty="0">
+                <a:latin typeface="Consolas" panose="020B0609020204030204" pitchFamily="49" charset="0"/>
+              </a:rPr>
+              <a:t>	</a:t>
+            </a:r>
+            <a:r>
+              <a:rPr lang="en-US" sz="3600" b="1" dirty="0">
+                <a:solidFill>
+                  <a:schemeClr val="tx2"/>
+                </a:solidFill>
+                <a:latin typeface="Consolas" panose="020B0609020204030204" pitchFamily="49" charset="0"/>
+              </a:rPr>
+              <a:t>WHERE</a:t>
+            </a:r>
+            <a:r>
+              <a:rPr lang="en-US" sz="3600" dirty="0">
+                <a:latin typeface="Consolas" panose="020B0609020204030204" pitchFamily="49" charset="0"/>
+              </a:rPr>
+              <a:t> &lt;conditions&gt;</a:t>
+            </a:r>
+            <a:endParaRPr lang="en-US" sz="3600" dirty="0"/>
           </a:p>
         </p:txBody>
       </p:sp>
     </p:spTree>
-    <p:extLst>
-      <p:ext uri="{BB962C8B-B14F-4D97-AF65-F5344CB8AC3E}">
-        <p14:creationId xmlns:p14="http://schemas.microsoft.com/office/powerpoint/2010/main" val="826275463"/>
-      </p:ext>
-    </p:extLst>
   </p:cSld>
   <p:clrMapOvr>
     <a:masterClrMapping/>
@@ -23504,7 +23879,7 @@
             <a:pPr algn="ctr"/>
             <a:r>
               <a:rPr lang="en-US" dirty="0" smtClean="0"/>
-              <a:t>DATABSE SECURITY</a:t>
+              <a:t>MERGE</a:t>
             </a:r>
             <a:endParaRPr lang="en-US" dirty="0"/>
           </a:p>
@@ -23512,7 +23887,7 @@
       </p:sp>
       <p:sp>
         <p:nvSpPr>
-          <p:cNvPr id="5" name="Content Placeholder 2"/>
+          <p:cNvPr id="3" name="Content Placeholder 2"/>
           <p:cNvSpPr>
             <a:spLocks noGrp="1"/>
           </p:cNvSpPr>
@@ -23520,71 +23895,40 @@
             <p:ph sz="half" idx="2"/>
           </p:nvPr>
         </p:nvSpPr>
-        <p:spPr>
-          <a:xfrm>
-            <a:off x="720724" y="1773371"/>
-            <a:ext cx="7811716" cy="4499026"/>
-          </a:xfrm>
-        </p:spPr>
-        <p:txBody>
-          <a:bodyPr>
-            <a:normAutofit fontScale="92500" lnSpcReduction="10000"/>
-          </a:bodyPr>
-          <a:lstStyle/>
-          <a:p>
-            <a:r>
-              <a:rPr lang="en-US" sz="2800" dirty="0" smtClean="0"/>
-              <a:t>Securing your database content is a critical part of a DBA’s job. The design, testing, and implementation of security is necessary to ensure that confidentiality is not compromised</a:t>
-            </a:r>
-          </a:p>
-          <a:p>
-            <a:endParaRPr lang="en-US" sz="2800" b="1" i="1" dirty="0" smtClean="0"/>
-          </a:p>
-          <a:p>
-            <a:r>
-              <a:rPr lang="en-US" sz="2800" b="1" i="1" dirty="0" err="1" smtClean="0"/>
-              <a:t>Securables</a:t>
-            </a:r>
-            <a:r>
-              <a:rPr lang="en-US" sz="2800" b="1" i="1" dirty="0" smtClean="0"/>
-              <a:t> </a:t>
-            </a:r>
-            <a:r>
-              <a:rPr lang="en-US" sz="2800" dirty="0" smtClean="0"/>
-              <a:t>are </a:t>
-            </a:r>
-            <a:r>
-              <a:rPr lang="en-US" sz="2800" dirty="0"/>
-              <a:t>the server, database, and objects </a:t>
-            </a:r>
-            <a:r>
-              <a:rPr lang="en-US" sz="2800" dirty="0" smtClean="0"/>
-              <a:t>a database contains</a:t>
-            </a:r>
-          </a:p>
-          <a:p>
-            <a:r>
-              <a:rPr lang="en-US" sz="2800" b="1" i="1" dirty="0" smtClean="0"/>
-              <a:t>Principals</a:t>
-            </a:r>
-            <a:r>
-              <a:rPr lang="en-US" sz="2800" dirty="0" smtClean="0"/>
-              <a:t> are the individuals, groups, and processes granted access to SQL Server</a:t>
-            </a:r>
-          </a:p>
-          <a:p>
-            <a:r>
-              <a:rPr lang="en-US" sz="2800" b="1" i="1" dirty="0" smtClean="0"/>
-              <a:t>Permissions</a:t>
-            </a:r>
-            <a:r>
-              <a:rPr lang="en-US" sz="2800" dirty="0" smtClean="0"/>
-              <a:t> are granted to a principal for every SQL Server securable</a:t>
-            </a:r>
+        <p:spPr/>
+        <p:txBody>
+          <a:bodyPr/>
+          <a:lstStyle/>
+          <a:p>
+            <a:endParaRPr lang="en-US" dirty="0"/>
+          </a:p>
+        </p:txBody>
+      </p:sp>
+      <p:sp>
+        <p:nvSpPr>
+          <p:cNvPr id="4" name="Content Placeholder 3"/>
+          <p:cNvSpPr>
+            <a:spLocks noGrp="1"/>
+          </p:cNvSpPr>
+          <p:nvPr>
+            <p:ph sz="quarter" idx="4"/>
+          </p:nvPr>
+        </p:nvSpPr>
+        <p:spPr/>
+        <p:txBody>
+          <a:bodyPr/>
+          <a:lstStyle/>
+          <a:p>
+            <a:endParaRPr lang="en-US" dirty="0"/>
           </a:p>
         </p:txBody>
       </p:sp>
     </p:spTree>
+    <p:extLst>
+      <p:ext uri="{BB962C8B-B14F-4D97-AF65-F5344CB8AC3E}">
+        <p14:creationId xmlns:p14="http://schemas.microsoft.com/office/powerpoint/2010/main" val="1906208287"/>
+      </p:ext>
+    </p:extLst>
   </p:cSld>
   <p:clrMapOvr>
     <a:masterClrMapping/>
@@ -23628,18 +23972,17 @@
         </p:nvSpPr>
         <p:spPr>
           <a:xfrm>
-            <a:off x="1835696" y="766826"/>
-            <a:ext cx="5832648" cy="593092"/>
+            <a:off x="3563888" y="764704"/>
+            <a:ext cx="2534050" cy="593092"/>
           </a:xfrm>
         </p:spPr>
         <p:txBody>
           <a:bodyPr/>
           <a:lstStyle/>
           <a:p>
-            <a:pPr algn="ctr"/>
             <a:r>
               <a:rPr lang="en-US" dirty="0" smtClean="0"/>
-              <a:t>LOGINS AND ACCOUNTS</a:t>
+              <a:t>Stored Procedure</a:t>
             </a:r>
             <a:endParaRPr lang="en-US" dirty="0"/>
           </a:p>
@@ -23647,7 +23990,26 @@
       </p:sp>
       <p:sp>
         <p:nvSpPr>
-          <p:cNvPr id="5" name="Content Placeholder 2"/>
+          <p:cNvPr id="3" name="Content Placeholder 2"/>
+          <p:cNvSpPr>
+            <a:spLocks noGrp="1"/>
+          </p:cNvSpPr>
+          <p:nvPr>
+            <p:ph sz="half" idx="2"/>
+          </p:nvPr>
+        </p:nvSpPr>
+        <p:spPr/>
+        <p:txBody>
+          <a:bodyPr/>
+          <a:lstStyle/>
+          <a:p>
+            <a:endParaRPr lang="en-US"/>
+          </a:p>
+        </p:txBody>
+      </p:sp>
+      <p:sp>
+        <p:nvSpPr>
+          <p:cNvPr id="4" name="Content Placeholder 3"/>
           <p:cNvSpPr>
             <a:spLocks noGrp="1"/>
           </p:cNvSpPr>
@@ -23655,132 +24017,25 @@
             <p:ph sz="quarter" idx="4"/>
           </p:nvPr>
         </p:nvSpPr>
-        <p:spPr>
-          <a:xfrm>
-            <a:off x="683568" y="1773370"/>
-            <a:ext cx="7741296" cy="4499027"/>
-          </a:xfrm>
-        </p:spPr>
-        <p:txBody>
-          <a:bodyPr>
-            <a:normAutofit fontScale="92500" lnSpcReduction="20000"/>
-          </a:bodyPr>
-          <a:lstStyle/>
-          <a:p>
-            <a:r>
-              <a:rPr lang="en-US" sz="2800" dirty="0" smtClean="0"/>
-              <a:t>Three tiered approach to accessing content</a:t>
-            </a:r>
-          </a:p>
-          <a:p>
-            <a:r>
-              <a:rPr lang="en-US" sz="2800" dirty="0" smtClean="0"/>
-              <a:t>1. SQL Server access - a </a:t>
-            </a:r>
-            <a:r>
-              <a:rPr lang="en-US" sz="2800" b="1" i="1" dirty="0" smtClean="0"/>
-              <a:t>login</a:t>
-            </a:r>
-            <a:r>
-              <a:rPr lang="en-US" sz="2800" dirty="0"/>
-              <a:t> </a:t>
-            </a:r>
-            <a:r>
-              <a:rPr lang="en-US" sz="2800" dirty="0" smtClean="0"/>
-              <a:t>is </a:t>
-            </a:r>
-            <a:r>
-              <a:rPr lang="en-US" sz="2800" dirty="0"/>
-              <a:t>a security </a:t>
-            </a:r>
-            <a:r>
-              <a:rPr lang="en-US" sz="2800" dirty="0" smtClean="0"/>
-              <a:t>principal that </a:t>
-            </a:r>
-            <a:r>
-              <a:rPr lang="en-US" sz="2800" dirty="0"/>
-              <a:t>can be authenticated by a secure </a:t>
-            </a:r>
-            <a:r>
-              <a:rPr lang="en-US" sz="2800" dirty="0" smtClean="0"/>
-              <a:t>system to provide a user access to SQL Server</a:t>
-            </a:r>
-            <a:endParaRPr lang="en-US" dirty="0"/>
-          </a:p>
-          <a:p>
-            <a:r>
-              <a:rPr lang="en-US" sz="2800" dirty="0" smtClean="0"/>
-              <a:t>2. Database access - a </a:t>
-            </a:r>
-            <a:r>
-              <a:rPr lang="en-US" sz="2800" b="1" i="1" dirty="0" smtClean="0"/>
-              <a:t>database</a:t>
-            </a:r>
-            <a:r>
-              <a:rPr lang="en-US" sz="2800" dirty="0" smtClean="0"/>
-              <a:t> </a:t>
-            </a:r>
-            <a:r>
-              <a:rPr lang="en-US" sz="2800" b="1" i="1" dirty="0" smtClean="0"/>
-              <a:t>user </a:t>
-            </a:r>
-            <a:r>
-              <a:rPr lang="en-US" sz="2800" dirty="0" smtClean="0"/>
-              <a:t>is mapped to a SQL login and provides a user or group access to a database</a:t>
-            </a:r>
-          </a:p>
-          <a:p>
-            <a:r>
-              <a:rPr lang="en-US" sz="2800" dirty="0" smtClean="0"/>
-              <a:t>3. Object access – </a:t>
-            </a:r>
-            <a:r>
-              <a:rPr lang="en-US" sz="2800" b="1" i="1" dirty="0" smtClean="0"/>
-              <a:t>permissions</a:t>
-            </a:r>
-            <a:r>
-              <a:rPr lang="en-US" sz="2800" dirty="0" smtClean="0"/>
-              <a:t> are applied at the object level to provide the appropriate access to the objects within the database</a:t>
-            </a:r>
-            <a:endParaRPr lang="en-US" sz="2800" dirty="0"/>
-          </a:p>
-          <a:p>
-            <a:endParaRPr lang="en-US" sz="2800" dirty="0" smtClean="0"/>
-          </a:p>
-          <a:p>
-            <a:endParaRPr lang="en-US" dirty="0"/>
-          </a:p>
-          <a:p>
-            <a:r>
-              <a:rPr lang="en-US" dirty="0" smtClean="0"/>
-              <a:t> </a:t>
-            </a:r>
-          </a:p>
-          <a:p>
-            <a:endParaRPr lang="en-US" dirty="0" smtClean="0"/>
-          </a:p>
-          <a:p>
-            <a:endParaRPr lang="en-US" dirty="0" smtClean="0"/>
+        <p:spPr/>
+        <p:txBody>
+          <a:bodyPr/>
+          <a:lstStyle/>
+          <a:p>
+            <a:endParaRPr lang="en-US"/>
           </a:p>
         </p:txBody>
       </p:sp>
     </p:spTree>
     <p:extLst>
       <p:ext uri="{BB962C8B-B14F-4D97-AF65-F5344CB8AC3E}">
-        <p14:creationId xmlns:p14="http://schemas.microsoft.com/office/powerpoint/2010/main" val="1360556060"/>
+        <p14:creationId xmlns:p14="http://schemas.microsoft.com/office/powerpoint/2010/main" val="3321354668"/>
       </p:ext>
     </p:extLst>
   </p:cSld>
   <p:clrMapOvr>
     <a:masterClrMapping/>
   </p:clrMapOvr>
-  <p:timing>
-    <p:tnLst>
-      <p:par>
-        <p:cTn id="1" dur="indefinite" restart="never" nodeType="tmRoot"/>
-      </p:par>
-    </p:tnLst>
-  </p:timing>
 </p:sld>
 </file>
 
@@ -23824,7 +24079,7 @@
             <a:pPr algn="ctr"/>
             <a:r>
               <a:rPr lang="en-US" dirty="0" smtClean="0"/>
-              <a:t>BACK-UP</a:t>
+              <a:t>VIEW</a:t>
             </a:r>
             <a:endParaRPr lang="en-US" dirty="0"/>
           </a:p>
@@ -23869,6 +24124,11 @@
         </p:txBody>
       </p:sp>
     </p:spTree>
+    <p:extLst>
+      <p:ext uri="{BB962C8B-B14F-4D97-AF65-F5344CB8AC3E}">
+        <p14:creationId xmlns:p14="http://schemas.microsoft.com/office/powerpoint/2010/main" val="992881689"/>
+      </p:ext>
+    </p:extLst>
   </p:cSld>
   <p:clrMapOvr>
     <a:masterClrMapping/>
@@ -23923,7 +24183,7 @@
             <a:pPr algn="ctr"/>
             <a:r>
               <a:rPr lang="en-US" dirty="0" smtClean="0"/>
-              <a:t>RESTORE</a:t>
+              <a:t>TRANSACTIONS</a:t>
             </a:r>
             <a:endParaRPr lang="en-US" dirty="0"/>
           </a:p>
@@ -23964,6 +24224,146 @@
           <a:lstStyle/>
           <a:p>
             <a:endParaRPr lang="en-US" dirty="0"/>
+          </a:p>
+        </p:txBody>
+      </p:sp>
+    </p:spTree>
+    <p:extLst>
+      <p:ext uri="{BB962C8B-B14F-4D97-AF65-F5344CB8AC3E}">
+        <p14:creationId xmlns:p14="http://schemas.microsoft.com/office/powerpoint/2010/main" val="586749817"/>
+      </p:ext>
+    </p:extLst>
+  </p:cSld>
+  <p:clrMapOvr>
+    <a:masterClrMapping/>
+  </p:clrMapOvr>
+  <p:timing>
+    <p:tnLst>
+      <p:par>
+        <p:cTn id="1" dur="indefinite" restart="never" nodeType="tmRoot"/>
+      </p:par>
+    </p:tnLst>
+  </p:timing>
+</p:sld>
+</file>
+
+<file path=ppt/slides/slide55.xml><?xml version="1.0" encoding="utf-8"?>
+<p:sld xmlns:a="http://schemas.openxmlformats.org/drawingml/2006/main" xmlns:r="http://schemas.openxmlformats.org/officeDocument/2006/relationships" xmlns:p="http://schemas.openxmlformats.org/presentationml/2006/main">
+  <p:cSld>
+    <p:spTree>
+      <p:nvGrpSpPr>
+        <p:cNvPr id="1" name=""/>
+        <p:cNvGrpSpPr/>
+        <p:nvPr/>
+      </p:nvGrpSpPr>
+      <p:grpSpPr>
+        <a:xfrm>
+          <a:off x="0" y="0"/>
+          <a:ext cx="0" cy="0"/>
+          <a:chOff x="0" y="0"/>
+          <a:chExt cx="0" cy="0"/>
+        </a:xfrm>
+      </p:grpSpPr>
+      <p:sp>
+        <p:nvSpPr>
+          <p:cNvPr id="2" name="Title 1"/>
+          <p:cNvSpPr>
+            <a:spLocks noGrp="1"/>
+          </p:cNvSpPr>
+          <p:nvPr>
+            <p:ph type="title"/>
+          </p:nvPr>
+        </p:nvSpPr>
+        <p:spPr>
+          <a:xfrm>
+            <a:off x="1835696" y="766826"/>
+            <a:ext cx="5832648" cy="593092"/>
+          </a:xfrm>
+        </p:spPr>
+        <p:txBody>
+          <a:bodyPr/>
+          <a:lstStyle/>
+          <a:p>
+            <a:pPr algn="ctr"/>
+            <a:r>
+              <a:rPr lang="en-US" dirty="0" smtClean="0"/>
+              <a:t>DATABSE SECURITY</a:t>
+            </a:r>
+            <a:endParaRPr lang="en-US" dirty="0"/>
+          </a:p>
+        </p:txBody>
+      </p:sp>
+      <p:sp>
+        <p:nvSpPr>
+          <p:cNvPr id="5" name="Content Placeholder 2"/>
+          <p:cNvSpPr>
+            <a:spLocks noGrp="1"/>
+          </p:cNvSpPr>
+          <p:nvPr>
+            <p:ph sz="half" idx="2"/>
+          </p:nvPr>
+        </p:nvSpPr>
+        <p:spPr>
+          <a:xfrm>
+            <a:off x="720724" y="1773371"/>
+            <a:ext cx="7811716" cy="4499026"/>
+          </a:xfrm>
+        </p:spPr>
+        <p:txBody>
+          <a:bodyPr>
+            <a:normAutofit fontScale="92500" lnSpcReduction="10000"/>
+          </a:bodyPr>
+          <a:lstStyle/>
+          <a:p>
+            <a:r>
+              <a:rPr lang="en-US" sz="2800" dirty="0" smtClean="0"/>
+              <a:t>Securing your database content is a critical part of a DBA’s job. The design, testing, and implementation of security is necessary to ensure that confidentiality is not compromised</a:t>
+            </a:r>
+          </a:p>
+          <a:p>
+            <a:endParaRPr lang="en-US" sz="2800" b="1" i="1" dirty="0" smtClean="0"/>
+          </a:p>
+          <a:p>
+            <a:r>
+              <a:rPr lang="en-US" sz="2800" b="1" i="1" dirty="0" err="1" smtClean="0"/>
+              <a:t>Securables</a:t>
+            </a:r>
+            <a:r>
+              <a:rPr lang="en-US" sz="2800" b="1" i="1" dirty="0" smtClean="0"/>
+              <a:t> </a:t>
+            </a:r>
+            <a:r>
+              <a:rPr lang="en-US" sz="2800" dirty="0" smtClean="0"/>
+              <a:t>are </a:t>
+            </a:r>
+            <a:r>
+              <a:rPr lang="en-US" sz="2800" dirty="0"/>
+              <a:t>the server, database, and objects </a:t>
+            </a:r>
+            <a:r>
+              <a:rPr lang="en-US" sz="2800" dirty="0" smtClean="0"/>
+              <a:t>a database contains</a:t>
+            </a:r>
+          </a:p>
+          <a:p>
+            <a:r>
+              <a:rPr lang="en-US" sz="2800" b="1" i="1" dirty="0" smtClean="0"/>
+              <a:t>Principals</a:t>
+            </a:r>
+            <a:r>
+              <a:rPr lang="en-US" sz="2800" dirty="0" smtClean="0"/>
+              <a:t> are the individuals, groups, and processes granted access to SQL Server</a:t>
+            </a:r>
+          </a:p>
+          <a:p>
+            <a:r>
+              <a:rPr lang="en-US" sz="2800" b="1" i="1" dirty="0" smtClean="0"/>
+              <a:t>Permissions</a:t>
+            </a:r>
+            <a:r>
+              <a:rPr lang="en-US" sz="2800" dirty="0" smtClean="0"/>
+              <a:t> are granted to a principal for every SQL Server securable</a:t>
+            </a:r>
           </a:p>
         </p:txBody>
       </p:sp>
@@ -23982,7 +24382,390 @@
 </p:sld>
 </file>
 
-<file path=ppt/slides/slide55.xml><?xml version="1.0" encoding="utf-8"?>
+<file path=ppt/slides/slide56.xml><?xml version="1.0" encoding="utf-8"?>
+<p:sld xmlns:a="http://schemas.openxmlformats.org/drawingml/2006/main" xmlns:r="http://schemas.openxmlformats.org/officeDocument/2006/relationships" xmlns:p="http://schemas.openxmlformats.org/presentationml/2006/main">
+  <p:cSld>
+    <p:spTree>
+      <p:nvGrpSpPr>
+        <p:cNvPr id="1" name=""/>
+        <p:cNvGrpSpPr/>
+        <p:nvPr/>
+      </p:nvGrpSpPr>
+      <p:grpSpPr>
+        <a:xfrm>
+          <a:off x="0" y="0"/>
+          <a:ext cx="0" cy="0"/>
+          <a:chOff x="0" y="0"/>
+          <a:chExt cx="0" cy="0"/>
+        </a:xfrm>
+      </p:grpSpPr>
+      <p:sp>
+        <p:nvSpPr>
+          <p:cNvPr id="2" name="Title 1"/>
+          <p:cNvSpPr>
+            <a:spLocks noGrp="1"/>
+          </p:cNvSpPr>
+          <p:nvPr>
+            <p:ph type="title"/>
+          </p:nvPr>
+        </p:nvSpPr>
+        <p:spPr>
+          <a:xfrm>
+            <a:off x="1835696" y="766826"/>
+            <a:ext cx="5832648" cy="593092"/>
+          </a:xfrm>
+        </p:spPr>
+        <p:txBody>
+          <a:bodyPr/>
+          <a:lstStyle/>
+          <a:p>
+            <a:pPr algn="ctr"/>
+            <a:r>
+              <a:rPr lang="en-US" dirty="0" smtClean="0"/>
+              <a:t>LOGINS AND ACCOUNTS</a:t>
+            </a:r>
+            <a:endParaRPr lang="en-US" dirty="0"/>
+          </a:p>
+        </p:txBody>
+      </p:sp>
+      <p:sp>
+        <p:nvSpPr>
+          <p:cNvPr id="5" name="Content Placeholder 2"/>
+          <p:cNvSpPr>
+            <a:spLocks noGrp="1"/>
+          </p:cNvSpPr>
+          <p:nvPr>
+            <p:ph sz="quarter" idx="4"/>
+          </p:nvPr>
+        </p:nvSpPr>
+        <p:spPr>
+          <a:xfrm>
+            <a:off x="683568" y="1773370"/>
+            <a:ext cx="7741296" cy="4499027"/>
+          </a:xfrm>
+        </p:spPr>
+        <p:txBody>
+          <a:bodyPr>
+            <a:normAutofit fontScale="92500" lnSpcReduction="20000"/>
+          </a:bodyPr>
+          <a:lstStyle/>
+          <a:p>
+            <a:r>
+              <a:rPr lang="en-US" sz="2800" dirty="0" smtClean="0"/>
+              <a:t>Three tiered approach to accessing content</a:t>
+            </a:r>
+          </a:p>
+          <a:p>
+            <a:r>
+              <a:rPr lang="en-US" sz="2800" dirty="0" smtClean="0"/>
+              <a:t>1. SQL Server access - a </a:t>
+            </a:r>
+            <a:r>
+              <a:rPr lang="en-US" sz="2800" b="1" i="1" dirty="0" smtClean="0"/>
+              <a:t>login</a:t>
+            </a:r>
+            <a:r>
+              <a:rPr lang="en-US" sz="2800" dirty="0"/>
+              <a:t> </a:t>
+            </a:r>
+            <a:r>
+              <a:rPr lang="en-US" sz="2800" dirty="0" smtClean="0"/>
+              <a:t>is </a:t>
+            </a:r>
+            <a:r>
+              <a:rPr lang="en-US" sz="2800" dirty="0"/>
+              <a:t>a security </a:t>
+            </a:r>
+            <a:r>
+              <a:rPr lang="en-US" sz="2800" dirty="0" smtClean="0"/>
+              <a:t>principal that </a:t>
+            </a:r>
+            <a:r>
+              <a:rPr lang="en-US" sz="2800" dirty="0"/>
+              <a:t>can be authenticated by a secure </a:t>
+            </a:r>
+            <a:r>
+              <a:rPr lang="en-US" sz="2800" dirty="0" smtClean="0"/>
+              <a:t>system to provide a user access to SQL Server</a:t>
+            </a:r>
+            <a:endParaRPr lang="en-US" dirty="0"/>
+          </a:p>
+          <a:p>
+            <a:r>
+              <a:rPr lang="en-US" sz="2800" dirty="0" smtClean="0"/>
+              <a:t>2. Database access - a </a:t>
+            </a:r>
+            <a:r>
+              <a:rPr lang="en-US" sz="2800" b="1" i="1" dirty="0" smtClean="0"/>
+              <a:t>database</a:t>
+            </a:r>
+            <a:r>
+              <a:rPr lang="en-US" sz="2800" dirty="0" smtClean="0"/>
+              <a:t> </a:t>
+            </a:r>
+            <a:r>
+              <a:rPr lang="en-US" sz="2800" b="1" i="1" dirty="0" smtClean="0"/>
+              <a:t>user </a:t>
+            </a:r>
+            <a:r>
+              <a:rPr lang="en-US" sz="2800" dirty="0" smtClean="0"/>
+              <a:t>is mapped to a SQL login and provides a user or group access to a database</a:t>
+            </a:r>
+          </a:p>
+          <a:p>
+            <a:r>
+              <a:rPr lang="en-US" sz="2800" dirty="0" smtClean="0"/>
+              <a:t>3. Object access – </a:t>
+            </a:r>
+            <a:r>
+              <a:rPr lang="en-US" sz="2800" b="1" i="1" dirty="0" smtClean="0"/>
+              <a:t>permissions</a:t>
+            </a:r>
+            <a:r>
+              <a:rPr lang="en-US" sz="2800" dirty="0" smtClean="0"/>
+              <a:t> are applied at the object level to provide the appropriate access to the objects within the database</a:t>
+            </a:r>
+            <a:endParaRPr lang="en-US" sz="2800" dirty="0"/>
+          </a:p>
+          <a:p>
+            <a:endParaRPr lang="en-US" sz="2800" dirty="0" smtClean="0"/>
+          </a:p>
+          <a:p>
+            <a:endParaRPr lang="en-US" dirty="0"/>
+          </a:p>
+          <a:p>
+            <a:r>
+              <a:rPr lang="en-US" dirty="0" smtClean="0"/>
+              <a:t> </a:t>
+            </a:r>
+          </a:p>
+          <a:p>
+            <a:endParaRPr lang="en-US" dirty="0" smtClean="0"/>
+          </a:p>
+          <a:p>
+            <a:endParaRPr lang="en-US" dirty="0" smtClean="0"/>
+          </a:p>
+        </p:txBody>
+      </p:sp>
+    </p:spTree>
+    <p:extLst>
+      <p:ext uri="{BB962C8B-B14F-4D97-AF65-F5344CB8AC3E}">
+        <p14:creationId xmlns:p14="http://schemas.microsoft.com/office/powerpoint/2010/main" val="1360556060"/>
+      </p:ext>
+    </p:extLst>
+  </p:cSld>
+  <p:clrMapOvr>
+    <a:masterClrMapping/>
+  </p:clrMapOvr>
+  <p:timing>
+    <p:tnLst>
+      <p:par>
+        <p:cTn id="1" dur="indefinite" restart="never" nodeType="tmRoot"/>
+      </p:par>
+    </p:tnLst>
+  </p:timing>
+</p:sld>
+</file>
+
+<file path=ppt/slides/slide57.xml><?xml version="1.0" encoding="utf-8"?>
+<p:sld xmlns:a="http://schemas.openxmlformats.org/drawingml/2006/main" xmlns:r="http://schemas.openxmlformats.org/officeDocument/2006/relationships" xmlns:p="http://schemas.openxmlformats.org/presentationml/2006/main">
+  <p:cSld>
+    <p:spTree>
+      <p:nvGrpSpPr>
+        <p:cNvPr id="1" name=""/>
+        <p:cNvGrpSpPr/>
+        <p:nvPr/>
+      </p:nvGrpSpPr>
+      <p:grpSpPr>
+        <a:xfrm>
+          <a:off x="0" y="0"/>
+          <a:ext cx="0" cy="0"/>
+          <a:chOff x="0" y="0"/>
+          <a:chExt cx="0" cy="0"/>
+        </a:xfrm>
+      </p:grpSpPr>
+      <p:sp>
+        <p:nvSpPr>
+          <p:cNvPr id="2" name="Title 1"/>
+          <p:cNvSpPr>
+            <a:spLocks noGrp="1"/>
+          </p:cNvSpPr>
+          <p:nvPr>
+            <p:ph type="title"/>
+          </p:nvPr>
+        </p:nvSpPr>
+        <p:spPr>
+          <a:xfrm>
+            <a:off x="1835696" y="766826"/>
+            <a:ext cx="5832648" cy="593092"/>
+          </a:xfrm>
+        </p:spPr>
+        <p:txBody>
+          <a:bodyPr/>
+          <a:lstStyle/>
+          <a:p>
+            <a:pPr algn="ctr"/>
+            <a:r>
+              <a:rPr lang="en-US" dirty="0" smtClean="0"/>
+              <a:t>BACK-UP</a:t>
+            </a:r>
+            <a:endParaRPr lang="en-US" dirty="0"/>
+          </a:p>
+        </p:txBody>
+      </p:sp>
+      <p:sp>
+        <p:nvSpPr>
+          <p:cNvPr id="3" name="Content Placeholder 2"/>
+          <p:cNvSpPr>
+            <a:spLocks noGrp="1"/>
+          </p:cNvSpPr>
+          <p:nvPr>
+            <p:ph sz="half" idx="2"/>
+          </p:nvPr>
+        </p:nvSpPr>
+        <p:spPr/>
+        <p:txBody>
+          <a:bodyPr/>
+          <a:lstStyle/>
+          <a:p>
+            <a:endParaRPr lang="en-US" dirty="0"/>
+          </a:p>
+        </p:txBody>
+      </p:sp>
+      <p:sp>
+        <p:nvSpPr>
+          <p:cNvPr id="4" name="Content Placeholder 3"/>
+          <p:cNvSpPr>
+            <a:spLocks noGrp="1"/>
+          </p:cNvSpPr>
+          <p:nvPr>
+            <p:ph sz="quarter" idx="4"/>
+          </p:nvPr>
+        </p:nvSpPr>
+        <p:spPr/>
+        <p:txBody>
+          <a:bodyPr/>
+          <a:lstStyle/>
+          <a:p>
+            <a:endParaRPr lang="en-US" dirty="0"/>
+          </a:p>
+        </p:txBody>
+      </p:sp>
+    </p:spTree>
+  </p:cSld>
+  <p:clrMapOvr>
+    <a:masterClrMapping/>
+  </p:clrMapOvr>
+  <p:timing>
+    <p:tnLst>
+      <p:par>
+        <p:cTn id="1" dur="indefinite" restart="never" nodeType="tmRoot"/>
+      </p:par>
+    </p:tnLst>
+  </p:timing>
+</p:sld>
+</file>
+
+<file path=ppt/slides/slide58.xml><?xml version="1.0" encoding="utf-8"?>
+<p:sld xmlns:a="http://schemas.openxmlformats.org/drawingml/2006/main" xmlns:r="http://schemas.openxmlformats.org/officeDocument/2006/relationships" xmlns:p="http://schemas.openxmlformats.org/presentationml/2006/main">
+  <p:cSld>
+    <p:spTree>
+      <p:nvGrpSpPr>
+        <p:cNvPr id="1" name=""/>
+        <p:cNvGrpSpPr/>
+        <p:nvPr/>
+      </p:nvGrpSpPr>
+      <p:grpSpPr>
+        <a:xfrm>
+          <a:off x="0" y="0"/>
+          <a:ext cx="0" cy="0"/>
+          <a:chOff x="0" y="0"/>
+          <a:chExt cx="0" cy="0"/>
+        </a:xfrm>
+      </p:grpSpPr>
+      <p:sp>
+        <p:nvSpPr>
+          <p:cNvPr id="2" name="Title 1"/>
+          <p:cNvSpPr>
+            <a:spLocks noGrp="1"/>
+          </p:cNvSpPr>
+          <p:nvPr>
+            <p:ph type="title"/>
+          </p:nvPr>
+        </p:nvSpPr>
+        <p:spPr>
+          <a:xfrm>
+            <a:off x="1835696" y="766826"/>
+            <a:ext cx="5832648" cy="593092"/>
+          </a:xfrm>
+        </p:spPr>
+        <p:txBody>
+          <a:bodyPr/>
+          <a:lstStyle/>
+          <a:p>
+            <a:pPr algn="ctr"/>
+            <a:r>
+              <a:rPr lang="en-US" dirty="0" smtClean="0"/>
+              <a:t>RESTORE</a:t>
+            </a:r>
+            <a:endParaRPr lang="en-US" dirty="0"/>
+          </a:p>
+        </p:txBody>
+      </p:sp>
+      <p:sp>
+        <p:nvSpPr>
+          <p:cNvPr id="3" name="Content Placeholder 2"/>
+          <p:cNvSpPr>
+            <a:spLocks noGrp="1"/>
+          </p:cNvSpPr>
+          <p:nvPr>
+            <p:ph sz="half" idx="2"/>
+          </p:nvPr>
+        </p:nvSpPr>
+        <p:spPr/>
+        <p:txBody>
+          <a:bodyPr/>
+          <a:lstStyle/>
+          <a:p>
+            <a:endParaRPr lang="en-US" dirty="0"/>
+          </a:p>
+        </p:txBody>
+      </p:sp>
+      <p:sp>
+        <p:nvSpPr>
+          <p:cNvPr id="4" name="Content Placeholder 3"/>
+          <p:cNvSpPr>
+            <a:spLocks noGrp="1"/>
+          </p:cNvSpPr>
+          <p:nvPr>
+            <p:ph sz="quarter" idx="4"/>
+          </p:nvPr>
+        </p:nvSpPr>
+        <p:spPr/>
+        <p:txBody>
+          <a:bodyPr/>
+          <a:lstStyle/>
+          <a:p>
+            <a:endParaRPr lang="en-US" dirty="0"/>
+          </a:p>
+        </p:txBody>
+      </p:sp>
+    </p:spTree>
+  </p:cSld>
+  <p:clrMapOvr>
+    <a:masterClrMapping/>
+  </p:clrMapOvr>
+  <p:timing>
+    <p:tnLst>
+      <p:par>
+        <p:cTn id="1" dur="indefinite" restart="never" nodeType="tmRoot"/>
+      </p:par>
+    </p:tnLst>
+  </p:timing>
+</p:sld>
+</file>
+
+<file path=ppt/slides/slide59.xml><?xml version="1.0" encoding="utf-8"?>
 <p:sld xmlns:a="http://schemas.openxmlformats.org/drawingml/2006/main" xmlns:r="http://schemas.openxmlformats.org/officeDocument/2006/relationships" xmlns:p="http://schemas.openxmlformats.org/presentationml/2006/main">
   <p:cSld>
     <p:spTree>

</xml_diff>